<commit_message>
PPT barnes hut tekst
</commit_message>
<xml_diff>
--- a/Presentatie/Presentatie.pptx
+++ b/Presentatie/Presentatie.pptx
@@ -11,11 +11,12 @@
     <p:sldId id="259" r:id="rId5"/>
     <p:sldId id="260" r:id="rId6"/>
     <p:sldId id="261" r:id="rId7"/>
-    <p:sldId id="262" r:id="rId8"/>
-    <p:sldId id="263" r:id="rId9"/>
-    <p:sldId id="266" r:id="rId10"/>
-    <p:sldId id="264" r:id="rId11"/>
-    <p:sldId id="265" r:id="rId12"/>
+    <p:sldId id="267" r:id="rId8"/>
+    <p:sldId id="262" r:id="rId9"/>
+    <p:sldId id="263" r:id="rId10"/>
+    <p:sldId id="266" r:id="rId11"/>
+    <p:sldId id="264" r:id="rId12"/>
+    <p:sldId id="265" r:id="rId13"/>
   </p:sldIdLst>
   <p:sldSz cx="12192000" cy="6858000"/>
   <p:notesSz cx="6858000" cy="9144000"/>
@@ -2997,28 +2998,41 @@
           <a:lstStyle/>
           <a:p>
             <a:r>
-              <a:rPr lang="nl-NL" smtClean="0"/>
+              <a:rPr lang="nl-NL" dirty="0" smtClean="0"/>
               <a:t>Casper Barendrecht</a:t>
             </a:r>
           </a:p>
           <a:p>
             <a:r>
-              <a:rPr lang="nl-NL" smtClean="0"/>
-              <a:t>Guanyu Jin</a:t>
-            </a:r>
-          </a:p>
-          <a:p>
-            <a:r>
-              <a:rPr lang="nl-NL" smtClean="0"/>
+              <a:rPr lang="nl-NL" dirty="0" err="1" smtClean="0"/>
+              <a:t>Guanyu</a:t>
+            </a:r>
+            <a:r>
+              <a:rPr lang="nl-NL" dirty="0" smtClean="0"/>
+              <a:t> </a:t>
+            </a:r>
+            <a:r>
+              <a:rPr lang="nl-NL" dirty="0" err="1" smtClean="0"/>
+              <a:t>Jin</a:t>
+            </a:r>
+            <a:endParaRPr lang="nl-NL" dirty="0" smtClean="0"/>
+          </a:p>
+          <a:p>
+            <a:r>
+              <a:rPr lang="nl-NL" dirty="0" smtClean="0"/>
               <a:t>Stijn Moerman</a:t>
             </a:r>
           </a:p>
           <a:p>
             <a:r>
-              <a:rPr lang="nl-NL" smtClean="0"/>
-              <a:t>Nand Snijder</a:t>
-            </a:r>
-            <a:endParaRPr lang="nl-NL"/>
+              <a:rPr lang="nl-NL" dirty="0" err="1" smtClean="0"/>
+              <a:t>Nand</a:t>
+            </a:r>
+            <a:r>
+              <a:rPr lang="nl-NL" dirty="0" smtClean="0"/>
+              <a:t> Snijder</a:t>
+            </a:r>
+            <a:endParaRPr lang="nl-NL" dirty="0"/>
           </a:p>
         </p:txBody>
       </p:sp>
@@ -3032,6 +3046,13 @@
   <p:clrMapOvr>
     <a:masterClrMapping/>
   </p:clrMapOvr>
+  <p:timing>
+    <p:tnLst>
+      <p:par>
+        <p:cTn id="1" dur="indefinite" restart="never" nodeType="tmRoot"/>
+      </p:par>
+    </p:tnLst>
+  </p:timing>
 </p:sld>
 </file>
 
@@ -3052,6 +3073,35 @@
           <a:chExt cx="0" cy="0"/>
         </a:xfrm>
       </p:grpSpPr>
+      <p:pic>
+        <p:nvPicPr>
+          <p:cNvPr id="4" name="Tijdelijke aanduiding voor inhoud 3"/>
+          <p:cNvPicPr>
+            <a:picLocks noGrp="1" noChangeAspect="1"/>
+          </p:cNvPicPr>
+          <p:nvPr>
+            <p:ph idx="1"/>
+          </p:nvPr>
+        </p:nvPicPr>
+        <p:blipFill>
+          <a:blip r:embed="rId2">
+            <a:extLst>
+              <a:ext uri="{28A0092B-C50C-407E-A947-70E740481C1C}">
+                <a14:useLocalDpi xmlns:a14="http://schemas.microsoft.com/office/drawing/2010/main" val="0"/>
+              </a:ext>
+            </a:extLst>
+          </a:blip>
+          <a:stretch>
+            <a:fillRect/>
+          </a:stretch>
+        </p:blipFill>
+        <p:spPr>
+          <a:xfrm>
+            <a:off x="5819064" y="631056"/>
+            <a:ext cx="5512312" cy="4644377"/>
+          </a:xfrm>
+        </p:spPr>
+      </p:pic>
       <p:sp>
         <p:nvSpPr>
           <p:cNvPr id="2" name="Titel 1"/>
@@ -3069,7 +3119,7 @@
           <a:p>
             <a:r>
               <a:rPr lang="nl-NL" smtClean="0"/>
-              <a:t>Conclusie</a:t>
+              <a:t>Nauwkeurigheid model</a:t>
             </a:r>
             <a:endParaRPr lang="nl-NL"/>
           </a:p>
@@ -3077,27 +3127,548 @@
       </p:sp>
       <p:sp>
         <p:nvSpPr>
-          <p:cNvPr id="3" name="Tijdelijke aanduiding voor inhoud 2"/>
-          <p:cNvSpPr>
-            <a:spLocks noGrp="1"/>
-          </p:cNvSpPr>
-          <p:nvPr>
-            <p:ph idx="1"/>
-          </p:nvPr>
-        </p:nvSpPr>
-        <p:spPr/>
-        <p:txBody>
-          <a:bodyPr/>
-          <a:lstStyle/>
-          <a:p>
-            <a:endParaRPr lang="nl-NL"/>
-          </a:p>
-        </p:txBody>
-      </p:sp>
+          <p:cNvPr id="5" name="Tijdelijke aanduiding voor inhoud 2"/>
+          <p:cNvSpPr txBox="1">
+            <a:spLocks/>
+          </p:cNvSpPr>
+          <p:nvPr/>
+        </p:nvSpPr>
+        <p:spPr>
+          <a:xfrm>
+            <a:off x="838200" y="1825625"/>
+            <a:ext cx="5408054" cy="4351338"/>
+          </a:xfrm>
+          <a:prstGeom prst="rect">
+            <a:avLst/>
+          </a:prstGeom>
+        </p:spPr>
+        <p:txBody>
+          <a:bodyPr vert="horz" lIns="91440" tIns="45720" rIns="91440" bIns="45720" rtlCol="0">
+            <a:normAutofit/>
+          </a:bodyPr>
+          <a:lstStyle>
+            <a:lvl1pPr marL="228600" indent="-228600" algn="l" defTabSz="914400" rtl="0" eaLnBrk="1" latinLnBrk="0" hangingPunct="1">
+              <a:lnSpc>
+                <a:spcPct val="90000"/>
+              </a:lnSpc>
+              <a:spcBef>
+                <a:spcPts val="1000"/>
+              </a:spcBef>
+              <a:buFont typeface="Arial" panose="020B0604020202020204" pitchFamily="34" charset="0"/>
+              <a:buChar char="•"/>
+              <a:defRPr sz="2800" kern="1200">
+                <a:solidFill>
+                  <a:schemeClr val="tx1"/>
+                </a:solidFill>
+                <a:latin typeface="+mn-lt"/>
+                <a:ea typeface="+mn-ea"/>
+                <a:cs typeface="+mn-cs"/>
+              </a:defRPr>
+            </a:lvl1pPr>
+            <a:lvl2pPr marL="685800" indent="-228600" algn="l" defTabSz="914400" rtl="0" eaLnBrk="1" latinLnBrk="0" hangingPunct="1">
+              <a:lnSpc>
+                <a:spcPct val="90000"/>
+              </a:lnSpc>
+              <a:spcBef>
+                <a:spcPts val="500"/>
+              </a:spcBef>
+              <a:buFont typeface="Arial" panose="020B0604020202020204" pitchFamily="34" charset="0"/>
+              <a:buChar char="•"/>
+              <a:defRPr sz="2400" kern="1200">
+                <a:solidFill>
+                  <a:schemeClr val="tx1"/>
+                </a:solidFill>
+                <a:latin typeface="+mn-lt"/>
+                <a:ea typeface="+mn-ea"/>
+                <a:cs typeface="+mn-cs"/>
+              </a:defRPr>
+            </a:lvl2pPr>
+            <a:lvl3pPr marL="1143000" indent="-228600" algn="l" defTabSz="914400" rtl="0" eaLnBrk="1" latinLnBrk="0" hangingPunct="1">
+              <a:lnSpc>
+                <a:spcPct val="90000"/>
+              </a:lnSpc>
+              <a:spcBef>
+                <a:spcPts val="500"/>
+              </a:spcBef>
+              <a:buFont typeface="Arial" panose="020B0604020202020204" pitchFamily="34" charset="0"/>
+              <a:buChar char="•"/>
+              <a:defRPr sz="2000" kern="1200">
+                <a:solidFill>
+                  <a:schemeClr val="tx1"/>
+                </a:solidFill>
+                <a:latin typeface="+mn-lt"/>
+                <a:ea typeface="+mn-ea"/>
+                <a:cs typeface="+mn-cs"/>
+              </a:defRPr>
+            </a:lvl3pPr>
+            <a:lvl4pPr marL="1600200" indent="-228600" algn="l" defTabSz="914400" rtl="0" eaLnBrk="1" latinLnBrk="0" hangingPunct="1">
+              <a:lnSpc>
+                <a:spcPct val="90000"/>
+              </a:lnSpc>
+              <a:spcBef>
+                <a:spcPts val="500"/>
+              </a:spcBef>
+              <a:buFont typeface="Arial" panose="020B0604020202020204" pitchFamily="34" charset="0"/>
+              <a:buChar char="•"/>
+              <a:defRPr sz="1800" kern="1200">
+                <a:solidFill>
+                  <a:schemeClr val="tx1"/>
+                </a:solidFill>
+                <a:latin typeface="+mn-lt"/>
+                <a:ea typeface="+mn-ea"/>
+                <a:cs typeface="+mn-cs"/>
+              </a:defRPr>
+            </a:lvl4pPr>
+            <a:lvl5pPr marL="2057400" indent="-228600" algn="l" defTabSz="914400" rtl="0" eaLnBrk="1" latinLnBrk="0" hangingPunct="1">
+              <a:lnSpc>
+                <a:spcPct val="90000"/>
+              </a:lnSpc>
+              <a:spcBef>
+                <a:spcPts val="500"/>
+              </a:spcBef>
+              <a:buFont typeface="Arial" panose="020B0604020202020204" pitchFamily="34" charset="0"/>
+              <a:buChar char="•"/>
+              <a:defRPr sz="1800" kern="1200">
+                <a:solidFill>
+                  <a:schemeClr val="tx1"/>
+                </a:solidFill>
+                <a:latin typeface="+mn-lt"/>
+                <a:ea typeface="+mn-ea"/>
+                <a:cs typeface="+mn-cs"/>
+              </a:defRPr>
+            </a:lvl5pPr>
+            <a:lvl6pPr marL="2514600" indent="-228600" algn="l" defTabSz="914400" rtl="0" eaLnBrk="1" latinLnBrk="0" hangingPunct="1">
+              <a:lnSpc>
+                <a:spcPct val="90000"/>
+              </a:lnSpc>
+              <a:spcBef>
+                <a:spcPts val="500"/>
+              </a:spcBef>
+              <a:buFont typeface="Arial" panose="020B0604020202020204" pitchFamily="34" charset="0"/>
+              <a:buChar char="•"/>
+              <a:defRPr sz="1800" kern="1200">
+                <a:solidFill>
+                  <a:schemeClr val="tx1"/>
+                </a:solidFill>
+                <a:latin typeface="+mn-lt"/>
+                <a:ea typeface="+mn-ea"/>
+                <a:cs typeface="+mn-cs"/>
+              </a:defRPr>
+            </a:lvl6pPr>
+            <a:lvl7pPr marL="2971800" indent="-228600" algn="l" defTabSz="914400" rtl="0" eaLnBrk="1" latinLnBrk="0" hangingPunct="1">
+              <a:lnSpc>
+                <a:spcPct val="90000"/>
+              </a:lnSpc>
+              <a:spcBef>
+                <a:spcPts val="500"/>
+              </a:spcBef>
+              <a:buFont typeface="Arial" panose="020B0604020202020204" pitchFamily="34" charset="0"/>
+              <a:buChar char="•"/>
+              <a:defRPr sz="1800" kern="1200">
+                <a:solidFill>
+                  <a:schemeClr val="tx1"/>
+                </a:solidFill>
+                <a:latin typeface="+mn-lt"/>
+                <a:ea typeface="+mn-ea"/>
+                <a:cs typeface="+mn-cs"/>
+              </a:defRPr>
+            </a:lvl7pPr>
+            <a:lvl8pPr marL="3429000" indent="-228600" algn="l" defTabSz="914400" rtl="0" eaLnBrk="1" latinLnBrk="0" hangingPunct="1">
+              <a:lnSpc>
+                <a:spcPct val="90000"/>
+              </a:lnSpc>
+              <a:spcBef>
+                <a:spcPts val="500"/>
+              </a:spcBef>
+              <a:buFont typeface="Arial" panose="020B0604020202020204" pitchFamily="34" charset="0"/>
+              <a:buChar char="•"/>
+              <a:defRPr sz="1800" kern="1200">
+                <a:solidFill>
+                  <a:schemeClr val="tx1"/>
+                </a:solidFill>
+                <a:latin typeface="+mn-lt"/>
+                <a:ea typeface="+mn-ea"/>
+                <a:cs typeface="+mn-cs"/>
+              </a:defRPr>
+            </a:lvl8pPr>
+            <a:lvl9pPr marL="3886200" indent="-228600" algn="l" defTabSz="914400" rtl="0" eaLnBrk="1" latinLnBrk="0" hangingPunct="1">
+              <a:lnSpc>
+                <a:spcPct val="90000"/>
+              </a:lnSpc>
+              <a:spcBef>
+                <a:spcPts val="500"/>
+              </a:spcBef>
+              <a:buFont typeface="Arial" panose="020B0604020202020204" pitchFamily="34" charset="0"/>
+              <a:buChar char="•"/>
+              <a:defRPr sz="1800" kern="1200">
+                <a:solidFill>
+                  <a:schemeClr val="tx1"/>
+                </a:solidFill>
+                <a:latin typeface="+mn-lt"/>
+                <a:ea typeface="+mn-ea"/>
+                <a:cs typeface="+mn-cs"/>
+              </a:defRPr>
+            </a:lvl9pPr>
+          </a:lstStyle>
+          <a:p>
+            <a:r>
+              <a:rPr lang="nl-NL" smtClean="0"/>
+              <a:t>Planeten minder dan 1AU onnauwkeurig </a:t>
+            </a:r>
+          </a:p>
+          <a:p>
+            <a:r>
+              <a:rPr lang="nl-NL" smtClean="0"/>
+              <a:t>Omlooptijd te kort voor dt=1 maand</a:t>
+            </a:r>
+          </a:p>
+          <a:p>
+            <a:r>
+              <a:rPr lang="nl-NL" smtClean="0"/>
+              <a:t>Energie niet behouden</a:t>
+            </a:r>
+          </a:p>
+        </p:txBody>
+      </p:sp>
+      <p:graphicFrame>
+        <p:nvGraphicFramePr>
+          <p:cNvPr id="6" name="Tabel 5"/>
+          <p:cNvGraphicFramePr>
+            <a:graphicFrameLocks noGrp="1"/>
+          </p:cNvGraphicFramePr>
+          <p:nvPr>
+            <p:extLst>
+              <p:ext uri="{D42A27DB-BD31-4B8C-83A1-F6EECF244321}">
+                <p14:modId xmlns:p14="http://schemas.microsoft.com/office/powerpoint/2010/main" val="3826835587"/>
+              </p:ext>
+            </p:extLst>
+          </p:nvPr>
+        </p:nvGraphicFramePr>
+        <p:xfrm>
+          <a:off x="447901" y="5640947"/>
+          <a:ext cx="11190312" cy="775236"/>
+        </p:xfrm>
+        <a:graphic>
+          <a:graphicData uri="http://schemas.openxmlformats.org/drawingml/2006/table">
+            <a:tbl>
+              <a:tblPr firstRow="1" bandRow="1">
+                <a:tableStyleId>{5C22544A-7EE6-4342-B048-85BDC9FD1C3A}</a:tableStyleId>
+              </a:tblPr>
+              <a:tblGrid>
+                <a:gridCol w="1398789"/>
+                <a:gridCol w="1398789"/>
+                <a:gridCol w="1398789"/>
+                <a:gridCol w="1398789"/>
+                <a:gridCol w="1398789"/>
+                <a:gridCol w="1398789"/>
+                <a:gridCol w="1398789"/>
+                <a:gridCol w="1398789"/>
+              </a:tblGrid>
+              <a:tr h="404396">
+                <a:tc>
+                  <a:txBody>
+                    <a:bodyPr/>
+                    <a:lstStyle/>
+                    <a:p>
+                      <a:pPr algn="ctr"/>
+                      <a:r>
+                        <a:rPr lang="nl-NL" smtClean="0"/>
+                        <a:t>k-de</a:t>
+                      </a:r>
+                      <a:r>
+                        <a:rPr lang="nl-NL" baseline="0" smtClean="0"/>
+                        <a:t> tijdstip</a:t>
+                      </a:r>
+                      <a:endParaRPr lang="nl-NL"/>
+                    </a:p>
+                  </a:txBody>
+                  <a:tcPr/>
+                </a:tc>
+                <a:tc>
+                  <a:txBody>
+                    <a:bodyPr/>
+                    <a:lstStyle/>
+                    <a:p>
+                      <a:pPr algn="ctr"/>
+                      <a:r>
+                        <a:rPr lang="nl-NL" smtClean="0"/>
+                        <a:t>0</a:t>
+                      </a:r>
+                      <a:endParaRPr lang="nl-NL"/>
+                    </a:p>
+                  </a:txBody>
+                  <a:tcPr/>
+                </a:tc>
+                <a:tc>
+                  <a:txBody>
+                    <a:bodyPr/>
+                    <a:lstStyle/>
+                    <a:p>
+                      <a:pPr algn="ctr"/>
+                      <a:r>
+                        <a:rPr lang="nl-NL" smtClean="0"/>
+                        <a:t>20</a:t>
+                      </a:r>
+                      <a:endParaRPr lang="nl-NL"/>
+                    </a:p>
+                  </a:txBody>
+                  <a:tcPr anchor="ctr"/>
+                </a:tc>
+                <a:tc>
+                  <a:txBody>
+                    <a:bodyPr/>
+                    <a:lstStyle/>
+                    <a:p>
+                      <a:pPr algn="ctr"/>
+                      <a:r>
+                        <a:rPr lang="nl-NL" smtClean="0"/>
+                        <a:t>40</a:t>
+                      </a:r>
+                      <a:endParaRPr lang="nl-NL"/>
+                    </a:p>
+                  </a:txBody>
+                  <a:tcPr/>
+                </a:tc>
+                <a:tc>
+                  <a:txBody>
+                    <a:bodyPr/>
+                    <a:lstStyle/>
+                    <a:p>
+                      <a:pPr algn="ctr"/>
+                      <a:r>
+                        <a:rPr lang="nl-NL" smtClean="0"/>
+                        <a:t>60</a:t>
+                      </a:r>
+                      <a:endParaRPr lang="nl-NL"/>
+                    </a:p>
+                  </a:txBody>
+                  <a:tcPr/>
+                </a:tc>
+                <a:tc>
+                  <a:txBody>
+                    <a:bodyPr/>
+                    <a:lstStyle/>
+                    <a:p>
+                      <a:pPr algn="ctr"/>
+                      <a:r>
+                        <a:rPr lang="nl-NL" smtClean="0"/>
+                        <a:t>80</a:t>
+                      </a:r>
+                      <a:endParaRPr lang="nl-NL"/>
+                    </a:p>
+                  </a:txBody>
+                  <a:tcPr/>
+                </a:tc>
+                <a:tc>
+                  <a:txBody>
+                    <a:bodyPr/>
+                    <a:lstStyle/>
+                    <a:p>
+                      <a:pPr algn="ctr"/>
+                      <a:r>
+                        <a:rPr lang="nl-NL" smtClean="0"/>
+                        <a:t>100</a:t>
+                      </a:r>
+                      <a:endParaRPr lang="nl-NL"/>
+                    </a:p>
+                  </a:txBody>
+                  <a:tcPr/>
+                </a:tc>
+                <a:tc>
+                  <a:txBody>
+                    <a:bodyPr/>
+                    <a:lstStyle/>
+                    <a:p>
+                      <a:pPr algn="ctr"/>
+                      <a:r>
+                        <a:rPr lang="nl-NL" smtClean="0"/>
+                        <a:t>120</a:t>
+                      </a:r>
+                      <a:endParaRPr lang="nl-NL"/>
+                    </a:p>
+                  </a:txBody>
+                  <a:tcPr/>
+                </a:tc>
+              </a:tr>
+              <a:tr h="370840">
+                <a:tc>
+                  <a:txBody>
+                    <a:bodyPr/>
+                    <a:lstStyle/>
+                    <a:p>
+                      <a:pPr algn="ctr"/>
+                      <a:r>
+                        <a:rPr lang="nl-NL" smtClean="0"/>
+                        <a:t>Energie</a:t>
+                      </a:r>
+                      <a:endParaRPr lang="nl-NL"/>
+                    </a:p>
+                  </a:txBody>
+                  <a:tcPr/>
+                </a:tc>
+                <a:tc>
+                  <a:txBody>
+                    <a:bodyPr/>
+                    <a:lstStyle/>
+                    <a:p>
+                      <a:pPr algn="ctr"/>
+                      <a:r>
+                        <a:rPr lang="nl-NL" sz="1800" b="0" i="0" u="none" strike="noStrike" kern="1200" baseline="0" smtClean="0">
+                          <a:solidFill>
+                            <a:schemeClr val="dk1"/>
+                          </a:solidFill>
+                          <a:latin typeface="+mn-lt"/>
+                          <a:ea typeface="+mn-ea"/>
+                          <a:cs typeface="+mn-cs"/>
+                        </a:rPr>
+                        <a:t>-0.4080</a:t>
+                      </a:r>
+                      <a:endParaRPr lang="nl-NL"/>
+                    </a:p>
+                  </a:txBody>
+                  <a:tcPr/>
+                </a:tc>
+                <a:tc>
+                  <a:txBody>
+                    <a:bodyPr/>
+                    <a:lstStyle/>
+                    <a:p>
+                      <a:pPr algn="ctr"/>
+                      <a:r>
+                        <a:rPr lang="nl-NL" sz="1800" b="0" i="0" u="none" strike="noStrike" kern="1200" baseline="0" smtClean="0">
+                          <a:solidFill>
+                            <a:schemeClr val="dk1"/>
+                          </a:solidFill>
+                          <a:latin typeface="+mn-lt"/>
+                          <a:ea typeface="+mn-ea"/>
+                          <a:cs typeface="+mn-cs"/>
+                        </a:rPr>
+                        <a:t>-0.3539</a:t>
+                      </a:r>
+                      <a:endParaRPr lang="nl-NL"/>
+                    </a:p>
+                  </a:txBody>
+                  <a:tcPr/>
+                </a:tc>
+                <a:tc>
+                  <a:txBody>
+                    <a:bodyPr/>
+                    <a:lstStyle/>
+                    <a:p>
+                      <a:pPr algn="ctr"/>
+                      <a:r>
+                        <a:rPr lang="nl-NL" sz="1800" b="0" i="0" u="none" strike="noStrike" kern="1200" baseline="0" smtClean="0">
+                          <a:solidFill>
+                            <a:schemeClr val="dk1"/>
+                          </a:solidFill>
+                          <a:latin typeface="+mn-lt"/>
+                          <a:ea typeface="+mn-ea"/>
+                          <a:cs typeface="+mn-cs"/>
+                        </a:rPr>
+                        <a:t>-0.3630</a:t>
+                      </a:r>
+                      <a:endParaRPr lang="nl-NL"/>
+                    </a:p>
+                  </a:txBody>
+                  <a:tcPr/>
+                </a:tc>
+                <a:tc>
+                  <a:txBody>
+                    <a:bodyPr/>
+                    <a:lstStyle/>
+                    <a:p>
+                      <a:pPr algn="ctr"/>
+                      <a:r>
+                        <a:rPr lang="nl-NL" sz="1800" b="0" i="0" u="none" strike="noStrike" kern="1200" baseline="0" smtClean="0">
+                          <a:solidFill>
+                            <a:schemeClr val="dk1"/>
+                          </a:solidFill>
+                          <a:latin typeface="+mn-lt"/>
+                          <a:ea typeface="+mn-ea"/>
+                          <a:cs typeface="+mn-cs"/>
+                        </a:rPr>
+                        <a:t>-0.3643</a:t>
+                      </a:r>
+                      <a:endParaRPr lang="nl-NL"/>
+                    </a:p>
+                  </a:txBody>
+                  <a:tcPr/>
+                </a:tc>
+                <a:tc>
+                  <a:txBody>
+                    <a:bodyPr/>
+                    <a:lstStyle/>
+                    <a:p>
+                      <a:pPr algn="ctr"/>
+                      <a:r>
+                        <a:rPr lang="nl-NL" sz="1800" b="0" i="0" u="none" strike="noStrike" kern="1200" baseline="0" smtClean="0">
+                          <a:solidFill>
+                            <a:schemeClr val="dk1"/>
+                          </a:solidFill>
+                          <a:latin typeface="+mn-lt"/>
+                          <a:ea typeface="+mn-ea"/>
+                          <a:cs typeface="+mn-cs"/>
+                        </a:rPr>
+                        <a:t>-0.3543</a:t>
+                      </a:r>
+                      <a:endParaRPr lang="nl-NL"/>
+                    </a:p>
+                  </a:txBody>
+                  <a:tcPr/>
+                </a:tc>
+                <a:tc>
+                  <a:txBody>
+                    <a:bodyPr/>
+                    <a:lstStyle/>
+                    <a:p>
+                      <a:pPr algn="ctr"/>
+                      <a:r>
+                        <a:rPr lang="nl-NL" sz="1800" b="0" i="0" u="none" strike="noStrike" kern="1200" baseline="0" smtClean="0">
+                          <a:solidFill>
+                            <a:schemeClr val="dk1"/>
+                          </a:solidFill>
+                          <a:latin typeface="+mn-lt"/>
+                          <a:ea typeface="+mn-ea"/>
+                          <a:cs typeface="+mn-cs"/>
+                        </a:rPr>
+                        <a:t>-0.3700</a:t>
+                      </a:r>
+                      <a:endParaRPr lang="nl-NL"/>
+                    </a:p>
+                  </a:txBody>
+                  <a:tcPr/>
+                </a:tc>
+                <a:tc>
+                  <a:txBody>
+                    <a:bodyPr/>
+                    <a:lstStyle/>
+                    <a:p>
+                      <a:pPr algn="ctr"/>
+                      <a:r>
+                        <a:rPr lang="nl-NL" sz="1800" b="0" i="0" u="none" strike="noStrike" kern="1200" baseline="0" smtClean="0">
+                          <a:solidFill>
+                            <a:schemeClr val="dk1"/>
+                          </a:solidFill>
+                          <a:latin typeface="+mn-lt"/>
+                          <a:ea typeface="+mn-ea"/>
+                          <a:cs typeface="+mn-cs"/>
+                        </a:rPr>
+                        <a:t>-0.4080</a:t>
+                      </a:r>
+                      <a:endParaRPr lang="nl-NL"/>
+                    </a:p>
+                  </a:txBody>
+                  <a:tcPr/>
+                </a:tc>
+              </a:tr>
+            </a:tbl>
+          </a:graphicData>
+        </a:graphic>
+      </p:graphicFrame>
     </p:spTree>
     <p:extLst>
       <p:ext uri="{BB962C8B-B14F-4D97-AF65-F5344CB8AC3E}">
-        <p14:creationId xmlns:p14="http://schemas.microsoft.com/office/powerpoint/2010/main" val="2551201508"/>
+        <p14:creationId xmlns:p14="http://schemas.microsoft.com/office/powerpoint/2010/main" val="2513868334"/>
       </p:ext>
     </p:extLst>
   </p:cSld>
@@ -3148,6 +3719,85 @@
           <a:p>
             <a:r>
               <a:rPr lang="nl-NL" smtClean="0"/>
+              <a:t>Conclusie</a:t>
+            </a:r>
+            <a:endParaRPr lang="nl-NL"/>
+          </a:p>
+        </p:txBody>
+      </p:sp>
+      <p:sp>
+        <p:nvSpPr>
+          <p:cNvPr id="3" name="Tijdelijke aanduiding voor inhoud 2"/>
+          <p:cNvSpPr>
+            <a:spLocks noGrp="1"/>
+          </p:cNvSpPr>
+          <p:nvPr>
+            <p:ph idx="1"/>
+          </p:nvPr>
+        </p:nvSpPr>
+        <p:spPr/>
+        <p:txBody>
+          <a:bodyPr/>
+          <a:lstStyle/>
+          <a:p>
+            <a:endParaRPr lang="nl-NL"/>
+          </a:p>
+        </p:txBody>
+      </p:sp>
+    </p:spTree>
+    <p:extLst>
+      <p:ext uri="{BB962C8B-B14F-4D97-AF65-F5344CB8AC3E}">
+        <p14:creationId xmlns:p14="http://schemas.microsoft.com/office/powerpoint/2010/main" val="2551201508"/>
+      </p:ext>
+    </p:extLst>
+  </p:cSld>
+  <p:clrMapOvr>
+    <a:masterClrMapping/>
+  </p:clrMapOvr>
+  <p:timing>
+    <p:tnLst>
+      <p:par>
+        <p:cTn id="1" dur="indefinite" restart="never" nodeType="tmRoot"/>
+      </p:par>
+    </p:tnLst>
+  </p:timing>
+</p:sld>
+</file>
+
+<file path=ppt/slides/slide12.xml><?xml version="1.0" encoding="utf-8"?>
+<p:sld xmlns:a="http://schemas.openxmlformats.org/drawingml/2006/main" xmlns:r="http://schemas.openxmlformats.org/officeDocument/2006/relationships" xmlns:p="http://schemas.openxmlformats.org/presentationml/2006/main">
+  <p:cSld>
+    <p:spTree>
+      <p:nvGrpSpPr>
+        <p:cNvPr id="1" name=""/>
+        <p:cNvGrpSpPr/>
+        <p:nvPr/>
+      </p:nvGrpSpPr>
+      <p:grpSpPr>
+        <a:xfrm>
+          <a:off x="0" y="0"/>
+          <a:ext cx="0" cy="0"/>
+          <a:chOff x="0" y="0"/>
+          <a:chExt cx="0" cy="0"/>
+        </a:xfrm>
+      </p:grpSpPr>
+      <p:sp>
+        <p:nvSpPr>
+          <p:cNvPr id="2" name="Titel 1"/>
+          <p:cNvSpPr>
+            <a:spLocks noGrp="1"/>
+          </p:cNvSpPr>
+          <p:nvPr>
+            <p:ph type="title"/>
+          </p:nvPr>
+        </p:nvSpPr>
+        <p:spPr/>
+        <p:txBody>
+          <a:bodyPr/>
+          <a:lstStyle/>
+          <a:p>
+            <a:r>
+              <a:rPr lang="nl-NL" smtClean="0"/>
               <a:t>Bedankt voor jullie aandacht</a:t>
             </a:r>
             <a:endParaRPr lang="nl-NL"/>
@@ -3183,6 +3833,13 @@
   <p:clrMapOvr>
     <a:masterClrMapping/>
   </p:clrMapOvr>
+  <p:timing>
+    <p:tnLst>
+      <p:par>
+        <p:cTn id="1" dur="indefinite" restart="never" nodeType="tmRoot"/>
+      </p:par>
+    </p:tnLst>
+  </p:timing>
 </p:sld>
 </file>
 
@@ -3285,6 +3942,13 @@
   <p:clrMapOvr>
     <a:masterClrMapping/>
   </p:clrMapOvr>
+  <p:timing>
+    <p:tnLst>
+      <p:par>
+        <p:cTn id="1" dur="indefinite" restart="never" nodeType="tmRoot"/>
+      </p:par>
+    </p:tnLst>
+  </p:timing>
 </p:sld>
 </file>
 
@@ -3393,6 +4057,13 @@
   <p:clrMapOvr>
     <a:masterClrMapping/>
   </p:clrMapOvr>
+  <p:timing>
+    <p:tnLst>
+      <p:par>
+        <p:cTn id="1" dur="indefinite" restart="never" nodeType="tmRoot"/>
+      </p:par>
+    </p:tnLst>
+  </p:timing>
 </p:sld>
 </file>
 
@@ -3436,8 +4107,8 @@
           </a:p>
         </p:txBody>
       </p:sp>
-      <mc:AlternateContent xmlns:mc="http://schemas.openxmlformats.org/markup-compatibility/2006">
-        <mc:Choice xmlns:a14="http://schemas.microsoft.com/office/drawing/2010/main" Requires="a14">
+      <mc:AlternateContent xmlns:mc="http://schemas.openxmlformats.org/markup-compatibility/2006" xmlns:a14="http://schemas.microsoft.com/office/drawing/2010/main">
+        <mc:Choice Requires="a14">
           <p:sp>
             <p:nvSpPr>
               <p:cNvPr id="3" name="Tijdelijke aanduiding voor inhoud 2"/>
@@ -3905,7 +4576,7 @@
             </p:txBody>
           </p:sp>
         </mc:Choice>
-        <mc:Fallback>
+        <mc:Fallback xmlns="">
           <p:sp>
             <p:nvSpPr>
               <p:cNvPr id="3" name="Tijdelijke aanduiding voor inhoud 2"/>
@@ -3949,6 +4620,13 @@
   <p:clrMapOvr>
     <a:masterClrMapping/>
   </p:clrMapOvr>
+  <p:timing>
+    <p:tnLst>
+      <p:par>
+        <p:cTn id="1" dur="indefinite" restart="never" nodeType="tmRoot"/>
+      </p:par>
+    </p:tnLst>
+  </p:timing>
 </p:sld>
 </file>
 
@@ -3992,8 +4670,8 @@
           </a:p>
         </p:txBody>
       </p:sp>
-      <mc:AlternateContent xmlns:mc="http://schemas.openxmlformats.org/markup-compatibility/2006">
-        <mc:Choice xmlns:a14="http://schemas.microsoft.com/office/drawing/2010/main" Requires="a14">
+      <mc:AlternateContent xmlns:mc="http://schemas.openxmlformats.org/markup-compatibility/2006" xmlns:a14="http://schemas.microsoft.com/office/drawing/2010/main">
+        <mc:Choice Requires="a14">
           <p:sp>
             <p:nvSpPr>
               <p:cNvPr id="3" name="Tijdelijke aanduiding voor inhoud 2"/>
@@ -4400,7 +5078,7 @@
             </p:txBody>
           </p:sp>
         </mc:Choice>
-        <mc:Fallback>
+        <mc:Fallback xmlns="">
           <p:sp>
             <p:nvSpPr>
               <p:cNvPr id="3" name="Tijdelijke aanduiding voor inhoud 2"/>
@@ -4497,25 +5175,127 @@
             <p:ph idx="1"/>
           </p:nvPr>
         </p:nvSpPr>
-        <p:spPr/>
-        <p:txBody>
-          <a:bodyPr/>
-          <a:lstStyle/>
-          <a:p>
-            <a:r>
-              <a:rPr lang="nl-NL" smtClean="0"/>
-              <a:t>Langzaam model</a:t>
-            </a:r>
-          </a:p>
-          <a:p>
-            <a:r>
-              <a:rPr lang="nl-NL" smtClean="0"/>
-              <a:t>Afschatting </a:t>
-            </a:r>
-            <a:endParaRPr lang="nl-NL"/>
-          </a:p>
-        </p:txBody>
-      </p:sp>
+        <p:spPr>
+          <a:xfrm>
+            <a:off x="838200" y="1825624"/>
+            <a:ext cx="4998156" cy="4676776"/>
+          </a:xfrm>
+        </p:spPr>
+        <p:txBody>
+          <a:bodyPr>
+            <a:normAutofit lnSpcReduction="10000"/>
+          </a:bodyPr>
+          <a:lstStyle/>
+          <a:p>
+            <a:r>
+              <a:rPr lang="nl-NL" dirty="0" smtClean="0"/>
+              <a:t>Langzaam </a:t>
+            </a:r>
+            <a:r>
+              <a:rPr lang="nl-NL" dirty="0" smtClean="0"/>
+              <a:t>model; orde N²</a:t>
+            </a:r>
+          </a:p>
+          <a:p>
+            <a:r>
+              <a:rPr lang="nl-NL" dirty="0" smtClean="0"/>
+              <a:t>Afschatting: deeltjes dicht bij elkaar groeperen</a:t>
+            </a:r>
+          </a:p>
+          <a:p>
+            <a:r>
+              <a:rPr lang="nl-NL" dirty="0" smtClean="0"/>
+              <a:t>Implementatie: ruimte recursief opdelen in kwadranten tot elk deeltje eigen kwadrant heeft</a:t>
+            </a:r>
+          </a:p>
+          <a:p>
+            <a:r>
+              <a:rPr lang="nl-NL" dirty="0" smtClean="0"/>
+              <a:t>Programmeren: Barnes-Hut boom</a:t>
+            </a:r>
+          </a:p>
+          <a:p>
+            <a:r>
+              <a:rPr lang="nl-NL" dirty="0"/>
+              <a:t>Algoritme niet exact</a:t>
+            </a:r>
+            <a:endParaRPr lang="nl-NL" dirty="0" smtClean="0"/>
+          </a:p>
+          <a:p>
+            <a:r>
+              <a:rPr lang="nl-NL" dirty="0" smtClean="0"/>
+              <a:t>orde </a:t>
+            </a:r>
+            <a:r>
+              <a:rPr lang="nl-NL" dirty="0" err="1" smtClean="0"/>
+              <a:t>N·log</a:t>
+            </a:r>
+            <a:r>
+              <a:rPr lang="nl-NL" dirty="0" smtClean="0"/>
+              <a:t>(N)</a:t>
+            </a:r>
+          </a:p>
+        </p:txBody>
+      </p:sp>
+      <p:pic>
+        <p:nvPicPr>
+          <p:cNvPr id="4" name="Afbeelding 3"/>
+          <p:cNvPicPr>
+            <a:picLocks noChangeAspect="1"/>
+          </p:cNvPicPr>
+          <p:nvPr/>
+        </p:nvPicPr>
+        <p:blipFill>
+          <a:blip r:embed="rId2">
+            <a:extLst>
+              <a:ext uri="{28A0092B-C50C-407E-A947-70E740481C1C}">
+                <a14:useLocalDpi xmlns:a14="http://schemas.microsoft.com/office/drawing/2010/main" val="0"/>
+              </a:ext>
+            </a:extLst>
+          </a:blip>
+          <a:stretch>
+            <a:fillRect/>
+          </a:stretch>
+        </p:blipFill>
+        <p:spPr>
+          <a:xfrm>
+            <a:off x="6124149" y="699915"/>
+            <a:ext cx="3933333" cy="3933333"/>
+          </a:xfrm>
+          <a:prstGeom prst="rect">
+            <a:avLst/>
+          </a:prstGeom>
+        </p:spPr>
+      </p:pic>
+      <p:pic>
+        <p:nvPicPr>
+          <p:cNvPr id="5" name="Afbeelding 4"/>
+          <p:cNvPicPr>
+            <a:picLocks noChangeAspect="1"/>
+          </p:cNvPicPr>
+          <p:nvPr/>
+        </p:nvPicPr>
+        <p:blipFill rotWithShape="1">
+          <a:blip r:embed="rId3">
+            <a:extLst>
+              <a:ext uri="{28A0092B-C50C-407E-A947-70E740481C1C}">
+                <a14:useLocalDpi xmlns:a14="http://schemas.microsoft.com/office/drawing/2010/main" val="0"/>
+              </a:ext>
+            </a:extLst>
+          </a:blip>
+          <a:srcRect t="20254"/>
+          <a:stretch/>
+        </p:blipFill>
+        <p:spPr>
+          <a:xfrm>
+            <a:off x="9287719" y="4831645"/>
+            <a:ext cx="2575990" cy="1981200"/>
+          </a:xfrm>
+          <a:prstGeom prst="rect">
+            <a:avLst/>
+          </a:prstGeom>
+        </p:spPr>
+      </p:pic>
     </p:spTree>
     <p:extLst>
       <p:ext uri="{BB962C8B-B14F-4D97-AF65-F5344CB8AC3E}">
@@ -4537,6 +5317,143 @@
 </file>
 
 <file path=ppt/slides/slide7.xml><?xml version="1.0" encoding="utf-8"?>
+<p:sld xmlns:a="http://schemas.openxmlformats.org/drawingml/2006/main" xmlns:r="http://schemas.openxmlformats.org/officeDocument/2006/relationships" xmlns:p="http://schemas.openxmlformats.org/presentationml/2006/main">
+  <p:cSld>
+    <p:spTree>
+      <p:nvGrpSpPr>
+        <p:cNvPr id="1" name=""/>
+        <p:cNvGrpSpPr/>
+        <p:nvPr/>
+      </p:nvGrpSpPr>
+      <p:grpSpPr>
+        <a:xfrm>
+          <a:off x="0" y="0"/>
+          <a:ext cx="0" cy="0"/>
+          <a:chOff x="0" y="0"/>
+          <a:chExt cx="0" cy="0"/>
+        </a:xfrm>
+      </p:grpSpPr>
+      <p:sp>
+        <p:nvSpPr>
+          <p:cNvPr id="2" name="Titel 1"/>
+          <p:cNvSpPr>
+            <a:spLocks noGrp="1"/>
+          </p:cNvSpPr>
+          <p:nvPr>
+            <p:ph type="title"/>
+          </p:nvPr>
+        </p:nvSpPr>
+        <p:spPr/>
+        <p:txBody>
+          <a:bodyPr/>
+          <a:lstStyle/>
+          <a:p>
+            <a:r>
+              <a:rPr lang="nl-NL" dirty="0" smtClean="0"/>
+              <a:t>Barnes-Hut </a:t>
+            </a:r>
+            <a:r>
+              <a:rPr lang="nl-NL" dirty="0" smtClean="0"/>
+              <a:t>voor botsingen</a:t>
+            </a:r>
+            <a:endParaRPr lang="nl-NL" dirty="0"/>
+          </a:p>
+        </p:txBody>
+      </p:sp>
+      <p:sp>
+        <p:nvSpPr>
+          <p:cNvPr id="3" name="Tijdelijke aanduiding voor inhoud 2"/>
+          <p:cNvSpPr>
+            <a:spLocks noGrp="1"/>
+          </p:cNvSpPr>
+          <p:nvPr>
+            <p:ph idx="1"/>
+          </p:nvPr>
+        </p:nvSpPr>
+        <p:spPr>
+          <a:xfrm>
+            <a:off x="838200" y="1791758"/>
+            <a:ext cx="4998156" cy="4654198"/>
+          </a:xfrm>
+        </p:spPr>
+        <p:txBody>
+          <a:bodyPr>
+            <a:normAutofit/>
+          </a:bodyPr>
+          <a:lstStyle/>
+          <a:p>
+            <a:r>
+              <a:rPr lang="nl-NL" dirty="0" smtClean="0"/>
+              <a:t>Langzaam </a:t>
+            </a:r>
+            <a:r>
+              <a:rPr lang="nl-NL" dirty="0" smtClean="0"/>
+              <a:t>model; orde N²</a:t>
+            </a:r>
+            <a:endParaRPr lang="nl-NL" dirty="0" smtClean="0"/>
+          </a:p>
+          <a:p>
+            <a:r>
+              <a:rPr lang="nl-NL" dirty="0" smtClean="0"/>
+              <a:t>Rond elk deeltje rechthoek met grenzen</a:t>
+            </a:r>
+          </a:p>
+          <a:p>
+            <a:r>
+              <a:rPr lang="nl-NL" dirty="0" smtClean="0"/>
+              <a:t>Botsing mogelijk als en slechts als rechthoeken overlappen</a:t>
+            </a:r>
+          </a:p>
+          <a:p>
+            <a:r>
+              <a:rPr lang="nl-NL" dirty="0" smtClean="0"/>
+              <a:t>Barnes-Hut boom: interne takken hebben ruimste rechthoek</a:t>
+            </a:r>
+          </a:p>
+          <a:p>
+            <a:r>
+              <a:rPr lang="nl-NL" dirty="0"/>
+              <a:t>Algoritme wel exact</a:t>
+            </a:r>
+            <a:endParaRPr lang="nl-NL" dirty="0" smtClean="0"/>
+          </a:p>
+          <a:p>
+            <a:r>
+              <a:rPr lang="nl-NL" dirty="0" smtClean="0"/>
+              <a:t>orde </a:t>
+            </a:r>
+            <a:r>
+              <a:rPr lang="nl-NL" dirty="0" err="1" smtClean="0"/>
+              <a:t>N·log</a:t>
+            </a:r>
+            <a:r>
+              <a:rPr lang="nl-NL" dirty="0" smtClean="0"/>
+              <a:t>(N)</a:t>
+            </a:r>
+          </a:p>
+        </p:txBody>
+      </p:sp>
+    </p:spTree>
+    <p:extLst>
+      <p:ext uri="{BB962C8B-B14F-4D97-AF65-F5344CB8AC3E}">
+        <p14:creationId xmlns:p14="http://schemas.microsoft.com/office/powerpoint/2010/main" val="4065502139"/>
+      </p:ext>
+    </p:extLst>
+  </p:cSld>
+  <p:clrMapOvr>
+    <a:masterClrMapping/>
+  </p:clrMapOvr>
+  <p:timing>
+    <p:tnLst>
+      <p:par>
+        <p:cTn id="1" dur="indefinite" restart="never" nodeType="tmRoot"/>
+      </p:par>
+    </p:tnLst>
+  </p:timing>
+</p:sld>
+</file>
+
+<file path=ppt/slides/slide8.xml><?xml version="1.0" encoding="utf-8"?>
 <p:sld xmlns:a="http://schemas.openxmlformats.org/drawingml/2006/main" xmlns:r="http://schemas.openxmlformats.org/officeDocument/2006/relationships" xmlns:p="http://schemas.openxmlformats.org/presentationml/2006/main">
   <p:cSld>
     <p:spTree>
@@ -4656,100 +5573,6 @@
 </p:sld>
 </file>
 
-<file path=ppt/slides/slide8.xml><?xml version="1.0" encoding="utf-8"?>
-<p:sld xmlns:a="http://schemas.openxmlformats.org/drawingml/2006/main" xmlns:r="http://schemas.openxmlformats.org/officeDocument/2006/relationships" xmlns:p="http://schemas.openxmlformats.org/presentationml/2006/main">
-  <p:cSld>
-    <p:spTree>
-      <p:nvGrpSpPr>
-        <p:cNvPr id="1" name=""/>
-        <p:cNvGrpSpPr/>
-        <p:nvPr/>
-      </p:nvGrpSpPr>
-      <p:grpSpPr>
-        <a:xfrm>
-          <a:off x="0" y="0"/>
-          <a:ext cx="0" cy="0"/>
-          <a:chOff x="0" y="0"/>
-          <a:chExt cx="0" cy="0"/>
-        </a:xfrm>
-      </p:grpSpPr>
-      <p:sp>
-        <p:nvSpPr>
-          <p:cNvPr id="2" name="Titel 1"/>
-          <p:cNvSpPr>
-            <a:spLocks noGrp="1"/>
-          </p:cNvSpPr>
-          <p:nvPr>
-            <p:ph type="title"/>
-          </p:nvPr>
-        </p:nvSpPr>
-        <p:spPr/>
-        <p:txBody>
-          <a:bodyPr/>
-          <a:lstStyle/>
-          <a:p>
-            <a:r>
-              <a:rPr lang="nl-NL" smtClean="0"/>
-              <a:t>Nauwkeurigheid model</a:t>
-            </a:r>
-            <a:endParaRPr lang="nl-NL"/>
-          </a:p>
-        </p:txBody>
-      </p:sp>
-      <p:sp>
-        <p:nvSpPr>
-          <p:cNvPr id="3" name="Tijdelijke aanduiding voor inhoud 2"/>
-          <p:cNvSpPr>
-            <a:spLocks noGrp="1"/>
-          </p:cNvSpPr>
-          <p:nvPr>
-            <p:ph idx="1"/>
-          </p:nvPr>
-        </p:nvSpPr>
-        <p:spPr/>
-        <p:txBody>
-          <a:bodyPr/>
-          <a:lstStyle/>
-          <a:p>
-            <a:r>
-              <a:rPr lang="nl-NL" smtClean="0"/>
-              <a:t>Analyse voor N=2</a:t>
-            </a:r>
-          </a:p>
-          <a:p>
-            <a:r>
-              <a:rPr lang="nl-NL" smtClean="0"/>
-              <a:t>Behoud van energie</a:t>
-            </a:r>
-          </a:p>
-          <a:p>
-            <a:r>
-              <a:rPr lang="nl-NL" smtClean="0"/>
-              <a:t>Richardson Extrapolatie</a:t>
-            </a:r>
-          </a:p>
-        </p:txBody>
-      </p:sp>
-    </p:spTree>
-    <p:extLst>
-      <p:ext uri="{BB962C8B-B14F-4D97-AF65-F5344CB8AC3E}">
-        <p14:creationId xmlns:p14="http://schemas.microsoft.com/office/powerpoint/2010/main" val="120385941"/>
-      </p:ext>
-    </p:extLst>
-  </p:cSld>
-  <p:clrMapOvr>
-    <a:masterClrMapping/>
-  </p:clrMapOvr>
-  <p:timing>
-    <p:tnLst>
-      <p:par>
-        <p:cTn id="1" dur="indefinite" restart="never" nodeType="tmRoot"/>
-      </p:par>
-    </p:tnLst>
-  </p:timing>
-</p:sld>
-</file>
-
 <file path=ppt/slides/slide9.xml><?xml version="1.0" encoding="utf-8"?>
 <p:sld xmlns:a="http://schemas.openxmlformats.org/drawingml/2006/main" xmlns:r="http://schemas.openxmlformats.org/officeDocument/2006/relationships" xmlns:p="http://schemas.openxmlformats.org/presentationml/2006/main">
   <p:cSld>
@@ -4767,35 +5590,6 @@
           <a:chExt cx="0" cy="0"/>
         </a:xfrm>
       </p:grpSpPr>
-      <p:pic>
-        <p:nvPicPr>
-          <p:cNvPr id="4" name="Tijdelijke aanduiding voor inhoud 3"/>
-          <p:cNvPicPr>
-            <a:picLocks noGrp="1" noChangeAspect="1"/>
-          </p:cNvPicPr>
-          <p:nvPr>
-            <p:ph idx="1"/>
-          </p:nvPr>
-        </p:nvPicPr>
-        <p:blipFill>
-          <a:blip r:embed="rId2">
-            <a:extLst>
-              <a:ext uri="{28A0092B-C50C-407E-A947-70E740481C1C}">
-                <a14:useLocalDpi xmlns:a14="http://schemas.microsoft.com/office/drawing/2010/main" val="0"/>
-              </a:ext>
-            </a:extLst>
-          </a:blip>
-          <a:stretch>
-            <a:fillRect/>
-          </a:stretch>
-        </p:blipFill>
-        <p:spPr>
-          <a:xfrm>
-            <a:off x="5819064" y="631056"/>
-            <a:ext cx="5512312" cy="4644377"/>
-          </a:xfrm>
-        </p:spPr>
-      </p:pic>
       <p:sp>
         <p:nvSpPr>
           <p:cNvPr id="2" name="Titel 1"/>
@@ -4821,548 +5615,42 @@
       </p:sp>
       <p:sp>
         <p:nvSpPr>
-          <p:cNvPr id="5" name="Tijdelijke aanduiding voor inhoud 2"/>
-          <p:cNvSpPr txBox="1">
-            <a:spLocks/>
-          </p:cNvSpPr>
-          <p:nvPr/>
-        </p:nvSpPr>
-        <p:spPr>
-          <a:xfrm>
-            <a:off x="838200" y="1825625"/>
-            <a:ext cx="5408054" cy="4351338"/>
-          </a:xfrm>
-          <a:prstGeom prst="rect">
-            <a:avLst/>
-          </a:prstGeom>
-        </p:spPr>
-        <p:txBody>
-          <a:bodyPr vert="horz" lIns="91440" tIns="45720" rIns="91440" bIns="45720" rtlCol="0">
-            <a:normAutofit/>
-          </a:bodyPr>
-          <a:lstStyle>
-            <a:lvl1pPr marL="228600" indent="-228600" algn="l" defTabSz="914400" rtl="0" eaLnBrk="1" latinLnBrk="0" hangingPunct="1">
-              <a:lnSpc>
-                <a:spcPct val="90000"/>
-              </a:lnSpc>
-              <a:spcBef>
-                <a:spcPts val="1000"/>
-              </a:spcBef>
-              <a:buFont typeface="Arial" panose="020B0604020202020204" pitchFamily="34" charset="0"/>
-              <a:buChar char="•"/>
-              <a:defRPr sz="2800" kern="1200">
-                <a:solidFill>
-                  <a:schemeClr val="tx1"/>
-                </a:solidFill>
-                <a:latin typeface="+mn-lt"/>
-                <a:ea typeface="+mn-ea"/>
-                <a:cs typeface="+mn-cs"/>
-              </a:defRPr>
-            </a:lvl1pPr>
-            <a:lvl2pPr marL="685800" indent="-228600" algn="l" defTabSz="914400" rtl="0" eaLnBrk="1" latinLnBrk="0" hangingPunct="1">
-              <a:lnSpc>
-                <a:spcPct val="90000"/>
-              </a:lnSpc>
-              <a:spcBef>
-                <a:spcPts val="500"/>
-              </a:spcBef>
-              <a:buFont typeface="Arial" panose="020B0604020202020204" pitchFamily="34" charset="0"/>
-              <a:buChar char="•"/>
-              <a:defRPr sz="2400" kern="1200">
-                <a:solidFill>
-                  <a:schemeClr val="tx1"/>
-                </a:solidFill>
-                <a:latin typeface="+mn-lt"/>
-                <a:ea typeface="+mn-ea"/>
-                <a:cs typeface="+mn-cs"/>
-              </a:defRPr>
-            </a:lvl2pPr>
-            <a:lvl3pPr marL="1143000" indent="-228600" algn="l" defTabSz="914400" rtl="0" eaLnBrk="1" latinLnBrk="0" hangingPunct="1">
-              <a:lnSpc>
-                <a:spcPct val="90000"/>
-              </a:lnSpc>
-              <a:spcBef>
-                <a:spcPts val="500"/>
-              </a:spcBef>
-              <a:buFont typeface="Arial" panose="020B0604020202020204" pitchFamily="34" charset="0"/>
-              <a:buChar char="•"/>
-              <a:defRPr sz="2000" kern="1200">
-                <a:solidFill>
-                  <a:schemeClr val="tx1"/>
-                </a:solidFill>
-                <a:latin typeface="+mn-lt"/>
-                <a:ea typeface="+mn-ea"/>
-                <a:cs typeface="+mn-cs"/>
-              </a:defRPr>
-            </a:lvl3pPr>
-            <a:lvl4pPr marL="1600200" indent="-228600" algn="l" defTabSz="914400" rtl="0" eaLnBrk="1" latinLnBrk="0" hangingPunct="1">
-              <a:lnSpc>
-                <a:spcPct val="90000"/>
-              </a:lnSpc>
-              <a:spcBef>
-                <a:spcPts val="500"/>
-              </a:spcBef>
-              <a:buFont typeface="Arial" panose="020B0604020202020204" pitchFamily="34" charset="0"/>
-              <a:buChar char="•"/>
-              <a:defRPr sz="1800" kern="1200">
-                <a:solidFill>
-                  <a:schemeClr val="tx1"/>
-                </a:solidFill>
-                <a:latin typeface="+mn-lt"/>
-                <a:ea typeface="+mn-ea"/>
-                <a:cs typeface="+mn-cs"/>
-              </a:defRPr>
-            </a:lvl4pPr>
-            <a:lvl5pPr marL="2057400" indent="-228600" algn="l" defTabSz="914400" rtl="0" eaLnBrk="1" latinLnBrk="0" hangingPunct="1">
-              <a:lnSpc>
-                <a:spcPct val="90000"/>
-              </a:lnSpc>
-              <a:spcBef>
-                <a:spcPts val="500"/>
-              </a:spcBef>
-              <a:buFont typeface="Arial" panose="020B0604020202020204" pitchFamily="34" charset="0"/>
-              <a:buChar char="•"/>
-              <a:defRPr sz="1800" kern="1200">
-                <a:solidFill>
-                  <a:schemeClr val="tx1"/>
-                </a:solidFill>
-                <a:latin typeface="+mn-lt"/>
-                <a:ea typeface="+mn-ea"/>
-                <a:cs typeface="+mn-cs"/>
-              </a:defRPr>
-            </a:lvl5pPr>
-            <a:lvl6pPr marL="2514600" indent="-228600" algn="l" defTabSz="914400" rtl="0" eaLnBrk="1" latinLnBrk="0" hangingPunct="1">
-              <a:lnSpc>
-                <a:spcPct val="90000"/>
-              </a:lnSpc>
-              <a:spcBef>
-                <a:spcPts val="500"/>
-              </a:spcBef>
-              <a:buFont typeface="Arial" panose="020B0604020202020204" pitchFamily="34" charset="0"/>
-              <a:buChar char="•"/>
-              <a:defRPr sz="1800" kern="1200">
-                <a:solidFill>
-                  <a:schemeClr val="tx1"/>
-                </a:solidFill>
-                <a:latin typeface="+mn-lt"/>
-                <a:ea typeface="+mn-ea"/>
-                <a:cs typeface="+mn-cs"/>
-              </a:defRPr>
-            </a:lvl6pPr>
-            <a:lvl7pPr marL="2971800" indent="-228600" algn="l" defTabSz="914400" rtl="0" eaLnBrk="1" latinLnBrk="0" hangingPunct="1">
-              <a:lnSpc>
-                <a:spcPct val="90000"/>
-              </a:lnSpc>
-              <a:spcBef>
-                <a:spcPts val="500"/>
-              </a:spcBef>
-              <a:buFont typeface="Arial" panose="020B0604020202020204" pitchFamily="34" charset="0"/>
-              <a:buChar char="•"/>
-              <a:defRPr sz="1800" kern="1200">
-                <a:solidFill>
-                  <a:schemeClr val="tx1"/>
-                </a:solidFill>
-                <a:latin typeface="+mn-lt"/>
-                <a:ea typeface="+mn-ea"/>
-                <a:cs typeface="+mn-cs"/>
-              </a:defRPr>
-            </a:lvl7pPr>
-            <a:lvl8pPr marL="3429000" indent="-228600" algn="l" defTabSz="914400" rtl="0" eaLnBrk="1" latinLnBrk="0" hangingPunct="1">
-              <a:lnSpc>
-                <a:spcPct val="90000"/>
-              </a:lnSpc>
-              <a:spcBef>
-                <a:spcPts val="500"/>
-              </a:spcBef>
-              <a:buFont typeface="Arial" panose="020B0604020202020204" pitchFamily="34" charset="0"/>
-              <a:buChar char="•"/>
-              <a:defRPr sz="1800" kern="1200">
-                <a:solidFill>
-                  <a:schemeClr val="tx1"/>
-                </a:solidFill>
-                <a:latin typeface="+mn-lt"/>
-                <a:ea typeface="+mn-ea"/>
-                <a:cs typeface="+mn-cs"/>
-              </a:defRPr>
-            </a:lvl8pPr>
-            <a:lvl9pPr marL="3886200" indent="-228600" algn="l" defTabSz="914400" rtl="0" eaLnBrk="1" latinLnBrk="0" hangingPunct="1">
-              <a:lnSpc>
-                <a:spcPct val="90000"/>
-              </a:lnSpc>
-              <a:spcBef>
-                <a:spcPts val="500"/>
-              </a:spcBef>
-              <a:buFont typeface="Arial" panose="020B0604020202020204" pitchFamily="34" charset="0"/>
-              <a:buChar char="•"/>
-              <a:defRPr sz="1800" kern="1200">
-                <a:solidFill>
-                  <a:schemeClr val="tx1"/>
-                </a:solidFill>
-                <a:latin typeface="+mn-lt"/>
-                <a:ea typeface="+mn-ea"/>
-                <a:cs typeface="+mn-cs"/>
-              </a:defRPr>
-            </a:lvl9pPr>
-          </a:lstStyle>
+          <p:cNvPr id="3" name="Tijdelijke aanduiding voor inhoud 2"/>
+          <p:cNvSpPr>
+            <a:spLocks noGrp="1"/>
+          </p:cNvSpPr>
+          <p:nvPr>
+            <p:ph idx="1"/>
+          </p:nvPr>
+        </p:nvSpPr>
+        <p:spPr/>
+        <p:txBody>
+          <a:bodyPr/>
+          <a:lstStyle/>
           <a:p>
             <a:r>
               <a:rPr lang="nl-NL" smtClean="0"/>
-              <a:t>Planeten minder dan 1AU onnauwkeurig </a:t>
+              <a:t>Analyse voor N=2</a:t>
             </a:r>
           </a:p>
           <a:p>
             <a:r>
               <a:rPr lang="nl-NL" smtClean="0"/>
-              <a:t>Omlooptijd te kort voor dt=1 maand</a:t>
+              <a:t>Behoud van energie</a:t>
             </a:r>
           </a:p>
           <a:p>
             <a:r>
               <a:rPr lang="nl-NL" smtClean="0"/>
-              <a:t>Energie niet behouden</a:t>
-            </a:r>
-          </a:p>
-        </p:txBody>
-      </p:sp>
-      <p:graphicFrame>
-        <p:nvGraphicFramePr>
-          <p:cNvPr id="6" name="Tabel 5"/>
-          <p:cNvGraphicFramePr>
-            <a:graphicFrameLocks noGrp="1"/>
-          </p:cNvGraphicFramePr>
-          <p:nvPr>
-            <p:extLst>
-              <p:ext uri="{D42A27DB-BD31-4B8C-83A1-F6EECF244321}">
-                <p14:modId xmlns:p14="http://schemas.microsoft.com/office/powerpoint/2010/main" val="3826835587"/>
-              </p:ext>
-            </p:extLst>
-          </p:nvPr>
-        </p:nvGraphicFramePr>
-        <p:xfrm>
-          <a:off x="447901" y="5640947"/>
-          <a:ext cx="11190312" cy="775236"/>
-        </p:xfrm>
-        <a:graphic>
-          <a:graphicData uri="http://schemas.openxmlformats.org/drawingml/2006/table">
-            <a:tbl>
-              <a:tblPr firstRow="1" bandRow="1">
-                <a:tableStyleId>{5C22544A-7EE6-4342-B048-85BDC9FD1C3A}</a:tableStyleId>
-              </a:tblPr>
-              <a:tblGrid>
-                <a:gridCol w="1398789"/>
-                <a:gridCol w="1398789"/>
-                <a:gridCol w="1398789"/>
-                <a:gridCol w="1398789"/>
-                <a:gridCol w="1398789"/>
-                <a:gridCol w="1398789"/>
-                <a:gridCol w="1398789"/>
-                <a:gridCol w="1398789"/>
-              </a:tblGrid>
-              <a:tr h="404396">
-                <a:tc>
-                  <a:txBody>
-                    <a:bodyPr/>
-                    <a:lstStyle/>
-                    <a:p>
-                      <a:pPr algn="ctr"/>
-                      <a:r>
-                        <a:rPr lang="nl-NL" smtClean="0"/>
-                        <a:t>k-de</a:t>
-                      </a:r>
-                      <a:r>
-                        <a:rPr lang="nl-NL" baseline="0" smtClean="0"/>
-                        <a:t> tijdstip</a:t>
-                      </a:r>
-                      <a:endParaRPr lang="nl-NL"/>
-                    </a:p>
-                  </a:txBody>
-                  <a:tcPr/>
-                </a:tc>
-                <a:tc>
-                  <a:txBody>
-                    <a:bodyPr/>
-                    <a:lstStyle/>
-                    <a:p>
-                      <a:pPr algn="ctr"/>
-                      <a:r>
-                        <a:rPr lang="nl-NL" smtClean="0"/>
-                        <a:t>0</a:t>
-                      </a:r>
-                      <a:endParaRPr lang="nl-NL"/>
-                    </a:p>
-                  </a:txBody>
-                  <a:tcPr/>
-                </a:tc>
-                <a:tc>
-                  <a:txBody>
-                    <a:bodyPr/>
-                    <a:lstStyle/>
-                    <a:p>
-                      <a:pPr algn="ctr"/>
-                      <a:r>
-                        <a:rPr lang="nl-NL" smtClean="0"/>
-                        <a:t>20</a:t>
-                      </a:r>
-                      <a:endParaRPr lang="nl-NL"/>
-                    </a:p>
-                  </a:txBody>
-                  <a:tcPr anchor="ctr"/>
-                </a:tc>
-                <a:tc>
-                  <a:txBody>
-                    <a:bodyPr/>
-                    <a:lstStyle/>
-                    <a:p>
-                      <a:pPr algn="ctr"/>
-                      <a:r>
-                        <a:rPr lang="nl-NL" smtClean="0"/>
-                        <a:t>40</a:t>
-                      </a:r>
-                      <a:endParaRPr lang="nl-NL"/>
-                    </a:p>
-                  </a:txBody>
-                  <a:tcPr/>
-                </a:tc>
-                <a:tc>
-                  <a:txBody>
-                    <a:bodyPr/>
-                    <a:lstStyle/>
-                    <a:p>
-                      <a:pPr algn="ctr"/>
-                      <a:r>
-                        <a:rPr lang="nl-NL" smtClean="0"/>
-                        <a:t>60</a:t>
-                      </a:r>
-                      <a:endParaRPr lang="nl-NL"/>
-                    </a:p>
-                  </a:txBody>
-                  <a:tcPr/>
-                </a:tc>
-                <a:tc>
-                  <a:txBody>
-                    <a:bodyPr/>
-                    <a:lstStyle/>
-                    <a:p>
-                      <a:pPr algn="ctr"/>
-                      <a:r>
-                        <a:rPr lang="nl-NL" smtClean="0"/>
-                        <a:t>80</a:t>
-                      </a:r>
-                      <a:endParaRPr lang="nl-NL"/>
-                    </a:p>
-                  </a:txBody>
-                  <a:tcPr/>
-                </a:tc>
-                <a:tc>
-                  <a:txBody>
-                    <a:bodyPr/>
-                    <a:lstStyle/>
-                    <a:p>
-                      <a:pPr algn="ctr"/>
-                      <a:r>
-                        <a:rPr lang="nl-NL" smtClean="0"/>
-                        <a:t>100</a:t>
-                      </a:r>
-                      <a:endParaRPr lang="nl-NL"/>
-                    </a:p>
-                  </a:txBody>
-                  <a:tcPr/>
-                </a:tc>
-                <a:tc>
-                  <a:txBody>
-                    <a:bodyPr/>
-                    <a:lstStyle/>
-                    <a:p>
-                      <a:pPr algn="ctr"/>
-                      <a:r>
-                        <a:rPr lang="nl-NL" smtClean="0"/>
-                        <a:t>120</a:t>
-                      </a:r>
-                      <a:endParaRPr lang="nl-NL"/>
-                    </a:p>
-                  </a:txBody>
-                  <a:tcPr/>
-                </a:tc>
-              </a:tr>
-              <a:tr h="370840">
-                <a:tc>
-                  <a:txBody>
-                    <a:bodyPr/>
-                    <a:lstStyle/>
-                    <a:p>
-                      <a:pPr algn="ctr"/>
-                      <a:r>
-                        <a:rPr lang="nl-NL" smtClean="0"/>
-                        <a:t>Energie</a:t>
-                      </a:r>
-                      <a:endParaRPr lang="nl-NL"/>
-                    </a:p>
-                  </a:txBody>
-                  <a:tcPr/>
-                </a:tc>
-                <a:tc>
-                  <a:txBody>
-                    <a:bodyPr/>
-                    <a:lstStyle/>
-                    <a:p>
-                      <a:pPr algn="ctr"/>
-                      <a:r>
-                        <a:rPr lang="nl-NL" sz="1800" b="0" i="0" u="none" strike="noStrike" kern="1200" baseline="0" smtClean="0">
-                          <a:solidFill>
-                            <a:schemeClr val="dk1"/>
-                          </a:solidFill>
-                          <a:latin typeface="+mn-lt"/>
-                          <a:ea typeface="+mn-ea"/>
-                          <a:cs typeface="+mn-cs"/>
-                        </a:rPr>
-                        <a:t>-0.4080</a:t>
-                      </a:r>
-                      <a:endParaRPr lang="nl-NL"/>
-                    </a:p>
-                  </a:txBody>
-                  <a:tcPr/>
-                </a:tc>
-                <a:tc>
-                  <a:txBody>
-                    <a:bodyPr/>
-                    <a:lstStyle/>
-                    <a:p>
-                      <a:pPr algn="ctr"/>
-                      <a:r>
-                        <a:rPr lang="nl-NL" sz="1800" b="0" i="0" u="none" strike="noStrike" kern="1200" baseline="0" smtClean="0">
-                          <a:solidFill>
-                            <a:schemeClr val="dk1"/>
-                          </a:solidFill>
-                          <a:latin typeface="+mn-lt"/>
-                          <a:ea typeface="+mn-ea"/>
-                          <a:cs typeface="+mn-cs"/>
-                        </a:rPr>
-                        <a:t>-0.3539</a:t>
-                      </a:r>
-                      <a:endParaRPr lang="nl-NL"/>
-                    </a:p>
-                  </a:txBody>
-                  <a:tcPr/>
-                </a:tc>
-                <a:tc>
-                  <a:txBody>
-                    <a:bodyPr/>
-                    <a:lstStyle/>
-                    <a:p>
-                      <a:pPr algn="ctr"/>
-                      <a:r>
-                        <a:rPr lang="nl-NL" sz="1800" b="0" i="0" u="none" strike="noStrike" kern="1200" baseline="0" smtClean="0">
-                          <a:solidFill>
-                            <a:schemeClr val="dk1"/>
-                          </a:solidFill>
-                          <a:latin typeface="+mn-lt"/>
-                          <a:ea typeface="+mn-ea"/>
-                          <a:cs typeface="+mn-cs"/>
-                        </a:rPr>
-                        <a:t>-0.3630</a:t>
-                      </a:r>
-                      <a:endParaRPr lang="nl-NL"/>
-                    </a:p>
-                  </a:txBody>
-                  <a:tcPr/>
-                </a:tc>
-                <a:tc>
-                  <a:txBody>
-                    <a:bodyPr/>
-                    <a:lstStyle/>
-                    <a:p>
-                      <a:pPr algn="ctr"/>
-                      <a:r>
-                        <a:rPr lang="nl-NL" sz="1800" b="0" i="0" u="none" strike="noStrike" kern="1200" baseline="0" smtClean="0">
-                          <a:solidFill>
-                            <a:schemeClr val="dk1"/>
-                          </a:solidFill>
-                          <a:latin typeface="+mn-lt"/>
-                          <a:ea typeface="+mn-ea"/>
-                          <a:cs typeface="+mn-cs"/>
-                        </a:rPr>
-                        <a:t>-0.3643</a:t>
-                      </a:r>
-                      <a:endParaRPr lang="nl-NL"/>
-                    </a:p>
-                  </a:txBody>
-                  <a:tcPr/>
-                </a:tc>
-                <a:tc>
-                  <a:txBody>
-                    <a:bodyPr/>
-                    <a:lstStyle/>
-                    <a:p>
-                      <a:pPr algn="ctr"/>
-                      <a:r>
-                        <a:rPr lang="nl-NL" sz="1800" b="0" i="0" u="none" strike="noStrike" kern="1200" baseline="0" smtClean="0">
-                          <a:solidFill>
-                            <a:schemeClr val="dk1"/>
-                          </a:solidFill>
-                          <a:latin typeface="+mn-lt"/>
-                          <a:ea typeface="+mn-ea"/>
-                          <a:cs typeface="+mn-cs"/>
-                        </a:rPr>
-                        <a:t>-0.3543</a:t>
-                      </a:r>
-                      <a:endParaRPr lang="nl-NL"/>
-                    </a:p>
-                  </a:txBody>
-                  <a:tcPr/>
-                </a:tc>
-                <a:tc>
-                  <a:txBody>
-                    <a:bodyPr/>
-                    <a:lstStyle/>
-                    <a:p>
-                      <a:pPr algn="ctr"/>
-                      <a:r>
-                        <a:rPr lang="nl-NL" sz="1800" b="0" i="0" u="none" strike="noStrike" kern="1200" baseline="0" smtClean="0">
-                          <a:solidFill>
-                            <a:schemeClr val="dk1"/>
-                          </a:solidFill>
-                          <a:latin typeface="+mn-lt"/>
-                          <a:ea typeface="+mn-ea"/>
-                          <a:cs typeface="+mn-cs"/>
-                        </a:rPr>
-                        <a:t>-0.3700</a:t>
-                      </a:r>
-                      <a:endParaRPr lang="nl-NL"/>
-                    </a:p>
-                  </a:txBody>
-                  <a:tcPr/>
-                </a:tc>
-                <a:tc>
-                  <a:txBody>
-                    <a:bodyPr/>
-                    <a:lstStyle/>
-                    <a:p>
-                      <a:pPr algn="ctr"/>
-                      <a:r>
-                        <a:rPr lang="nl-NL" sz="1800" b="0" i="0" u="none" strike="noStrike" kern="1200" baseline="0" smtClean="0">
-                          <a:solidFill>
-                            <a:schemeClr val="dk1"/>
-                          </a:solidFill>
-                          <a:latin typeface="+mn-lt"/>
-                          <a:ea typeface="+mn-ea"/>
-                          <a:cs typeface="+mn-cs"/>
-                        </a:rPr>
-                        <a:t>-0.4080</a:t>
-                      </a:r>
-                      <a:endParaRPr lang="nl-NL"/>
-                    </a:p>
-                  </a:txBody>
-                  <a:tcPr/>
-                </a:tc>
-              </a:tr>
-            </a:tbl>
-          </a:graphicData>
-        </a:graphic>
-      </p:graphicFrame>
+              <a:t>Richardson Extrapolatie</a:t>
+            </a:r>
+          </a:p>
+        </p:txBody>
+      </p:sp>
     </p:spTree>
     <p:extLst>
       <p:ext uri="{BB962C8B-B14F-4D97-AF65-F5344CB8AC3E}">
-        <p14:creationId xmlns:p14="http://schemas.microsoft.com/office/powerpoint/2010/main" val="2513868334"/>
+        <p14:creationId xmlns:p14="http://schemas.microsoft.com/office/powerpoint/2010/main" val="120385941"/>
       </p:ext>
     </p:extLst>
   </p:cSld>
@@ -5668,7 +5956,7 @@
   <a:extraClrSchemeLst/>
   <a:extLst>
     <a:ext uri="{05A4C25C-085E-4340-85A3-A5531E510DB2}">
-      <thm15:themeFamily xmlns:thm15="http://schemas.microsoft.com/office/thememl/2012/main" xmlns="" name="Office Theme" id="{62F939B6-93AF-4DB8-9C6B-D6C7DFDC589F}" vid="{4A3C46E8-61CC-4603-A589-7422A47A8E4A}"/>
+      <thm15:themeFamily xmlns="" xmlns:thm15="http://schemas.microsoft.com/office/thememl/2012/main" name="Office Theme" id="{62F939B6-93AF-4DB8-9C6B-D6C7DFDC589F}" vid="{4A3C46E8-61CC-4603-A589-7422A47A8E4A}"/>
     </a:ext>
   </a:extLst>
 </a:theme>

</xml_diff>

<commit_message>
leapfrog gedeelte presentatie aangepast
</commit_message>
<xml_diff>
--- a/Presentatie/Presentatie.pptx
+++ b/Presentatie/Presentatie.pptx
@@ -4,6 +4,9 @@
   <p:sldMasterIdLst>
     <p:sldMasterId id="2147483678" r:id="rId1"/>
   </p:sldMasterIdLst>
+  <p:notesMasterIdLst>
+    <p:notesMasterId r:id="rId17"/>
+  </p:notesMasterIdLst>
   <p:sldIdLst>
     <p:sldId id="256" r:id="rId2"/>
     <p:sldId id="257" r:id="rId3"/>
@@ -11,13 +14,15 @@
     <p:sldId id="259" r:id="rId5"/>
     <p:sldId id="260" r:id="rId6"/>
     <p:sldId id="267" r:id="rId7"/>
-    <p:sldId id="268" r:id="rId8"/>
-    <p:sldId id="262" r:id="rId9"/>
-    <p:sldId id="263" r:id="rId10"/>
-    <p:sldId id="266" r:id="rId11"/>
-    <p:sldId id="270" r:id="rId12"/>
-    <p:sldId id="264" r:id="rId13"/>
-    <p:sldId id="265" r:id="rId14"/>
+    <p:sldId id="273" r:id="rId8"/>
+    <p:sldId id="268" r:id="rId9"/>
+    <p:sldId id="262" r:id="rId10"/>
+    <p:sldId id="263" r:id="rId11"/>
+    <p:sldId id="266" r:id="rId12"/>
+    <p:sldId id="271" r:id="rId13"/>
+    <p:sldId id="270" r:id="rId14"/>
+    <p:sldId id="264" r:id="rId15"/>
+    <p:sldId id="265" r:id="rId16"/>
   </p:sldIdLst>
   <p:sldSz cx="12192000" cy="6858000"/>
   <p:notesSz cx="6858000" cy="9144000"/>
@@ -118,7 +123,7 @@
   </p:defaultTextStyle>
   <p:extLst>
     <p:ext uri="{EFAFB233-063F-42B5-8137-9DF3F51BA10A}">
-      <p15:sldGuideLst xmlns:p15="http://schemas.microsoft.com/office/powerpoint/2012/main" xmlns="">
+      <p15:sldGuideLst xmlns="" xmlns:p15="http://schemas.microsoft.com/office/powerpoint/2012/main">
         <p15:guide id="1" orient="horz" pos="2160">
           <p15:clr>
             <a:srgbClr val="A4A3A4"/>
@@ -133,6 +138,461 @@
     </p:ext>
   </p:extLst>
 </p:presentation>
+</file>
+
+<file path=ppt/notesMasters/notesMaster1.xml><?xml version="1.0" encoding="utf-8"?>
+<p:notesMaster xmlns:a="http://schemas.openxmlformats.org/drawingml/2006/main" xmlns:r="http://schemas.openxmlformats.org/officeDocument/2006/relationships" xmlns:p="http://schemas.openxmlformats.org/presentationml/2006/main">
+  <p:cSld>
+    <p:bg>
+      <p:bgRef idx="1001">
+        <a:schemeClr val="bg1"/>
+      </p:bgRef>
+    </p:bg>
+    <p:spTree>
+      <p:nvGrpSpPr>
+        <p:cNvPr id="1" name=""/>
+        <p:cNvGrpSpPr/>
+        <p:nvPr/>
+      </p:nvGrpSpPr>
+      <p:grpSpPr>
+        <a:xfrm>
+          <a:off x="0" y="0"/>
+          <a:ext cx="0" cy="0"/>
+          <a:chOff x="0" y="0"/>
+          <a:chExt cx="0" cy="0"/>
+        </a:xfrm>
+      </p:grpSpPr>
+      <p:sp>
+        <p:nvSpPr>
+          <p:cNvPr id="2" name="Tijdelijke aanduiding voor koptekst 1"/>
+          <p:cNvSpPr>
+            <a:spLocks noGrp="1"/>
+          </p:cNvSpPr>
+          <p:nvPr>
+            <p:ph type="hdr" sz="quarter"/>
+          </p:nvPr>
+        </p:nvSpPr>
+        <p:spPr>
+          <a:xfrm>
+            <a:off x="0" y="0"/>
+            <a:ext cx="2971800" cy="457200"/>
+          </a:xfrm>
+          <a:prstGeom prst="rect">
+            <a:avLst/>
+          </a:prstGeom>
+        </p:spPr>
+        <p:txBody>
+          <a:bodyPr vert="horz" lIns="91440" tIns="45720" rIns="91440" bIns="45720" rtlCol="0"/>
+          <a:lstStyle>
+            <a:lvl1pPr algn="l">
+              <a:defRPr sz="1200"/>
+            </a:lvl1pPr>
+          </a:lstStyle>
+          <a:p>
+            <a:endParaRPr lang="nl-NL"/>
+          </a:p>
+        </p:txBody>
+      </p:sp>
+      <p:sp>
+        <p:nvSpPr>
+          <p:cNvPr id="3" name="Tijdelijke aanduiding voor datum 2"/>
+          <p:cNvSpPr>
+            <a:spLocks noGrp="1"/>
+          </p:cNvSpPr>
+          <p:nvPr>
+            <p:ph type="dt" idx="1"/>
+          </p:nvPr>
+        </p:nvSpPr>
+        <p:spPr>
+          <a:xfrm>
+            <a:off x="3884613" y="0"/>
+            <a:ext cx="2971800" cy="457200"/>
+          </a:xfrm>
+          <a:prstGeom prst="rect">
+            <a:avLst/>
+          </a:prstGeom>
+        </p:spPr>
+        <p:txBody>
+          <a:bodyPr vert="horz" lIns="91440" tIns="45720" rIns="91440" bIns="45720" rtlCol="0"/>
+          <a:lstStyle>
+            <a:lvl1pPr algn="r">
+              <a:defRPr sz="1200"/>
+            </a:lvl1pPr>
+          </a:lstStyle>
+          <a:p>
+            <a:fld id="{5F2BFC91-6838-42FB-B20E-402D536CBC41}" type="datetimeFigureOut">
+              <a:rPr lang="nl-NL" smtClean="0"/>
+              <a:t>8-6-2017</a:t>
+            </a:fld>
+            <a:endParaRPr lang="nl-NL"/>
+          </a:p>
+        </p:txBody>
+      </p:sp>
+      <p:sp>
+        <p:nvSpPr>
+          <p:cNvPr id="4" name="Tijdelijke aanduiding voor dia-afbeelding 3"/>
+          <p:cNvSpPr>
+            <a:spLocks noGrp="1" noRot="1" noChangeAspect="1"/>
+          </p:cNvSpPr>
+          <p:nvPr>
+            <p:ph type="sldImg" idx="2"/>
+          </p:nvPr>
+        </p:nvSpPr>
+        <p:spPr>
+          <a:xfrm>
+            <a:off x="381000" y="685800"/>
+            <a:ext cx="6096000" cy="3429000"/>
+          </a:xfrm>
+          <a:prstGeom prst="rect">
+            <a:avLst/>
+          </a:prstGeom>
+          <a:noFill/>
+          <a:ln w="12700">
+            <a:solidFill>
+              <a:prstClr val="black"/>
+            </a:solidFill>
+          </a:ln>
+        </p:spPr>
+        <p:txBody>
+          <a:bodyPr vert="horz" lIns="91440" tIns="45720" rIns="91440" bIns="45720" rtlCol="0" anchor="ctr"/>
+          <a:lstStyle/>
+          <a:p>
+            <a:endParaRPr lang="nl-NL"/>
+          </a:p>
+        </p:txBody>
+      </p:sp>
+      <p:sp>
+        <p:nvSpPr>
+          <p:cNvPr id="5" name="Tijdelijke aanduiding voor notities 4"/>
+          <p:cNvSpPr>
+            <a:spLocks noGrp="1"/>
+          </p:cNvSpPr>
+          <p:nvPr>
+            <p:ph type="body" sz="quarter" idx="3"/>
+          </p:nvPr>
+        </p:nvSpPr>
+        <p:spPr>
+          <a:xfrm>
+            <a:off x="685800" y="4343400"/>
+            <a:ext cx="5486400" cy="4114800"/>
+          </a:xfrm>
+          <a:prstGeom prst="rect">
+            <a:avLst/>
+          </a:prstGeom>
+        </p:spPr>
+        <p:txBody>
+          <a:bodyPr vert="horz" lIns="91440" tIns="45720" rIns="91440" bIns="45720" rtlCol="0"/>
+          <a:lstStyle/>
+          <a:p>
+            <a:pPr lvl="0"/>
+            <a:r>
+              <a:rPr lang="nl-NL" smtClean="0"/>
+              <a:t>Klik om de modelstijlen te bewerken</a:t>
+            </a:r>
+          </a:p>
+          <a:p>
+            <a:pPr lvl="1"/>
+            <a:r>
+              <a:rPr lang="nl-NL" smtClean="0"/>
+              <a:t>Tweede niveau</a:t>
+            </a:r>
+          </a:p>
+          <a:p>
+            <a:pPr lvl="2"/>
+            <a:r>
+              <a:rPr lang="nl-NL" smtClean="0"/>
+              <a:t>Derde niveau</a:t>
+            </a:r>
+          </a:p>
+          <a:p>
+            <a:pPr lvl="3"/>
+            <a:r>
+              <a:rPr lang="nl-NL" smtClean="0"/>
+              <a:t>Vierde niveau</a:t>
+            </a:r>
+          </a:p>
+          <a:p>
+            <a:pPr lvl="4"/>
+            <a:r>
+              <a:rPr lang="nl-NL" smtClean="0"/>
+              <a:t>Vijfde niveau</a:t>
+            </a:r>
+            <a:endParaRPr lang="nl-NL"/>
+          </a:p>
+        </p:txBody>
+      </p:sp>
+      <p:sp>
+        <p:nvSpPr>
+          <p:cNvPr id="6" name="Tijdelijke aanduiding voor voettekst 5"/>
+          <p:cNvSpPr>
+            <a:spLocks noGrp="1"/>
+          </p:cNvSpPr>
+          <p:nvPr>
+            <p:ph type="ftr" sz="quarter" idx="4"/>
+          </p:nvPr>
+        </p:nvSpPr>
+        <p:spPr>
+          <a:xfrm>
+            <a:off x="0" y="8685213"/>
+            <a:ext cx="2971800" cy="457200"/>
+          </a:xfrm>
+          <a:prstGeom prst="rect">
+            <a:avLst/>
+          </a:prstGeom>
+        </p:spPr>
+        <p:txBody>
+          <a:bodyPr vert="horz" lIns="91440" tIns="45720" rIns="91440" bIns="45720" rtlCol="0" anchor="b"/>
+          <a:lstStyle>
+            <a:lvl1pPr algn="l">
+              <a:defRPr sz="1200"/>
+            </a:lvl1pPr>
+          </a:lstStyle>
+          <a:p>
+            <a:endParaRPr lang="nl-NL"/>
+          </a:p>
+        </p:txBody>
+      </p:sp>
+      <p:sp>
+        <p:nvSpPr>
+          <p:cNvPr id="7" name="Tijdelijke aanduiding voor dianummer 6"/>
+          <p:cNvSpPr>
+            <a:spLocks noGrp="1"/>
+          </p:cNvSpPr>
+          <p:nvPr>
+            <p:ph type="sldNum" sz="quarter" idx="5"/>
+          </p:nvPr>
+        </p:nvSpPr>
+        <p:spPr>
+          <a:xfrm>
+            <a:off x="3884613" y="8685213"/>
+            <a:ext cx="2971800" cy="457200"/>
+          </a:xfrm>
+          <a:prstGeom prst="rect">
+            <a:avLst/>
+          </a:prstGeom>
+        </p:spPr>
+        <p:txBody>
+          <a:bodyPr vert="horz" lIns="91440" tIns="45720" rIns="91440" bIns="45720" rtlCol="0" anchor="b"/>
+          <a:lstStyle>
+            <a:lvl1pPr algn="r">
+              <a:defRPr sz="1200"/>
+            </a:lvl1pPr>
+          </a:lstStyle>
+          <a:p>
+            <a:fld id="{CD34D72B-C857-42C1-AA87-D98CCE9F1DFD}" type="slidenum">
+              <a:rPr lang="nl-NL" smtClean="0"/>
+              <a:t>‹nr.›</a:t>
+            </a:fld>
+            <a:endParaRPr lang="nl-NL"/>
+          </a:p>
+        </p:txBody>
+      </p:sp>
+    </p:spTree>
+    <p:extLst>
+      <p:ext uri="{BB962C8B-B14F-4D97-AF65-F5344CB8AC3E}">
+        <p14:creationId xmlns:p14="http://schemas.microsoft.com/office/powerpoint/2010/main" val="1384134624"/>
+      </p:ext>
+    </p:extLst>
+  </p:cSld>
+  <p:clrMap bg1="lt1" tx1="dk1" bg2="lt2" tx2="dk2" accent1="accent1" accent2="accent2" accent3="accent3" accent4="accent4" accent5="accent5" accent6="accent6" hlink="hlink" folHlink="folHlink"/>
+  <p:notesStyle>
+    <a:lvl1pPr marL="0" algn="l" defTabSz="914400" rtl="0" eaLnBrk="1" latinLnBrk="0" hangingPunct="1">
+      <a:defRPr sz="1200" kern="1200">
+        <a:solidFill>
+          <a:schemeClr val="tx1"/>
+        </a:solidFill>
+        <a:latin typeface="+mn-lt"/>
+        <a:ea typeface="+mn-ea"/>
+        <a:cs typeface="+mn-cs"/>
+      </a:defRPr>
+    </a:lvl1pPr>
+    <a:lvl2pPr marL="457200" algn="l" defTabSz="914400" rtl="0" eaLnBrk="1" latinLnBrk="0" hangingPunct="1">
+      <a:defRPr sz="1200" kern="1200">
+        <a:solidFill>
+          <a:schemeClr val="tx1"/>
+        </a:solidFill>
+        <a:latin typeface="+mn-lt"/>
+        <a:ea typeface="+mn-ea"/>
+        <a:cs typeface="+mn-cs"/>
+      </a:defRPr>
+    </a:lvl2pPr>
+    <a:lvl3pPr marL="914400" algn="l" defTabSz="914400" rtl="0" eaLnBrk="1" latinLnBrk="0" hangingPunct="1">
+      <a:defRPr sz="1200" kern="1200">
+        <a:solidFill>
+          <a:schemeClr val="tx1"/>
+        </a:solidFill>
+        <a:latin typeface="+mn-lt"/>
+        <a:ea typeface="+mn-ea"/>
+        <a:cs typeface="+mn-cs"/>
+      </a:defRPr>
+    </a:lvl3pPr>
+    <a:lvl4pPr marL="1371600" algn="l" defTabSz="914400" rtl="0" eaLnBrk="1" latinLnBrk="0" hangingPunct="1">
+      <a:defRPr sz="1200" kern="1200">
+        <a:solidFill>
+          <a:schemeClr val="tx1"/>
+        </a:solidFill>
+        <a:latin typeface="+mn-lt"/>
+        <a:ea typeface="+mn-ea"/>
+        <a:cs typeface="+mn-cs"/>
+      </a:defRPr>
+    </a:lvl4pPr>
+    <a:lvl5pPr marL="1828800" algn="l" defTabSz="914400" rtl="0" eaLnBrk="1" latinLnBrk="0" hangingPunct="1">
+      <a:defRPr sz="1200" kern="1200">
+        <a:solidFill>
+          <a:schemeClr val="tx1"/>
+        </a:solidFill>
+        <a:latin typeface="+mn-lt"/>
+        <a:ea typeface="+mn-ea"/>
+        <a:cs typeface="+mn-cs"/>
+      </a:defRPr>
+    </a:lvl5pPr>
+    <a:lvl6pPr marL="2286000" algn="l" defTabSz="914400" rtl="0" eaLnBrk="1" latinLnBrk="0" hangingPunct="1">
+      <a:defRPr sz="1200" kern="1200">
+        <a:solidFill>
+          <a:schemeClr val="tx1"/>
+        </a:solidFill>
+        <a:latin typeface="+mn-lt"/>
+        <a:ea typeface="+mn-ea"/>
+        <a:cs typeface="+mn-cs"/>
+      </a:defRPr>
+    </a:lvl6pPr>
+    <a:lvl7pPr marL="2743200" algn="l" defTabSz="914400" rtl="0" eaLnBrk="1" latinLnBrk="0" hangingPunct="1">
+      <a:defRPr sz="1200" kern="1200">
+        <a:solidFill>
+          <a:schemeClr val="tx1"/>
+        </a:solidFill>
+        <a:latin typeface="+mn-lt"/>
+        <a:ea typeface="+mn-ea"/>
+        <a:cs typeface="+mn-cs"/>
+      </a:defRPr>
+    </a:lvl7pPr>
+    <a:lvl8pPr marL="3200400" algn="l" defTabSz="914400" rtl="0" eaLnBrk="1" latinLnBrk="0" hangingPunct="1">
+      <a:defRPr sz="1200" kern="1200">
+        <a:solidFill>
+          <a:schemeClr val="tx1"/>
+        </a:solidFill>
+        <a:latin typeface="+mn-lt"/>
+        <a:ea typeface="+mn-ea"/>
+        <a:cs typeface="+mn-cs"/>
+      </a:defRPr>
+    </a:lvl8pPr>
+    <a:lvl9pPr marL="3657600" algn="l" defTabSz="914400" rtl="0" eaLnBrk="1" latinLnBrk="0" hangingPunct="1">
+      <a:defRPr sz="1200" kern="1200">
+        <a:solidFill>
+          <a:schemeClr val="tx1"/>
+        </a:solidFill>
+        <a:latin typeface="+mn-lt"/>
+        <a:ea typeface="+mn-ea"/>
+        <a:cs typeface="+mn-cs"/>
+      </a:defRPr>
+    </a:lvl9pPr>
+  </p:notesStyle>
+</p:notesMaster>
+</file>
+
+<file path=ppt/notesSlides/notesSlide1.xml><?xml version="1.0" encoding="utf-8"?>
+<p:notes xmlns:a="http://schemas.openxmlformats.org/drawingml/2006/main" xmlns:r="http://schemas.openxmlformats.org/officeDocument/2006/relationships" xmlns:p="http://schemas.openxmlformats.org/presentationml/2006/main" showMasterSp="0" showMasterPhAnim="0">
+  <p:cSld>
+    <p:spTree>
+      <p:nvGrpSpPr>
+        <p:cNvPr id="1" name="Shape 180"/>
+        <p:cNvGrpSpPr/>
+        <p:nvPr/>
+      </p:nvGrpSpPr>
+      <p:grpSpPr>
+        <a:xfrm>
+          <a:off x="0" y="0"/>
+          <a:ext cx="0" cy="0"/>
+          <a:chOff x="0" y="0"/>
+          <a:chExt cx="0" cy="0"/>
+        </a:xfrm>
+      </p:grpSpPr>
+      <p:sp>
+        <p:nvSpPr>
+          <p:cNvPr id="181" name="Shape 181"/>
+          <p:cNvSpPr txBox="1">
+            <a:spLocks noGrp="1"/>
+          </p:cNvSpPr>
+          <p:nvPr>
+            <p:ph type="body" idx="1"/>
+          </p:nvPr>
+        </p:nvSpPr>
+        <p:spPr>
+          <a:xfrm>
+            <a:off x="685800" y="4343400"/>
+            <a:ext cx="5486399" cy="4114800"/>
+          </a:xfrm>
+          <a:prstGeom prst="rect">
+            <a:avLst/>
+          </a:prstGeom>
+          <a:noFill/>
+          <a:ln>
+            <a:noFill/>
+          </a:ln>
+        </p:spPr>
+        <p:txBody>
+          <a:bodyPr lIns="91425" tIns="91425" rIns="91425" bIns="91425" anchor="ctr" anchorCtr="0">
+            <a:noAutofit/>
+          </a:bodyPr>
+          <a:lstStyle/>
+          <a:p>
+            <a:pPr lvl="0">
+              <a:spcBef>
+                <a:spcPts val="0"/>
+              </a:spcBef>
+              <a:buNone/>
+            </a:pPr>
+            <a:endParaRPr/>
+          </a:p>
+        </p:txBody>
+      </p:sp>
+      <p:sp>
+        <p:nvSpPr>
+          <p:cNvPr id="182" name="Shape 182"/>
+          <p:cNvSpPr>
+            <a:spLocks noGrp="1" noRot="1" noChangeAspect="1"/>
+          </p:cNvSpPr>
+          <p:nvPr>
+            <p:ph type="sldImg" idx="2"/>
+          </p:nvPr>
+        </p:nvSpPr>
+        <p:spPr>
+          <a:xfrm>
+            <a:off x="1143225" y="685800"/>
+            <a:ext cx="4572225" cy="3429000"/>
+          </a:xfrm>
+          <a:custGeom>
+            <a:avLst/>
+            <a:gdLst/>
+            <a:ahLst/>
+            <a:cxnLst/>
+            <a:rect l="0" t="0" r="0" b="0"/>
+            <a:pathLst>
+              <a:path w="120000" h="120000" extrusionOk="0">
+                <a:moveTo>
+                  <a:pt x="0" y="0"/>
+                </a:moveTo>
+                <a:lnTo>
+                  <a:pt x="120000" y="0"/>
+                </a:lnTo>
+                <a:lnTo>
+                  <a:pt x="120000" y="120000"/>
+                </a:lnTo>
+                <a:lnTo>
+                  <a:pt x="0" y="120000"/>
+                </a:lnTo>
+                <a:close/>
+              </a:path>
+            </a:pathLst>
+          </a:custGeom>
+        </p:spPr>
+      </p:sp>
+    </p:spTree>
+  </p:cSld>
+  <p:clrMapOvr>
+    <a:masterClrMapping/>
+  </p:clrMapOvr>
+</p:notes>
 </file>
 
 <file path=ppt/slideLayouts/slideLayout1.xml><?xml version="1.0" encoding="utf-8"?>
@@ -305,7 +765,7 @@
           <a:p>
             <a:fld id="{D0BEBCF1-C867-4FA3-929D-70E3E2EA05CD}" type="datetimeFigureOut">
               <a:rPr lang="nl-NL" smtClean="0"/>
-              <a:t>7-6-2017</a:t>
+              <a:t>8-6-2017</a:t>
             </a:fld>
             <a:endParaRPr lang="nl-NL"/>
           </a:p>
@@ -572,7 +1032,7 @@
           <a:p>
             <a:fld id="{D0BEBCF1-C867-4FA3-929D-70E3E2EA05CD}" type="datetimeFigureOut">
               <a:rPr lang="nl-NL" smtClean="0"/>
-              <a:t>7-6-2017</a:t>
+              <a:t>8-6-2017</a:t>
             </a:fld>
             <a:endParaRPr lang="nl-NL"/>
           </a:p>
@@ -803,7 +1263,7 @@
           <a:p>
             <a:fld id="{D0BEBCF1-C867-4FA3-929D-70E3E2EA05CD}" type="datetimeFigureOut">
               <a:rPr lang="nl-NL" smtClean="0"/>
-              <a:t>7-6-2017</a:t>
+              <a:t>8-6-2017</a:t>
             </a:fld>
             <a:endParaRPr lang="nl-NL"/>
           </a:p>
@@ -1113,7 +1573,7 @@
           <a:p>
             <a:fld id="{D0BEBCF1-C867-4FA3-929D-70E3E2EA05CD}" type="datetimeFigureOut">
               <a:rPr lang="nl-NL" smtClean="0"/>
-              <a:t>7-6-2017</a:t>
+              <a:t>8-6-2017</a:t>
             </a:fld>
             <a:endParaRPr lang="nl-NL"/>
           </a:p>
@@ -1586,7 +2046,7 @@
           <a:p>
             <a:fld id="{D0BEBCF1-C867-4FA3-929D-70E3E2EA05CD}" type="datetimeFigureOut">
               <a:rPr lang="nl-NL" smtClean="0"/>
-              <a:t>7-6-2017</a:t>
+              <a:t>8-6-2017</a:t>
             </a:fld>
             <a:endParaRPr lang="nl-NL"/>
           </a:p>
@@ -2133,7 +2593,7 @@
           <a:p>
             <a:fld id="{D0BEBCF1-C867-4FA3-929D-70E3E2EA05CD}" type="datetimeFigureOut">
               <a:rPr lang="nl-NL" smtClean="0"/>
-              <a:t>7-6-2017</a:t>
+              <a:t>8-6-2017</a:t>
             </a:fld>
             <a:endParaRPr lang="nl-NL"/>
           </a:p>
@@ -2907,7 +3367,7 @@
           <a:p>
             <a:fld id="{D0BEBCF1-C867-4FA3-929D-70E3E2EA05CD}" type="datetimeFigureOut">
               <a:rPr lang="nl-NL" smtClean="0"/>
-              <a:t>7-6-2017</a:t>
+              <a:t>8-6-2017</a:t>
             </a:fld>
             <a:endParaRPr lang="nl-NL"/>
           </a:p>
@@ -3082,7 +3542,7 @@
           <a:p>
             <a:fld id="{D0BEBCF1-C867-4FA3-929D-70E3E2EA05CD}" type="datetimeFigureOut">
               <a:rPr lang="nl-NL" smtClean="0"/>
-              <a:t>7-6-2017</a:t>
+              <a:t>8-6-2017</a:t>
             </a:fld>
             <a:endParaRPr lang="nl-NL"/>
           </a:p>
@@ -3305,7 +3765,7 @@
           <a:p>
             <a:fld id="{D0BEBCF1-C867-4FA3-929D-70E3E2EA05CD}" type="datetimeFigureOut">
               <a:rPr lang="nl-NL" smtClean="0"/>
-              <a:t>7-6-2017</a:t>
+              <a:t>8-6-2017</a:t>
             </a:fld>
             <a:endParaRPr lang="nl-NL"/>
           </a:p>
@@ -3485,7 +3945,7 @@
           <a:p>
             <a:fld id="{D0BEBCF1-C867-4FA3-929D-70E3E2EA05CD}" type="datetimeFigureOut">
               <a:rPr lang="nl-NL" smtClean="0"/>
-              <a:t>7-6-2017</a:t>
+              <a:t>8-6-2017</a:t>
             </a:fld>
             <a:endParaRPr lang="nl-NL"/>
           </a:p>
@@ -3774,7 +4234,7 @@
           <a:p>
             <a:fld id="{D0BEBCF1-C867-4FA3-929D-70E3E2EA05CD}" type="datetimeFigureOut">
               <a:rPr lang="nl-NL" smtClean="0"/>
-              <a:t>7-6-2017</a:t>
+              <a:t>8-6-2017</a:t>
             </a:fld>
             <a:endParaRPr lang="nl-NL"/>
           </a:p>
@@ -4016,7 +4476,7 @@
           <a:p>
             <a:fld id="{D0BEBCF1-C867-4FA3-929D-70E3E2EA05CD}" type="datetimeFigureOut">
               <a:rPr lang="nl-NL" smtClean="0"/>
-              <a:t>7-6-2017</a:t>
+              <a:t>8-6-2017</a:t>
             </a:fld>
             <a:endParaRPr lang="nl-NL"/>
           </a:p>
@@ -4395,7 +4855,7 @@
           <a:p>
             <a:fld id="{D0BEBCF1-C867-4FA3-929D-70E3E2EA05CD}" type="datetimeFigureOut">
               <a:rPr lang="nl-NL" smtClean="0"/>
-              <a:t>7-6-2017</a:t>
+              <a:t>8-6-2017</a:t>
             </a:fld>
             <a:endParaRPr lang="nl-NL"/>
           </a:p>
@@ -4513,7 +4973,7 @@
           <a:p>
             <a:fld id="{D0BEBCF1-C867-4FA3-929D-70E3E2EA05CD}" type="datetimeFigureOut">
               <a:rPr lang="nl-NL" smtClean="0"/>
-              <a:t>7-6-2017</a:t>
+              <a:t>8-6-2017</a:t>
             </a:fld>
             <a:endParaRPr lang="nl-NL"/>
           </a:p>
@@ -4608,7 +5068,7 @@
           <a:p>
             <a:fld id="{D0BEBCF1-C867-4FA3-929D-70E3E2EA05CD}" type="datetimeFigureOut">
               <a:rPr lang="nl-NL" smtClean="0"/>
-              <a:t>7-6-2017</a:t>
+              <a:t>8-6-2017</a:t>
             </a:fld>
             <a:endParaRPr lang="nl-NL"/>
           </a:p>
@@ -4857,7 +5317,7 @@
           <a:p>
             <a:fld id="{D0BEBCF1-C867-4FA3-929D-70E3E2EA05CD}" type="datetimeFigureOut">
               <a:rPr lang="nl-NL" smtClean="0"/>
-              <a:t>7-6-2017</a:t>
+              <a:t>8-6-2017</a:t>
             </a:fld>
             <a:endParaRPr lang="nl-NL"/>
           </a:p>
@@ -5114,7 +5574,7 @@
           <a:p>
             <a:fld id="{D0BEBCF1-C867-4FA3-929D-70E3E2EA05CD}" type="datetimeFigureOut">
               <a:rPr lang="nl-NL" smtClean="0"/>
-              <a:t>7-6-2017</a:t>
+              <a:t>8-6-2017</a:t>
             </a:fld>
             <a:endParaRPr lang="nl-NL"/>
           </a:p>
@@ -5357,7 +5817,7 @@
           <a:p>
             <a:fld id="{D0BEBCF1-C867-4FA3-929D-70E3E2EA05CD}" type="datetimeFigureOut">
               <a:rPr lang="nl-NL" smtClean="0"/>
-              <a:t>7-6-2017</a:t>
+              <a:t>8-6-2017</a:t>
             </a:fld>
             <a:endParaRPr lang="nl-NL"/>
           </a:p>
@@ -5857,6 +6317,13 @@
   <p:clrMapOvr>
     <a:masterClrMapping/>
   </p:clrMapOvr>
+  <p:timing>
+    <p:tnLst>
+      <p:par>
+        <p:cTn id="1" dur="indefinite" restart="never" nodeType="tmRoot"/>
+      </p:par>
+    </p:tnLst>
+  </p:timing>
 </p:sld>
 </file>
 
@@ -5899,35 +6366,496 @@
           </a:p>
         </p:txBody>
       </p:sp>
-      <p:pic>
-        <p:nvPicPr>
-          <p:cNvPr id="4" name="Tijdelijke aanduiding voor inhoud 3"/>
-          <p:cNvPicPr>
-            <a:picLocks noGrp="1" noChangeAspect="1"/>
-          </p:cNvPicPr>
-          <p:nvPr>
-            <p:ph idx="1"/>
-          </p:nvPr>
-        </p:nvPicPr>
-        <p:blipFill>
-          <a:blip r:embed="rId2">
-            <a:extLst>
-              <a:ext uri="{28A0092B-C50C-407E-A947-70E740481C1C}">
-                <a14:useLocalDpi xmlns:a14="http://schemas.microsoft.com/office/drawing/2010/main" val="0"/>
-              </a:ext>
-            </a:extLst>
-          </a:blip>
-          <a:stretch>
-            <a:fillRect/>
-          </a:stretch>
-        </p:blipFill>
-        <p:spPr>
-          <a:xfrm>
-            <a:off x="6031596" y="1825625"/>
-            <a:ext cx="5512312" cy="4644377"/>
-          </a:xfrm>
-        </p:spPr>
-      </p:pic>
+      <mc:AlternateContent xmlns:mc="http://schemas.openxmlformats.org/markup-compatibility/2006">
+        <mc:Choice xmlns:a14="http://schemas.microsoft.com/office/drawing/2010/main" Requires="a14">
+          <p:sp>
+            <p:nvSpPr>
+              <p:cNvPr id="3" name="Tijdelijke aanduiding voor inhoud 2"/>
+              <p:cNvSpPr>
+                <a:spLocks noGrp="1"/>
+              </p:cNvSpPr>
+              <p:nvPr>
+                <p:ph idx="1"/>
+              </p:nvPr>
+            </p:nvSpPr>
+            <p:spPr/>
+            <p:txBody>
+              <a:bodyPr/>
+              <a:lstStyle/>
+              <a:p>
+                <a:r>
+                  <a:rPr lang="nl-NL" dirty="0" smtClean="0"/>
+                  <a:t>Analyse voor N = 2 deeltjes</a:t>
+                </a:r>
+              </a:p>
+              <a:p>
+                <a:r>
+                  <a:rPr lang="nl-NL" dirty="0"/>
+                  <a:t>Behoud </a:t>
+                </a:r>
+                <a:r>
+                  <a:rPr lang="nl-NL"/>
+                  <a:t>van </a:t>
+                </a:r>
+                <a:r>
+                  <a:rPr lang="nl-NL" smtClean="0"/>
+                  <a:t>energie</a:t>
+                </a:r>
+              </a:p>
+              <a:p>
+                <a:pPr marL="0" indent="0">
+                  <a:buNone/>
+                </a:pPr>
+                <a:r>
+                  <a:rPr lang="nl-NL"/>
+                  <a:t>	</a:t>
+                </a:r>
+                <a:r>
+                  <a:rPr lang="nl-NL" smtClean="0"/>
+                  <a:t>		</a:t>
+                </a:r>
+                <a14:m>
+                  <m:oMath xmlns:m="http://schemas.openxmlformats.org/officeDocument/2006/math">
+                    <m:f>
+                      <m:fPr>
+                        <m:ctrlPr>
+                          <a:rPr lang="nl-NL" sz="3600" i="1" smtClean="0">
+                            <a:latin typeface="Cambria Math"/>
+                          </a:rPr>
+                        </m:ctrlPr>
+                      </m:fPr>
+                      <m:num>
+                        <m:r>
+                          <a:rPr lang="nl-NL" sz="3600" b="0" i="1" smtClean="0">
+                            <a:latin typeface="Cambria Math"/>
+                          </a:rPr>
+                          <m:t>1</m:t>
+                        </m:r>
+                      </m:num>
+                      <m:den>
+                        <m:r>
+                          <a:rPr lang="nl-NL" sz="3600" b="0" i="1" smtClean="0">
+                            <a:latin typeface="Cambria Math"/>
+                          </a:rPr>
+                          <m:t>2</m:t>
+                        </m:r>
+                      </m:den>
+                    </m:f>
+                    <m:r>
+                      <a:rPr lang="nl-NL" sz="3600" b="0" i="1" smtClean="0">
+                        <a:latin typeface="Cambria Math"/>
+                      </a:rPr>
+                      <m:t>𝑚</m:t>
+                    </m:r>
+                    <m:sSup>
+                      <m:sSupPr>
+                        <m:ctrlPr>
+                          <a:rPr lang="nl-NL" sz="3600" b="0" i="1" smtClean="0">
+                            <a:latin typeface="Cambria Math"/>
+                          </a:rPr>
+                        </m:ctrlPr>
+                      </m:sSupPr>
+                      <m:e>
+                        <m:r>
+                          <a:rPr lang="nl-NL" sz="3600" b="0" i="1" smtClean="0">
+                            <a:latin typeface="Cambria Math"/>
+                          </a:rPr>
+                          <m:t>𝑣</m:t>
+                        </m:r>
+                      </m:e>
+                      <m:sup>
+                        <m:r>
+                          <a:rPr lang="nl-NL" sz="3600" b="0" i="1" smtClean="0">
+                            <a:latin typeface="Cambria Math"/>
+                          </a:rPr>
+                          <m:t>2</m:t>
+                        </m:r>
+                      </m:sup>
+                    </m:sSup>
+                    <m:r>
+                      <a:rPr lang="nl-NL" sz="3600" b="0" i="1" smtClean="0">
+                        <a:latin typeface="Cambria Math"/>
+                      </a:rPr>
+                      <m:t>+</m:t>
+                    </m:r>
+                    <m:f>
+                      <m:fPr>
+                        <m:ctrlPr>
+                          <a:rPr lang="nl-NL" sz="3600" b="0" i="1" smtClean="0">
+                            <a:latin typeface="Cambria Math"/>
+                          </a:rPr>
+                        </m:ctrlPr>
+                      </m:fPr>
+                      <m:num>
+                        <m:r>
+                          <a:rPr lang="nl-NL" sz="3600" b="0" i="1" smtClean="0">
+                            <a:latin typeface="Cambria Math"/>
+                          </a:rPr>
+                          <m:t>1</m:t>
+                        </m:r>
+                      </m:num>
+                      <m:den>
+                        <m:r>
+                          <a:rPr lang="nl-NL" sz="3600" b="0" i="1" smtClean="0">
+                            <a:latin typeface="Cambria Math"/>
+                          </a:rPr>
+                          <m:t>2</m:t>
+                        </m:r>
+                      </m:den>
+                    </m:f>
+                    <m:r>
+                      <a:rPr lang="nl-NL" sz="3600" b="0" i="1" smtClean="0">
+                        <a:latin typeface="Cambria Math"/>
+                      </a:rPr>
+                      <m:t>𝑀</m:t>
+                    </m:r>
+                    <m:sSup>
+                      <m:sSupPr>
+                        <m:ctrlPr>
+                          <a:rPr lang="nl-NL" sz="3600" b="0" i="1" smtClean="0">
+                            <a:latin typeface="Cambria Math"/>
+                          </a:rPr>
+                        </m:ctrlPr>
+                      </m:sSupPr>
+                      <m:e>
+                        <m:r>
+                          <a:rPr lang="nl-NL" sz="3600" b="0" i="1" smtClean="0">
+                            <a:latin typeface="Cambria Math"/>
+                          </a:rPr>
+                          <m:t>𝑉</m:t>
+                        </m:r>
+                      </m:e>
+                      <m:sup>
+                        <m:r>
+                          <a:rPr lang="nl-NL" sz="3600" b="0" i="1" smtClean="0">
+                            <a:latin typeface="Cambria Math"/>
+                          </a:rPr>
+                          <m:t>2</m:t>
+                        </m:r>
+                      </m:sup>
+                    </m:sSup>
+                    <m:r>
+                      <a:rPr lang="nl-NL" sz="3600" b="0" i="1" smtClean="0">
+                        <a:latin typeface="Cambria Math"/>
+                      </a:rPr>
+                      <m:t>−</m:t>
+                    </m:r>
+                    <m:r>
+                      <a:rPr lang="nl-NL" sz="3600" b="0" i="1" smtClean="0">
+                        <a:latin typeface="Cambria Math"/>
+                      </a:rPr>
+                      <m:t>𝐺</m:t>
+                    </m:r>
+                    <m:f>
+                      <m:fPr>
+                        <m:ctrlPr>
+                          <a:rPr lang="nl-NL" sz="3600" b="0" i="1" smtClean="0">
+                            <a:latin typeface="Cambria Math"/>
+                          </a:rPr>
+                        </m:ctrlPr>
+                      </m:fPr>
+                      <m:num>
+                        <m:r>
+                          <a:rPr lang="nl-NL" sz="3600" b="0" i="1" smtClean="0">
+                            <a:latin typeface="Cambria Math"/>
+                          </a:rPr>
+                          <m:t>𝑚𝑀</m:t>
+                        </m:r>
+                      </m:num>
+                      <m:den>
+                        <m:r>
+                          <a:rPr lang="nl-NL" sz="3600" b="0" i="1" smtClean="0">
+                            <a:latin typeface="Cambria Math"/>
+                          </a:rPr>
+                          <m:t>𝑟</m:t>
+                        </m:r>
+                      </m:den>
+                    </m:f>
+                  </m:oMath>
+                </a14:m>
+                <a:endParaRPr lang="nl-NL" dirty="0"/>
+              </a:p>
+              <a:p>
+                <a:r>
+                  <a:rPr lang="nl-NL" err="1"/>
+                  <a:t>Richardson</a:t>
+                </a:r>
+                <a:r>
+                  <a:rPr lang="nl-NL"/>
+                  <a:t> </a:t>
+                </a:r>
+                <a:r>
+                  <a:rPr lang="nl-NL" smtClean="0"/>
+                  <a:t>Extrapolatie</a:t>
+                </a:r>
+              </a:p>
+              <a:p>
+                <a:pPr marL="457200" lvl="1" indent="0">
+                  <a:buNone/>
+                </a:pPr>
+                <a14:m>
+                  <m:oMathPara xmlns:m="http://schemas.openxmlformats.org/officeDocument/2006/math">
+                    <m:oMathParaPr>
+                      <m:jc m:val="centerGroup"/>
+                    </m:oMathParaPr>
+                    <m:oMath xmlns:m="http://schemas.openxmlformats.org/officeDocument/2006/math">
+                      <m:f>
+                        <m:fPr>
+                          <m:ctrlPr>
+                            <a:rPr lang="nl-NL" sz="3200" i="1" smtClean="0">
+                              <a:latin typeface="Cambria Math"/>
+                            </a:rPr>
+                          </m:ctrlPr>
+                        </m:fPr>
+                        <m:num>
+                          <m:r>
+                            <a:rPr lang="nl-NL" sz="3200" b="0" i="1" smtClean="0">
+                              <a:latin typeface="Cambria Math"/>
+                            </a:rPr>
+                            <m:t>𝑄</m:t>
+                          </m:r>
+                          <m:d>
+                            <m:dPr>
+                              <m:ctrlPr>
+                                <a:rPr lang="nl-NL" sz="3200" b="0" i="1" smtClean="0">
+                                  <a:latin typeface="Cambria Math"/>
+                                </a:rPr>
+                              </m:ctrlPr>
+                            </m:dPr>
+                            <m:e>
+                              <m:r>
+                                <a:rPr lang="nl-NL" sz="3200" b="0" i="1" smtClean="0">
+                                  <a:latin typeface="Cambria Math"/>
+                                </a:rPr>
+                                <m:t>2</m:t>
+                              </m:r>
+                              <m:r>
+                                <a:rPr lang="nl-NL" sz="3200" b="0" i="1" smtClean="0">
+                                  <a:latin typeface="Cambria Math"/>
+                                </a:rPr>
+                                <m:t>h</m:t>
+                              </m:r>
+                            </m:e>
+                          </m:d>
+                          <m:r>
+                            <a:rPr lang="nl-NL" sz="3200" b="0" i="1" smtClean="0">
+                              <a:latin typeface="Cambria Math"/>
+                            </a:rPr>
+                            <m:t>−</m:t>
+                          </m:r>
+                          <m:r>
+                            <a:rPr lang="nl-NL" sz="3200" b="0" i="1" smtClean="0">
+                              <a:latin typeface="Cambria Math"/>
+                            </a:rPr>
+                            <m:t>𝑄</m:t>
+                          </m:r>
+                          <m:r>
+                            <a:rPr lang="nl-NL" sz="3200" b="0" i="1" smtClean="0">
+                              <a:latin typeface="Cambria Math"/>
+                            </a:rPr>
+                            <m:t>(4</m:t>
+                          </m:r>
+                          <m:r>
+                            <a:rPr lang="nl-NL" sz="3200" b="0" i="1" smtClean="0">
+                              <a:latin typeface="Cambria Math"/>
+                            </a:rPr>
+                            <m:t>h</m:t>
+                          </m:r>
+                          <m:r>
+                            <a:rPr lang="nl-NL" sz="3200" b="0" i="1" smtClean="0">
+                              <a:latin typeface="Cambria Math"/>
+                            </a:rPr>
+                            <m:t>)</m:t>
+                          </m:r>
+                        </m:num>
+                        <m:den>
+                          <m:r>
+                            <a:rPr lang="nl-NL" sz="3200" b="0" i="1" smtClean="0">
+                              <a:latin typeface="Cambria Math"/>
+                            </a:rPr>
+                            <m:t>𝑄</m:t>
+                          </m:r>
+                          <m:d>
+                            <m:dPr>
+                              <m:ctrlPr>
+                                <a:rPr lang="nl-NL" sz="3200" b="0" i="1" smtClean="0">
+                                  <a:latin typeface="Cambria Math"/>
+                                </a:rPr>
+                              </m:ctrlPr>
+                            </m:dPr>
+                            <m:e>
+                              <m:r>
+                                <a:rPr lang="nl-NL" sz="3200" b="0" i="1" smtClean="0">
+                                  <a:latin typeface="Cambria Math"/>
+                                </a:rPr>
+                                <m:t>h</m:t>
+                              </m:r>
+                            </m:e>
+                          </m:d>
+                          <m:r>
+                            <a:rPr lang="nl-NL" sz="3200" b="0" i="1" smtClean="0">
+                              <a:latin typeface="Cambria Math"/>
+                            </a:rPr>
+                            <m:t>−</m:t>
+                          </m:r>
+                          <m:r>
+                            <a:rPr lang="nl-NL" sz="3200" b="0" i="1" smtClean="0">
+                              <a:latin typeface="Cambria Math"/>
+                            </a:rPr>
+                            <m:t>𝑄</m:t>
+                          </m:r>
+                          <m:r>
+                            <a:rPr lang="nl-NL" sz="3200" b="0" i="1" smtClean="0">
+                              <a:latin typeface="Cambria Math"/>
+                            </a:rPr>
+                            <m:t>(2</m:t>
+                          </m:r>
+                          <m:r>
+                            <a:rPr lang="nl-NL" sz="3200" b="0" i="1" smtClean="0">
+                              <a:latin typeface="Cambria Math"/>
+                            </a:rPr>
+                            <m:t>h</m:t>
+                          </m:r>
+                          <m:r>
+                            <a:rPr lang="nl-NL" sz="3200" b="0" i="1" smtClean="0">
+                              <a:latin typeface="Cambria Math"/>
+                            </a:rPr>
+                            <m:t>)</m:t>
+                          </m:r>
+                        </m:den>
+                      </m:f>
+                      <m:r>
+                        <a:rPr lang="nl-NL" sz="3200" b="0" i="1" smtClean="0">
+                          <a:latin typeface="Cambria Math"/>
+                        </a:rPr>
+                        <m:t>=</m:t>
+                      </m:r>
+                      <m:sSup>
+                        <m:sSupPr>
+                          <m:ctrlPr>
+                            <a:rPr lang="nl-NL" sz="3200" b="0" i="1" smtClean="0">
+                              <a:latin typeface="Cambria Math"/>
+                            </a:rPr>
+                          </m:ctrlPr>
+                        </m:sSupPr>
+                        <m:e>
+                          <m:r>
+                            <a:rPr lang="nl-NL" sz="3200" b="0" i="1" smtClean="0">
+                              <a:latin typeface="Cambria Math"/>
+                            </a:rPr>
+                            <m:t>2</m:t>
+                          </m:r>
+                        </m:e>
+                        <m:sup>
+                          <m:r>
+                            <a:rPr lang="nl-NL" sz="3200" b="0" i="1" smtClean="0">
+                              <a:latin typeface="Cambria Math"/>
+                            </a:rPr>
+                            <m:t>𝑝</m:t>
+                          </m:r>
+                        </m:sup>
+                      </m:sSup>
+                    </m:oMath>
+                  </m:oMathPara>
+                </a14:m>
+                <a:endParaRPr lang="nl-NL" sz="3200" dirty="0"/>
+              </a:p>
+            </p:txBody>
+          </p:sp>
+        </mc:Choice>
+        <mc:Fallback>
+          <p:sp>
+            <p:nvSpPr>
+              <p:cNvPr id="3" name="Tijdelijke aanduiding voor inhoud 2"/>
+              <p:cNvSpPr>
+                <a:spLocks noGrp="1" noRot="1" noChangeAspect="1" noMove="1" noResize="1" noEditPoints="1" noAdjustHandles="1" noChangeArrowheads="1" noChangeShapeType="1" noTextEdit="1"/>
+              </p:cNvSpPr>
+              <p:nvPr>
+                <p:ph idx="1"/>
+              </p:nvPr>
+            </p:nvSpPr>
+            <p:spPr>
+              <a:blipFill rotWithShape="1">
+                <a:blip r:embed="rId2"/>
+                <a:stretch>
+                  <a:fillRect l="-676" t="-1818"/>
+                </a:stretch>
+              </a:blipFill>
+            </p:spPr>
+            <p:txBody>
+              <a:bodyPr/>
+              <a:lstStyle/>
+              <a:p>
+                <a:r>
+                  <a:rPr lang="nl-NL">
+                    <a:noFill/>
+                  </a:rPr>
+                  <a:t> </a:t>
+                </a:r>
+              </a:p>
+            </p:txBody>
+          </p:sp>
+        </mc:Fallback>
+      </mc:AlternateContent>
+    </p:spTree>
+    <p:extLst>
+      <p:ext uri="{BB962C8B-B14F-4D97-AF65-F5344CB8AC3E}">
+        <p14:creationId xmlns:p14="http://schemas.microsoft.com/office/powerpoint/2010/main" val="120385941"/>
+      </p:ext>
+    </p:extLst>
+  </p:cSld>
+  <p:clrMapOvr>
+    <a:masterClrMapping/>
+  </p:clrMapOvr>
+  <p:timing>
+    <p:tnLst>
+      <p:par>
+        <p:cTn id="1" dur="indefinite" restart="never" nodeType="tmRoot"/>
+      </p:par>
+    </p:tnLst>
+  </p:timing>
+</p:sld>
+</file>
+
+<file path=ppt/slides/slide11.xml><?xml version="1.0" encoding="utf-8"?>
+<p:sld xmlns:a="http://schemas.openxmlformats.org/drawingml/2006/main" xmlns:r="http://schemas.openxmlformats.org/officeDocument/2006/relationships" xmlns:p="http://schemas.openxmlformats.org/presentationml/2006/main">
+  <p:cSld>
+    <p:spTree>
+      <p:nvGrpSpPr>
+        <p:cNvPr id="1" name=""/>
+        <p:cNvGrpSpPr/>
+        <p:nvPr/>
+      </p:nvGrpSpPr>
+      <p:grpSpPr>
+        <a:xfrm>
+          <a:off x="0" y="0"/>
+          <a:ext cx="0" cy="0"/>
+          <a:chOff x="0" y="0"/>
+          <a:chExt cx="0" cy="0"/>
+        </a:xfrm>
+      </p:grpSpPr>
+      <p:sp>
+        <p:nvSpPr>
+          <p:cNvPr id="2" name="Titel 1"/>
+          <p:cNvSpPr>
+            <a:spLocks noGrp="1"/>
+          </p:cNvSpPr>
+          <p:nvPr>
+            <p:ph type="title"/>
+          </p:nvPr>
+        </p:nvSpPr>
+        <p:spPr/>
+        <p:txBody>
+          <a:bodyPr/>
+          <a:lstStyle/>
+          <a:p>
+            <a:r>
+              <a:rPr lang="nl-NL"/>
+              <a:t>Nauwkeurigheid model</a:t>
+            </a:r>
+          </a:p>
+        </p:txBody>
+      </p:sp>
       <p:sp>
         <p:nvSpPr>
           <p:cNvPr id="5" name="Tijdelijke aanduiding voor inhoud 2"/>
@@ -6325,8 +7253,20 @@
           </a:p>
           <a:p>
             <a:r>
+              <a:rPr lang="nl-NL"/>
+              <a:t>Energie </a:t>
+            </a:r>
+            <a:r>
+              <a:rPr lang="nl-NL" smtClean="0"/>
+              <a:t>ongeveer</a:t>
+            </a:r>
+            <a:r>
+              <a:rPr lang="nl-NL" smtClean="0"/>
+              <a:t> </a:t>
+            </a:r>
+            <a:r>
               <a:rPr lang="nl-NL" dirty="0"/>
-              <a:t>Energie niet behouden</a:t>
+              <a:t>behouden</a:t>
             </a:r>
           </a:p>
         </p:txBody>
@@ -6340,13 +7280,13 @@
           <p:nvPr>
             <p:extLst>
               <p:ext uri="{D42A27DB-BD31-4B8C-83A1-F6EECF244321}">
-                <p14:modId xmlns:p14="http://schemas.microsoft.com/office/powerpoint/2010/main" val="2148159441"/>
+                <p14:modId xmlns:p14="http://schemas.microsoft.com/office/powerpoint/2010/main" val="2679953857"/>
               </p:ext>
             </p:extLst>
           </p:nvPr>
         </p:nvGraphicFramePr>
         <p:xfrm>
-          <a:off x="94436" y="5785034"/>
+          <a:off x="158840" y="4010721"/>
           <a:ext cx="11874320" cy="1044476"/>
         </p:xfrm>
         <a:graphic>
@@ -6359,56 +7299,56 @@
                 <a:gridCol w="1484290">
                   <a:extLst>
                     <a:ext uri="{9D8B030D-6E8A-4147-A177-3AD203B41FA5}">
-                      <a16:colId xmlns:a16="http://schemas.microsoft.com/office/drawing/2014/main" xmlns="" val="20000"/>
+                      <a16:colId xmlns="" xmlns:a16="http://schemas.microsoft.com/office/drawing/2014/main" val="20000"/>
                     </a:ext>
                   </a:extLst>
                 </a:gridCol>
                 <a:gridCol w="1484290">
                   <a:extLst>
                     <a:ext uri="{9D8B030D-6E8A-4147-A177-3AD203B41FA5}">
-                      <a16:colId xmlns:a16="http://schemas.microsoft.com/office/drawing/2014/main" xmlns="" val="20001"/>
+                      <a16:colId xmlns="" xmlns:a16="http://schemas.microsoft.com/office/drawing/2014/main" val="20001"/>
                     </a:ext>
                   </a:extLst>
                 </a:gridCol>
                 <a:gridCol w="1484290">
                   <a:extLst>
                     <a:ext uri="{9D8B030D-6E8A-4147-A177-3AD203B41FA5}">
-                      <a16:colId xmlns:a16="http://schemas.microsoft.com/office/drawing/2014/main" xmlns="" val="20002"/>
+                      <a16:colId xmlns="" xmlns:a16="http://schemas.microsoft.com/office/drawing/2014/main" val="20002"/>
                     </a:ext>
                   </a:extLst>
                 </a:gridCol>
                 <a:gridCol w="1484290">
                   <a:extLst>
                     <a:ext uri="{9D8B030D-6E8A-4147-A177-3AD203B41FA5}">
-                      <a16:colId xmlns:a16="http://schemas.microsoft.com/office/drawing/2014/main" xmlns="" val="20003"/>
+                      <a16:colId xmlns="" xmlns:a16="http://schemas.microsoft.com/office/drawing/2014/main" val="20003"/>
                     </a:ext>
                   </a:extLst>
                 </a:gridCol>
                 <a:gridCol w="1484290">
                   <a:extLst>
                     <a:ext uri="{9D8B030D-6E8A-4147-A177-3AD203B41FA5}">
-                      <a16:colId xmlns:a16="http://schemas.microsoft.com/office/drawing/2014/main" xmlns="" val="20004"/>
+                      <a16:colId xmlns="" xmlns:a16="http://schemas.microsoft.com/office/drawing/2014/main" val="20004"/>
                     </a:ext>
                   </a:extLst>
                 </a:gridCol>
                 <a:gridCol w="1484290">
                   <a:extLst>
                     <a:ext uri="{9D8B030D-6E8A-4147-A177-3AD203B41FA5}">
-                      <a16:colId xmlns:a16="http://schemas.microsoft.com/office/drawing/2014/main" xmlns="" val="20005"/>
+                      <a16:colId xmlns="" xmlns:a16="http://schemas.microsoft.com/office/drawing/2014/main" val="20005"/>
                     </a:ext>
                   </a:extLst>
                 </a:gridCol>
                 <a:gridCol w="1484290">
                   <a:extLst>
                     <a:ext uri="{9D8B030D-6E8A-4147-A177-3AD203B41FA5}">
-                      <a16:colId xmlns:a16="http://schemas.microsoft.com/office/drawing/2014/main" xmlns="" val="20006"/>
+                      <a16:colId xmlns="" xmlns:a16="http://schemas.microsoft.com/office/drawing/2014/main" val="20006"/>
                     </a:ext>
                   </a:extLst>
                 </a:gridCol>
                 <a:gridCol w="1484290">
                   <a:extLst>
                     <a:ext uri="{9D8B030D-6E8A-4147-A177-3AD203B41FA5}">
-                      <a16:colId xmlns:a16="http://schemas.microsoft.com/office/drawing/2014/main" xmlns="" val="20007"/>
+                      <a16:colId xmlns="" xmlns:a16="http://schemas.microsoft.com/office/drawing/2014/main" val="20007"/>
                     </a:ext>
                   </a:extLst>
                 </a:gridCol>
@@ -6533,7 +7473,7 @@
                 </a:tc>
                 <a:extLst>
                   <a:ext uri="{0D108BD9-81ED-4DB2-BD59-A6C34878D82A}">
-                    <a16:rowId xmlns:a16="http://schemas.microsoft.com/office/drawing/2014/main" xmlns="" val="10000"/>
+                    <a16:rowId xmlns="" xmlns:a16="http://schemas.microsoft.com/office/drawing/2014/main" val="10000"/>
                   </a:ext>
                 </a:extLst>
               </a:tr>
@@ -6708,7 +7648,7 @@
                 </a:tc>
                 <a:extLst>
                   <a:ext uri="{0D108BD9-81ED-4DB2-BD59-A6C34878D82A}">
-                    <a16:rowId xmlns:a16="http://schemas.microsoft.com/office/drawing/2014/main" xmlns="" val="10001"/>
+                    <a16:rowId xmlns="" xmlns:a16="http://schemas.microsoft.com/office/drawing/2014/main" val="10001"/>
                   </a:ext>
                 </a:extLst>
               </a:tr>
@@ -6726,10 +7666,17 @@
   <p:clrMapOvr>
     <a:masterClrMapping/>
   </p:clrMapOvr>
+  <p:timing>
+    <p:tnLst>
+      <p:par>
+        <p:cTn id="1" dur="indefinite" restart="never" nodeType="tmRoot"/>
+      </p:par>
+    </p:tnLst>
+  </p:timing>
 </p:sld>
 </file>
 
-<file path=ppt/slides/slide11.xml><?xml version="1.0" encoding="utf-8"?>
+<file path=ppt/slides/slide12.xml><?xml version="1.0" encoding="utf-8"?>
 <p:sld xmlns:a="http://schemas.openxmlformats.org/drawingml/2006/main" xmlns:r="http://schemas.openxmlformats.org/officeDocument/2006/relationships" xmlns:p="http://schemas.openxmlformats.org/presentationml/2006/main">
   <p:cSld>
     <p:spTree>
@@ -6746,25 +7693,6 @@
           <a:chExt cx="0" cy="0"/>
         </a:xfrm>
       </p:grpSpPr>
-      <p:sp>
-        <p:nvSpPr>
-          <p:cNvPr id="2" name="Titel 1"/>
-          <p:cNvSpPr>
-            <a:spLocks noGrp="1"/>
-          </p:cNvSpPr>
-          <p:nvPr>
-            <p:ph type="title"/>
-          </p:nvPr>
-        </p:nvSpPr>
-        <p:spPr/>
-        <p:txBody>
-          <a:bodyPr/>
-          <a:lstStyle/>
-          <a:p>
-            <a:endParaRPr lang="nl-NL"/>
-          </a:p>
-        </p:txBody>
-      </p:sp>
       <p:pic>
         <p:nvPicPr>
           <p:cNvPr id="4" name="Tijdelijke aanduiding voor inhoud 3"/>
@@ -6789,8 +7717,8 @@
         </p:blipFill>
         <p:spPr>
           <a:xfrm>
-            <a:off x="610313" y="1938746"/>
-            <a:ext cx="5304668" cy="4351338"/>
+            <a:off x="287618" y="1529411"/>
+            <a:ext cx="5512312" cy="4644377"/>
           </a:xfrm>
         </p:spPr>
       </p:pic>
@@ -6816,8 +7744,8 @@
         </p:blipFill>
         <p:spPr>
           <a:xfrm>
-            <a:off x="6123354" y="1893722"/>
-            <a:ext cx="5403238" cy="4463132"/>
+            <a:off x="5798712" y="1682324"/>
+            <a:ext cx="5753638" cy="4252689"/>
           </a:xfrm>
           <a:prstGeom prst="rect">
             <a:avLst/>
@@ -6827,127 +7755,20 @@
     </p:spTree>
     <p:extLst>
       <p:ext uri="{BB962C8B-B14F-4D97-AF65-F5344CB8AC3E}">
-        <p14:creationId xmlns:p14="http://schemas.microsoft.com/office/powerpoint/2010/main" val="1028094166"/>
+        <p14:creationId xmlns:p14="http://schemas.microsoft.com/office/powerpoint/2010/main" val="1639046794"/>
       </p:ext>
     </p:extLst>
   </p:cSld>
   <p:clrMapOvr>
     <a:masterClrMapping/>
   </p:clrMapOvr>
-</p:sld>
-</file>
-
-<file path=ppt/slides/slide12.xml><?xml version="1.0" encoding="utf-8"?>
-<p:sld xmlns:a="http://schemas.openxmlformats.org/drawingml/2006/main" xmlns:r="http://schemas.openxmlformats.org/officeDocument/2006/relationships" xmlns:p="http://schemas.openxmlformats.org/presentationml/2006/main">
-  <p:cSld>
-    <p:spTree>
-      <p:nvGrpSpPr>
-        <p:cNvPr id="1" name=""/>
-        <p:cNvGrpSpPr/>
-        <p:nvPr/>
-      </p:nvGrpSpPr>
-      <p:grpSpPr>
-        <a:xfrm>
-          <a:off x="0" y="0"/>
-          <a:ext cx="0" cy="0"/>
-          <a:chOff x="0" y="0"/>
-          <a:chExt cx="0" cy="0"/>
-        </a:xfrm>
-      </p:grpSpPr>
-      <p:sp>
-        <p:nvSpPr>
-          <p:cNvPr id="2" name="Titel 1"/>
-          <p:cNvSpPr>
-            <a:spLocks noGrp="1"/>
-          </p:cNvSpPr>
-          <p:nvPr>
-            <p:ph type="title"/>
-          </p:nvPr>
-        </p:nvSpPr>
-        <p:spPr/>
-        <p:txBody>
-          <a:bodyPr/>
-          <a:lstStyle/>
-          <a:p>
-            <a:r>
-              <a:rPr lang="nl-NL" dirty="0"/>
-              <a:t>Conclusie</a:t>
-            </a:r>
-          </a:p>
-        </p:txBody>
-      </p:sp>
-      <p:sp>
-        <p:nvSpPr>
-          <p:cNvPr id="3" name="Tijdelijke aanduiding voor inhoud 2"/>
-          <p:cNvSpPr>
-            <a:spLocks noGrp="1"/>
-          </p:cNvSpPr>
-          <p:nvPr>
-            <p:ph idx="1"/>
-          </p:nvPr>
-        </p:nvSpPr>
-        <p:spPr/>
-        <p:txBody>
-          <a:bodyPr/>
-          <a:lstStyle/>
-          <a:p>
-            <a:r>
-              <a:rPr lang="nl-NL" dirty="0"/>
-              <a:t>Barnes-Hut voor sneller programma</a:t>
-            </a:r>
-          </a:p>
-          <a:p>
-            <a:r>
-              <a:rPr lang="nl-NL" dirty="0" err="1"/>
-              <a:t>Leapfrog</a:t>
-            </a:r>
-            <a:r>
-              <a:rPr lang="nl-NL" dirty="0"/>
-              <a:t> voor goede integratie</a:t>
-            </a:r>
-          </a:p>
-          <a:p>
-            <a:endParaRPr lang="nl-NL" dirty="0"/>
-          </a:p>
-          <a:p>
-            <a:r>
-              <a:rPr lang="nl-NL" dirty="0"/>
-              <a:t>Aantal planeten bereikt equilibrium</a:t>
-            </a:r>
-          </a:p>
-          <a:p>
-            <a:r>
-              <a:rPr lang="nl-NL" dirty="0"/>
-              <a:t>Voor groot aantal beginlichamen geen invloed</a:t>
-            </a:r>
-          </a:p>
-          <a:p>
-            <a:endParaRPr lang="nl-NL" dirty="0"/>
-          </a:p>
-          <a:p>
-            <a:r>
-              <a:rPr lang="nl-NL" dirty="0"/>
-              <a:t>Model nauwkeurig genoeg</a:t>
-            </a:r>
-          </a:p>
-          <a:p>
-            <a:endParaRPr lang="nl-NL" dirty="0"/>
-          </a:p>
-          <a:p>
-            <a:endParaRPr lang="nl-NL" dirty="0"/>
-          </a:p>
-        </p:txBody>
-      </p:sp>
-    </p:spTree>
-    <p:extLst>
-      <p:ext uri="{BB962C8B-B14F-4D97-AF65-F5344CB8AC3E}">
-        <p14:creationId xmlns:p14="http://schemas.microsoft.com/office/powerpoint/2010/main" val="2551201508"/>
-      </p:ext>
-    </p:extLst>
-  </p:cSld>
-  <p:clrMapOvr>
-    <a:masterClrMapping/>
-  </p:clrMapOvr>
+  <p:timing>
+    <p:tnLst>
+      <p:par>
+        <p:cTn id="1" dur="indefinite" restart="never" nodeType="tmRoot"/>
+      </p:par>
+    </p:tnLst>
+  </p:timing>
 </p:sld>
 </file>
 
@@ -6968,6 +7789,223 @@
           <a:chExt cx="0" cy="0"/>
         </a:xfrm>
       </p:grpSpPr>
+      <p:pic>
+        <p:nvPicPr>
+          <p:cNvPr id="4" name="Tijdelijke aanduiding voor inhoud 3"/>
+          <p:cNvPicPr>
+            <a:picLocks noGrp="1" noChangeAspect="1"/>
+          </p:cNvPicPr>
+          <p:nvPr>
+            <p:ph idx="1"/>
+          </p:nvPr>
+        </p:nvPicPr>
+        <p:blipFill>
+          <a:blip r:embed="rId2">
+            <a:extLst>
+              <a:ext uri="{28A0092B-C50C-407E-A947-70E740481C1C}">
+                <a14:useLocalDpi xmlns:a14="http://schemas.microsoft.com/office/drawing/2010/main" val="0"/>
+              </a:ext>
+            </a:extLst>
+          </a:blip>
+          <a:stretch>
+            <a:fillRect/>
+          </a:stretch>
+        </p:blipFill>
+        <p:spPr>
+          <a:xfrm>
+            <a:off x="610313" y="1938746"/>
+            <a:ext cx="5304668" cy="4351338"/>
+          </a:xfrm>
+        </p:spPr>
+      </p:pic>
+      <p:pic>
+        <p:nvPicPr>
+          <p:cNvPr id="5" name="Afbeelding 4"/>
+          <p:cNvPicPr>
+            <a:picLocks noChangeAspect="1"/>
+          </p:cNvPicPr>
+          <p:nvPr/>
+        </p:nvPicPr>
+        <p:blipFill>
+          <a:blip r:embed="rId3">
+            <a:extLst>
+              <a:ext uri="{28A0092B-C50C-407E-A947-70E740481C1C}">
+                <a14:useLocalDpi xmlns:a14="http://schemas.microsoft.com/office/drawing/2010/main" val="0"/>
+              </a:ext>
+            </a:extLst>
+          </a:blip>
+          <a:stretch>
+            <a:fillRect/>
+          </a:stretch>
+        </p:blipFill>
+        <p:spPr>
+          <a:xfrm>
+            <a:off x="6123354" y="1893722"/>
+            <a:ext cx="5403238" cy="4463132"/>
+          </a:xfrm>
+          <a:prstGeom prst="rect">
+            <a:avLst/>
+          </a:prstGeom>
+        </p:spPr>
+      </p:pic>
+    </p:spTree>
+    <p:extLst>
+      <p:ext uri="{BB962C8B-B14F-4D97-AF65-F5344CB8AC3E}">
+        <p14:creationId xmlns:p14="http://schemas.microsoft.com/office/powerpoint/2010/main" val="1028094166"/>
+      </p:ext>
+    </p:extLst>
+  </p:cSld>
+  <p:clrMapOvr>
+    <a:masterClrMapping/>
+  </p:clrMapOvr>
+  <p:timing>
+    <p:tnLst>
+      <p:par>
+        <p:cTn id="1" dur="indefinite" restart="never" nodeType="tmRoot"/>
+      </p:par>
+    </p:tnLst>
+  </p:timing>
+</p:sld>
+</file>
+
+<file path=ppt/slides/slide14.xml><?xml version="1.0" encoding="utf-8"?>
+<p:sld xmlns:a="http://schemas.openxmlformats.org/drawingml/2006/main" xmlns:r="http://schemas.openxmlformats.org/officeDocument/2006/relationships" xmlns:p="http://schemas.openxmlformats.org/presentationml/2006/main">
+  <p:cSld>
+    <p:spTree>
+      <p:nvGrpSpPr>
+        <p:cNvPr id="1" name=""/>
+        <p:cNvGrpSpPr/>
+        <p:nvPr/>
+      </p:nvGrpSpPr>
+      <p:grpSpPr>
+        <a:xfrm>
+          <a:off x="0" y="0"/>
+          <a:ext cx="0" cy="0"/>
+          <a:chOff x="0" y="0"/>
+          <a:chExt cx="0" cy="0"/>
+        </a:xfrm>
+      </p:grpSpPr>
+      <p:sp>
+        <p:nvSpPr>
+          <p:cNvPr id="2" name="Titel 1"/>
+          <p:cNvSpPr>
+            <a:spLocks noGrp="1"/>
+          </p:cNvSpPr>
+          <p:nvPr>
+            <p:ph type="title"/>
+          </p:nvPr>
+        </p:nvSpPr>
+        <p:spPr/>
+        <p:txBody>
+          <a:bodyPr/>
+          <a:lstStyle/>
+          <a:p>
+            <a:r>
+              <a:rPr lang="nl-NL" dirty="0"/>
+              <a:t>Conclusie</a:t>
+            </a:r>
+          </a:p>
+        </p:txBody>
+      </p:sp>
+      <p:sp>
+        <p:nvSpPr>
+          <p:cNvPr id="3" name="Tijdelijke aanduiding voor inhoud 2"/>
+          <p:cNvSpPr>
+            <a:spLocks noGrp="1"/>
+          </p:cNvSpPr>
+          <p:nvPr>
+            <p:ph idx="1"/>
+          </p:nvPr>
+        </p:nvSpPr>
+        <p:spPr/>
+        <p:txBody>
+          <a:bodyPr/>
+          <a:lstStyle/>
+          <a:p>
+            <a:r>
+              <a:rPr lang="nl-NL" dirty="0"/>
+              <a:t>Barnes-Hut voor sneller programma</a:t>
+            </a:r>
+          </a:p>
+          <a:p>
+            <a:r>
+              <a:rPr lang="nl-NL" dirty="0" err="1"/>
+              <a:t>Leapfrog</a:t>
+            </a:r>
+            <a:r>
+              <a:rPr lang="nl-NL" dirty="0"/>
+              <a:t> voor goede integratie</a:t>
+            </a:r>
+          </a:p>
+          <a:p>
+            <a:endParaRPr lang="nl-NL" dirty="0"/>
+          </a:p>
+          <a:p>
+            <a:r>
+              <a:rPr lang="nl-NL" dirty="0"/>
+              <a:t>Aantal planeten bereikt equilibrium</a:t>
+            </a:r>
+          </a:p>
+          <a:p>
+            <a:r>
+              <a:rPr lang="nl-NL" dirty="0"/>
+              <a:t>Voor groot aantal beginlichamen geen invloed</a:t>
+            </a:r>
+          </a:p>
+          <a:p>
+            <a:endParaRPr lang="nl-NL" dirty="0"/>
+          </a:p>
+          <a:p>
+            <a:r>
+              <a:rPr lang="nl-NL" dirty="0"/>
+              <a:t>Model nauwkeurig genoeg</a:t>
+            </a:r>
+          </a:p>
+          <a:p>
+            <a:endParaRPr lang="nl-NL" dirty="0"/>
+          </a:p>
+          <a:p>
+            <a:endParaRPr lang="nl-NL" dirty="0"/>
+          </a:p>
+        </p:txBody>
+      </p:sp>
+    </p:spTree>
+    <p:extLst>
+      <p:ext uri="{BB962C8B-B14F-4D97-AF65-F5344CB8AC3E}">
+        <p14:creationId xmlns:p14="http://schemas.microsoft.com/office/powerpoint/2010/main" val="2551201508"/>
+      </p:ext>
+    </p:extLst>
+  </p:cSld>
+  <p:clrMapOvr>
+    <a:masterClrMapping/>
+  </p:clrMapOvr>
+  <p:timing>
+    <p:tnLst>
+      <p:par>
+        <p:cTn id="1" dur="indefinite" restart="never" nodeType="tmRoot"/>
+      </p:par>
+    </p:tnLst>
+  </p:timing>
+</p:sld>
+</file>
+
+<file path=ppt/slides/slide15.xml><?xml version="1.0" encoding="utf-8"?>
+<p:sld xmlns:a="http://schemas.openxmlformats.org/drawingml/2006/main" xmlns:r="http://schemas.openxmlformats.org/officeDocument/2006/relationships" xmlns:p="http://schemas.openxmlformats.org/presentationml/2006/main">
+  <p:cSld>
+    <p:spTree>
+      <p:nvGrpSpPr>
+        <p:cNvPr id="1" name=""/>
+        <p:cNvGrpSpPr/>
+        <p:nvPr/>
+      </p:nvGrpSpPr>
+      <p:grpSpPr>
+        <a:xfrm>
+          <a:off x="0" y="0"/>
+          <a:ext cx="0" cy="0"/>
+          <a:chOff x="0" y="0"/>
+          <a:chExt cx="0" cy="0"/>
+        </a:xfrm>
+      </p:grpSpPr>
       <p:sp>
         <p:nvSpPr>
           <p:cNvPr id="2" name="Titel 1"/>
@@ -7019,6 +8057,13 @@
   <p:clrMapOvr>
     <a:masterClrMapping/>
   </p:clrMapOvr>
+  <p:timing>
+    <p:tnLst>
+      <p:par>
+        <p:cTn id="1" dur="indefinite" restart="never" nodeType="tmRoot"/>
+      </p:par>
+    </p:tnLst>
+  </p:timing>
 </p:sld>
 </file>
 
@@ -7120,6 +8165,13 @@
   <p:clrMapOvr>
     <a:masterClrMapping/>
   </p:clrMapOvr>
+  <p:timing>
+    <p:tnLst>
+      <p:par>
+        <p:cTn id="1" dur="indefinite" restart="never" nodeType="tmRoot"/>
+      </p:par>
+    </p:tnLst>
+  </p:timing>
 </p:sld>
 </file>
 
@@ -7227,6 +8279,13 @@
   <p:clrMapOvr>
     <a:masterClrMapping/>
   </p:clrMapOvr>
+  <p:timing>
+    <p:tnLst>
+      <p:par>
+        <p:cTn id="1" dur="indefinite" restart="never" nodeType="tmRoot"/>
+      </p:par>
+    </p:tnLst>
+  </p:timing>
 </p:sld>
 </file>
 
@@ -7934,6 +8993,13 @@
   <p:clrMapOvr>
     <a:masterClrMapping/>
   </p:clrMapOvr>
+  <p:timing>
+    <p:tnLst>
+      <p:par>
+        <p:cTn id="1" dur="indefinite" restart="never" nodeType="tmRoot"/>
+      </p:par>
+    </p:tnLst>
+  </p:timing>
 </p:sld>
 </file>
 
@@ -8008,19 +9074,99 @@
               <a:p>
                 <a:r>
                   <a:rPr lang="nl-NL"/>
-                  <a:t>Stabiel voor oscillaties</a:t>
+                  <a:t>Stabiel voor </a:t>
+                </a:r>
+                <a:r>
+                  <a:rPr lang="nl-NL" smtClean="0"/>
+                  <a:t>oscillaties</a:t>
                 </a:r>
               </a:p>
               <a:p>
                 <a:pPr lvl="1"/>
+                <a14:m>
+                  <m:oMath xmlns:m="http://schemas.openxmlformats.org/officeDocument/2006/math">
+                    <m:r>
+                      <a:rPr lang="nl-NL" sz="2400" i="1">
+                        <a:latin typeface="Cambria Math"/>
+                        <a:ea typeface="Cambria Math"/>
+                      </a:rPr>
+                      <m:t>∆</m:t>
+                    </m:r>
+                    <m:r>
+                      <a:rPr lang="nl-NL" sz="2400" i="1">
+                        <a:latin typeface="Cambria Math"/>
+                        <a:ea typeface="Cambria Math"/>
+                      </a:rPr>
+                      <m:t>𝑡</m:t>
+                    </m:r>
+                    <m:r>
+                      <a:rPr lang="nl-NL" sz="2400" i="1">
+                        <a:latin typeface="Cambria Math"/>
+                        <a:ea typeface="Cambria Math"/>
+                      </a:rPr>
+                      <m:t>≤</m:t>
+                    </m:r>
+                    <m:f>
+                      <m:fPr>
+                        <m:ctrlPr>
+                          <a:rPr lang="nl-NL" sz="2400" i="1">
+                            <a:latin typeface="Cambria Math"/>
+                            <a:ea typeface="Cambria Math"/>
+                          </a:rPr>
+                        </m:ctrlPr>
+                      </m:fPr>
+                      <m:num>
+                        <m:r>
+                          <a:rPr lang="nl-NL" sz="2400" i="1">
+                            <a:latin typeface="Cambria Math"/>
+                            <a:ea typeface="Cambria Math"/>
+                          </a:rPr>
+                          <m:t>2</m:t>
+                        </m:r>
+                      </m:num>
+                      <m:den>
+                        <m:r>
+                          <a:rPr lang="nl-NL" sz="2400" i="1">
+                            <a:latin typeface="Cambria Math"/>
+                            <a:ea typeface="Cambria Math"/>
+                          </a:rPr>
+                          <m:t>𝜔</m:t>
+                        </m:r>
+                      </m:den>
+                    </m:f>
+                    <m:r>
+                      <a:rPr lang="nl-NL" sz="2400" b="0" i="0" smtClean="0">
+                        <a:latin typeface="Cambria Math"/>
+                        <a:ea typeface="Cambria Math"/>
+                      </a:rPr>
+                      <m:t> ,</m:t>
+                    </m:r>
+                  </m:oMath>
+                </a14:m>
                 <a:r>
-                  <a:rPr lang="nl-NL"/>
-                  <a:t>Dus ook voor cirkelbewegingen</a:t>
+                  <a:rPr lang="nl-NL" smtClean="0"/>
+                  <a:t> </a:t>
                 </a:r>
+                <a14:m>
+                  <m:oMath xmlns:m="http://schemas.openxmlformats.org/officeDocument/2006/math">
+                    <m:r>
+                      <a:rPr lang="nl-NL" sz="2400" i="1">
+                        <a:latin typeface="Cambria Math"/>
+                        <a:ea typeface="Cambria Math"/>
+                      </a:rPr>
+                      <m:t>𝜔</m:t>
+                    </m:r>
+                  </m:oMath>
+                </a14:m>
+                <a:r>
+                  <a:rPr lang="nl-NL" smtClean="0"/>
+                  <a:t>: hoekfrequentie</a:t>
+                </a:r>
+                <a:endParaRPr lang="nl-NL"/>
               </a:p>
               <a:p>
                 <a:r>
-                  <a:rPr lang="nl-NL"/>
+                  <a:rPr lang="nl-NL" smtClean="0"/>
                   <a:t>Formule</a:t>
                 </a:r>
                 <a:r>
@@ -8472,6 +9618,13 @@
   <p:clrMapOvr>
     <a:masterClrMapping/>
   </p:clrMapOvr>
+  <p:timing>
+    <p:tnLst>
+      <p:par>
+        <p:cTn id="1" dur="indefinite" restart="never" nodeType="tmRoot"/>
+      </p:par>
+    </p:tnLst>
+  </p:timing>
 </p:sld>
 </file>
 
@@ -8642,10 +9795,1197 @@
   <p:clrMapOvr>
     <a:masterClrMapping/>
   </p:clrMapOvr>
+  <p:timing>
+    <p:tnLst>
+      <p:par>
+        <p:cTn id="1" dur="indefinite" restart="never" nodeType="tmRoot"/>
+      </p:par>
+    </p:tnLst>
+  </p:timing>
 </p:sld>
 </file>
 
 <file path=ppt/slides/slide7.xml><?xml version="1.0" encoding="utf-8"?>
+<p:sld xmlns:a="http://schemas.openxmlformats.org/drawingml/2006/main" xmlns:r="http://schemas.openxmlformats.org/officeDocument/2006/relationships" xmlns:p="http://schemas.openxmlformats.org/presentationml/2006/main">
+  <p:cSld>
+    <p:spTree>
+      <p:nvGrpSpPr>
+        <p:cNvPr id="1" name="Shape 183"/>
+        <p:cNvGrpSpPr/>
+        <p:nvPr/>
+      </p:nvGrpSpPr>
+      <p:grpSpPr>
+        <a:xfrm>
+          <a:off x="0" y="0"/>
+          <a:ext cx="0" cy="0"/>
+          <a:chOff x="0" y="0"/>
+          <a:chExt cx="0" cy="0"/>
+        </a:xfrm>
+      </p:grpSpPr>
+      <p:pic>
+        <p:nvPicPr>
+          <p:cNvPr id="184" name="Shape 184" descr="barneshut_map_snelheid.png"/>
+          <p:cNvPicPr preferRelativeResize="0"/>
+          <p:nvPr/>
+        </p:nvPicPr>
+        <p:blipFill>
+          <a:blip r:embed="rId3">
+            <a:alphaModFix/>
+          </a:blip>
+          <a:stretch>
+            <a:fillRect/>
+          </a:stretch>
+        </p:blipFill>
+        <p:spPr>
+          <a:xfrm>
+            <a:off x="7572375" y="2064237"/>
+            <a:ext cx="3933825" cy="3933825"/>
+          </a:xfrm>
+          <a:prstGeom prst="rect">
+            <a:avLst/>
+          </a:prstGeom>
+          <a:noFill/>
+          <a:ln>
+            <a:noFill/>
+          </a:ln>
+        </p:spPr>
+      </p:pic>
+      <p:sp>
+        <p:nvSpPr>
+          <p:cNvPr id="185" name="Shape 185"/>
+          <p:cNvSpPr txBox="1">
+            <a:spLocks noGrp="1"/>
+          </p:cNvSpPr>
+          <p:nvPr>
+            <p:ph type="title"/>
+          </p:nvPr>
+        </p:nvSpPr>
+        <p:spPr>
+          <a:xfrm>
+            <a:off x="2895600" y="764372"/>
+            <a:ext cx="8610599" cy="1293027"/>
+          </a:xfrm>
+          <a:prstGeom prst="rect">
+            <a:avLst/>
+          </a:prstGeom>
+          <a:noFill/>
+          <a:ln>
+            <a:noFill/>
+          </a:ln>
+        </p:spPr>
+        <p:txBody>
+          <a:bodyPr lIns="91425" tIns="45700" rIns="91425" bIns="45700" anchor="ctr" anchorCtr="0">
+            <a:noAutofit/>
+          </a:bodyPr>
+          <a:lstStyle/>
+          <a:p>
+            <a:pPr marL="0" marR="0" lvl="0" indent="0" algn="r" rtl="0">
+              <a:lnSpc>
+                <a:spcPct val="90000"/>
+              </a:lnSpc>
+              <a:spcBef>
+                <a:spcPts val="0"/>
+              </a:spcBef>
+              <a:buClr>
+                <a:schemeClr val="dk1"/>
+              </a:buClr>
+              <a:buSzPct val="25000"/>
+              <a:buFont typeface="Century Gothic"/>
+              <a:buNone/>
+            </a:pPr>
+            <a:r>
+              <a:rPr lang="nl-NL" sz="4000" b="0" i="0" u="none" strike="noStrike" cap="none">
+                <a:solidFill>
+                  <a:schemeClr val="dk1"/>
+                </a:solidFill>
+                <a:latin typeface="Century Gothic"/>
+                <a:ea typeface="Century Gothic"/>
+                <a:cs typeface="Century Gothic"/>
+                <a:sym typeface="Century Gothic"/>
+              </a:rPr>
+              <a:t>BARNES-HUT VOOR BOTSINGEN</a:t>
+            </a:r>
+          </a:p>
+        </p:txBody>
+      </p:sp>
+      <p:sp>
+        <p:nvSpPr>
+          <p:cNvPr id="186" name="Shape 186"/>
+          <p:cNvSpPr txBox="1">
+            <a:spLocks noGrp="1"/>
+          </p:cNvSpPr>
+          <p:nvPr>
+            <p:ph type="body" idx="1"/>
+          </p:nvPr>
+        </p:nvSpPr>
+        <p:spPr>
+          <a:xfrm>
+            <a:off x="838200" y="1825210"/>
+            <a:ext cx="4998155" cy="4654198"/>
+          </a:xfrm>
+          <a:prstGeom prst="rect">
+            <a:avLst/>
+          </a:prstGeom>
+          <a:noFill/>
+          <a:ln>
+            <a:noFill/>
+          </a:ln>
+        </p:spPr>
+        <p:txBody>
+          <a:bodyPr lIns="91425" tIns="45700" rIns="91425" bIns="45700" anchor="t" anchorCtr="0">
+            <a:noAutofit/>
+          </a:bodyPr>
+          <a:lstStyle/>
+          <a:p>
+            <a:pPr marL="228600" marR="0" lvl="0" indent="-228600" algn="l" rtl="0">
+              <a:lnSpc>
+                <a:spcPct val="90000"/>
+              </a:lnSpc>
+              <a:spcBef>
+                <a:spcPts val="0"/>
+              </a:spcBef>
+              <a:spcAft>
+                <a:spcPts val="0"/>
+              </a:spcAft>
+              <a:buClr>
+                <a:schemeClr val="dk1"/>
+              </a:buClr>
+              <a:buSzPct val="100000"/>
+              <a:buFont typeface="Arial"/>
+              <a:buChar char="•"/>
+            </a:pPr>
+            <a:r>
+              <a:rPr lang="nl-NL" sz="2200" b="0" i="0" u="none" strike="noStrike" cap="none">
+                <a:solidFill>
+                  <a:schemeClr val="dk1"/>
+                </a:solidFill>
+                <a:latin typeface="Century Gothic"/>
+                <a:ea typeface="Century Gothic"/>
+                <a:cs typeface="Century Gothic"/>
+                <a:sym typeface="Century Gothic"/>
+              </a:rPr>
+              <a:t>Langzaam model; orde N²</a:t>
+            </a:r>
+          </a:p>
+          <a:p>
+            <a:pPr marL="228600" marR="0" lvl="0" indent="-228600" algn="l" rtl="0">
+              <a:lnSpc>
+                <a:spcPct val="90000"/>
+              </a:lnSpc>
+              <a:spcBef>
+                <a:spcPts val="1000"/>
+              </a:spcBef>
+              <a:spcAft>
+                <a:spcPts val="0"/>
+              </a:spcAft>
+              <a:buClr>
+                <a:schemeClr val="dk1"/>
+              </a:buClr>
+              <a:buSzPct val="100000"/>
+              <a:buFont typeface="Arial"/>
+              <a:buChar char="•"/>
+            </a:pPr>
+            <a:r>
+              <a:rPr lang="nl-NL" sz="2200" b="0" i="0" u="none" strike="noStrike" cap="none">
+                <a:solidFill>
+                  <a:schemeClr val="dk1"/>
+                </a:solidFill>
+                <a:latin typeface="Century Gothic"/>
+                <a:ea typeface="Century Gothic"/>
+                <a:cs typeface="Century Gothic"/>
+                <a:sym typeface="Century Gothic"/>
+              </a:rPr>
+              <a:t>Rond elk deeltje rechthoek met grenzen gebaseerd op straal en snelheid</a:t>
+            </a:r>
+          </a:p>
+          <a:p>
+            <a:pPr marL="228600" marR="0" lvl="0" indent="-228600" algn="l" rtl="0">
+              <a:lnSpc>
+                <a:spcPct val="90000"/>
+              </a:lnSpc>
+              <a:spcBef>
+                <a:spcPts val="1000"/>
+              </a:spcBef>
+              <a:spcAft>
+                <a:spcPts val="0"/>
+              </a:spcAft>
+              <a:buClr>
+                <a:schemeClr val="dk1"/>
+              </a:buClr>
+              <a:buSzPct val="100000"/>
+              <a:buFont typeface="Arial"/>
+              <a:buChar char="•"/>
+            </a:pPr>
+            <a:r>
+              <a:rPr lang="nl-NL" sz="2200" b="0" i="0" u="none" strike="noStrike" cap="none">
+                <a:solidFill>
+                  <a:schemeClr val="dk1"/>
+                </a:solidFill>
+                <a:latin typeface="Century Gothic"/>
+                <a:ea typeface="Century Gothic"/>
+                <a:cs typeface="Century Gothic"/>
+                <a:sym typeface="Century Gothic"/>
+              </a:rPr>
+              <a:t>Botsing mogelijk als en slechts als rechthoeken overlappen</a:t>
+            </a:r>
+          </a:p>
+          <a:p>
+            <a:pPr marL="228600" marR="0" lvl="0" indent="-228600" algn="l" rtl="0">
+              <a:lnSpc>
+                <a:spcPct val="90000"/>
+              </a:lnSpc>
+              <a:spcBef>
+                <a:spcPts val="1000"/>
+              </a:spcBef>
+              <a:spcAft>
+                <a:spcPts val="0"/>
+              </a:spcAft>
+              <a:buClr>
+                <a:schemeClr val="dk1"/>
+              </a:buClr>
+              <a:buSzPct val="100000"/>
+              <a:buFont typeface="Arial"/>
+              <a:buChar char="•"/>
+            </a:pPr>
+            <a:r>
+              <a:rPr lang="nl-NL" sz="2200" b="0" i="0" u="none" strike="noStrike" cap="none">
+                <a:solidFill>
+                  <a:schemeClr val="dk1"/>
+                </a:solidFill>
+                <a:latin typeface="Century Gothic"/>
+                <a:ea typeface="Century Gothic"/>
+                <a:cs typeface="Century Gothic"/>
+                <a:sym typeface="Century Gothic"/>
+              </a:rPr>
+              <a:t>Barnes-Hut boom: minimum van de minima, maximum van de maxima</a:t>
+            </a:r>
+          </a:p>
+          <a:p>
+            <a:pPr marL="228600" marR="0" lvl="0" indent="-228600" algn="l" rtl="0">
+              <a:lnSpc>
+                <a:spcPct val="90000"/>
+              </a:lnSpc>
+              <a:spcBef>
+                <a:spcPts val="1000"/>
+              </a:spcBef>
+              <a:spcAft>
+                <a:spcPts val="0"/>
+              </a:spcAft>
+              <a:buClr>
+                <a:schemeClr val="dk1"/>
+              </a:buClr>
+              <a:buSzPct val="100000"/>
+              <a:buFont typeface="Arial"/>
+              <a:buChar char="•"/>
+            </a:pPr>
+            <a:r>
+              <a:rPr lang="nl-NL" sz="2200" b="0" i="0" u="none" strike="noStrike" cap="none">
+                <a:solidFill>
+                  <a:schemeClr val="dk1"/>
+                </a:solidFill>
+                <a:latin typeface="Century Gothic"/>
+                <a:ea typeface="Century Gothic"/>
+                <a:cs typeface="Century Gothic"/>
+                <a:sym typeface="Century Gothic"/>
+              </a:rPr>
+              <a:t>Algoritme wel exact</a:t>
+            </a:r>
+          </a:p>
+          <a:p>
+            <a:pPr marL="228600" marR="0" lvl="0" indent="-228600" algn="l" rtl="0">
+              <a:lnSpc>
+                <a:spcPct val="90000"/>
+              </a:lnSpc>
+              <a:spcBef>
+                <a:spcPts val="1000"/>
+              </a:spcBef>
+              <a:buClr>
+                <a:schemeClr val="dk1"/>
+              </a:buClr>
+              <a:buSzPct val="100000"/>
+              <a:buFont typeface="Arial"/>
+              <a:buChar char="•"/>
+            </a:pPr>
+            <a:r>
+              <a:rPr lang="nl-NL" sz="2200" b="0" i="0" u="none" strike="noStrike" cap="none">
+                <a:solidFill>
+                  <a:schemeClr val="dk1"/>
+                </a:solidFill>
+                <a:latin typeface="Century Gothic"/>
+                <a:ea typeface="Century Gothic"/>
+                <a:cs typeface="Century Gothic"/>
+                <a:sym typeface="Century Gothic"/>
+              </a:rPr>
+              <a:t>orde N· log(N)</a:t>
+            </a:r>
+          </a:p>
+        </p:txBody>
+      </p:sp>
+      <p:pic>
+        <p:nvPicPr>
+          <p:cNvPr id="187" name="Shape 187"/>
+          <p:cNvPicPr preferRelativeResize="0"/>
+          <p:nvPr/>
+        </p:nvPicPr>
+        <p:blipFill rotWithShape="1">
+          <a:blip r:embed="rId4">
+            <a:alphaModFix/>
+          </a:blip>
+          <a:srcRect/>
+          <a:stretch/>
+        </p:blipFill>
+        <p:spPr>
+          <a:xfrm>
+            <a:off x="4307441" y="5140371"/>
+            <a:ext cx="2809476" cy="1717628"/>
+          </a:xfrm>
+          <a:prstGeom prst="rect">
+            <a:avLst/>
+          </a:prstGeom>
+          <a:noFill/>
+          <a:ln>
+            <a:noFill/>
+          </a:ln>
+        </p:spPr>
+      </p:pic>
+      <p:sp>
+        <p:nvSpPr>
+          <p:cNvPr id="188" name="Shape 188"/>
+          <p:cNvSpPr/>
+          <p:nvPr/>
+        </p:nvSpPr>
+        <p:spPr>
+          <a:xfrm>
+            <a:off x="9985750" y="4148175"/>
+            <a:ext cx="411900" cy="153600"/>
+          </a:xfrm>
+          <a:prstGeom prst="rect">
+            <a:avLst/>
+          </a:prstGeom>
+          <a:noFill/>
+          <a:ln w="19050" cap="flat" cmpd="sng">
+            <a:solidFill>
+              <a:srgbClr val="FF0000"/>
+            </a:solidFill>
+            <a:prstDash val="solid"/>
+            <a:round/>
+            <a:headEnd type="none" w="med" len="med"/>
+            <a:tailEnd type="none" w="med" len="med"/>
+          </a:ln>
+        </p:spPr>
+        <p:txBody>
+          <a:bodyPr lIns="91425" tIns="91425" rIns="91425" bIns="91425" anchor="ctr" anchorCtr="0">
+            <a:noAutofit/>
+          </a:bodyPr>
+          <a:lstStyle/>
+          <a:p>
+            <a:pPr lvl="0">
+              <a:spcBef>
+                <a:spcPts val="0"/>
+              </a:spcBef>
+              <a:buNone/>
+            </a:pPr>
+            <a:endParaRPr/>
+          </a:p>
+        </p:txBody>
+      </p:sp>
+      <p:sp>
+        <p:nvSpPr>
+          <p:cNvPr id="189" name="Shape 189"/>
+          <p:cNvSpPr/>
+          <p:nvPr/>
+        </p:nvSpPr>
+        <p:spPr>
+          <a:xfrm>
+            <a:off x="9838125" y="4012400"/>
+            <a:ext cx="265500" cy="426300"/>
+          </a:xfrm>
+          <a:prstGeom prst="rect">
+            <a:avLst/>
+          </a:prstGeom>
+          <a:noFill/>
+          <a:ln w="19050" cap="flat" cmpd="sng">
+            <a:solidFill>
+              <a:srgbClr val="FF0000"/>
+            </a:solidFill>
+            <a:prstDash val="solid"/>
+            <a:round/>
+            <a:headEnd type="none" w="med" len="med"/>
+            <a:tailEnd type="none" w="med" len="med"/>
+          </a:ln>
+        </p:spPr>
+        <p:txBody>
+          <a:bodyPr lIns="91425" tIns="91425" rIns="91425" bIns="91425" anchor="ctr" anchorCtr="0">
+            <a:noAutofit/>
+          </a:bodyPr>
+          <a:lstStyle/>
+          <a:p>
+            <a:pPr lvl="0" rtl="0">
+              <a:spcBef>
+                <a:spcPts val="0"/>
+              </a:spcBef>
+              <a:buNone/>
+            </a:pPr>
+            <a:endParaRPr/>
+          </a:p>
+        </p:txBody>
+      </p:sp>
+      <p:sp>
+        <p:nvSpPr>
+          <p:cNvPr id="190" name="Shape 190"/>
+          <p:cNvSpPr/>
+          <p:nvPr/>
+        </p:nvSpPr>
+        <p:spPr>
+          <a:xfrm>
+            <a:off x="11091875" y="3752850"/>
+            <a:ext cx="195300" cy="359400"/>
+          </a:xfrm>
+          <a:prstGeom prst="rect">
+            <a:avLst/>
+          </a:prstGeom>
+          <a:noFill/>
+          <a:ln w="19050" cap="flat" cmpd="sng">
+            <a:solidFill>
+              <a:srgbClr val="FF0000"/>
+            </a:solidFill>
+            <a:prstDash val="solid"/>
+            <a:round/>
+            <a:headEnd type="none" w="med" len="med"/>
+            <a:tailEnd type="none" w="med" len="med"/>
+          </a:ln>
+        </p:spPr>
+        <p:txBody>
+          <a:bodyPr lIns="91425" tIns="91425" rIns="91425" bIns="91425" anchor="ctr" anchorCtr="0">
+            <a:noAutofit/>
+          </a:bodyPr>
+          <a:lstStyle/>
+          <a:p>
+            <a:pPr lvl="0" rtl="0">
+              <a:spcBef>
+                <a:spcPts val="0"/>
+              </a:spcBef>
+              <a:buNone/>
+            </a:pPr>
+            <a:endParaRPr/>
+          </a:p>
+        </p:txBody>
+      </p:sp>
+      <p:sp>
+        <p:nvSpPr>
+          <p:cNvPr id="191" name="Shape 191"/>
+          <p:cNvSpPr/>
+          <p:nvPr/>
+        </p:nvSpPr>
+        <p:spPr>
+          <a:xfrm>
+            <a:off x="9335750" y="4438650"/>
+            <a:ext cx="75000" cy="210900"/>
+          </a:xfrm>
+          <a:prstGeom prst="rect">
+            <a:avLst/>
+          </a:prstGeom>
+          <a:noFill/>
+          <a:ln w="19050" cap="flat" cmpd="sng">
+            <a:solidFill>
+              <a:srgbClr val="FF0000"/>
+            </a:solidFill>
+            <a:prstDash val="solid"/>
+            <a:round/>
+            <a:headEnd type="none" w="med" len="med"/>
+            <a:tailEnd type="none" w="med" len="med"/>
+          </a:ln>
+        </p:spPr>
+        <p:txBody>
+          <a:bodyPr lIns="91425" tIns="91425" rIns="91425" bIns="91425" anchor="ctr" anchorCtr="0">
+            <a:noAutofit/>
+          </a:bodyPr>
+          <a:lstStyle/>
+          <a:p>
+            <a:pPr lvl="0" rtl="0">
+              <a:spcBef>
+                <a:spcPts val="0"/>
+              </a:spcBef>
+              <a:buNone/>
+            </a:pPr>
+            <a:endParaRPr/>
+          </a:p>
+        </p:txBody>
+      </p:sp>
+      <p:sp>
+        <p:nvSpPr>
+          <p:cNvPr id="192" name="Shape 192"/>
+          <p:cNvSpPr/>
+          <p:nvPr/>
+        </p:nvSpPr>
+        <p:spPr>
+          <a:xfrm>
+            <a:off x="10252450" y="5222100"/>
+            <a:ext cx="145200" cy="278700"/>
+          </a:xfrm>
+          <a:prstGeom prst="rect">
+            <a:avLst/>
+          </a:prstGeom>
+          <a:noFill/>
+          <a:ln w="19050" cap="flat" cmpd="sng">
+            <a:solidFill>
+              <a:srgbClr val="FF0000"/>
+            </a:solidFill>
+            <a:prstDash val="solid"/>
+            <a:round/>
+            <a:headEnd type="none" w="med" len="med"/>
+            <a:tailEnd type="none" w="med" len="med"/>
+          </a:ln>
+        </p:spPr>
+        <p:txBody>
+          <a:bodyPr lIns="91425" tIns="91425" rIns="91425" bIns="91425" anchor="ctr" anchorCtr="0">
+            <a:noAutofit/>
+          </a:bodyPr>
+          <a:lstStyle/>
+          <a:p>
+            <a:pPr lvl="0" rtl="0">
+              <a:spcBef>
+                <a:spcPts val="0"/>
+              </a:spcBef>
+              <a:buNone/>
+            </a:pPr>
+            <a:endParaRPr/>
+          </a:p>
+        </p:txBody>
+      </p:sp>
+      <p:sp>
+        <p:nvSpPr>
+          <p:cNvPr id="193" name="Shape 193"/>
+          <p:cNvSpPr/>
+          <p:nvPr/>
+        </p:nvSpPr>
+        <p:spPr>
+          <a:xfrm>
+            <a:off x="10452475" y="5242425"/>
+            <a:ext cx="163200" cy="109500"/>
+          </a:xfrm>
+          <a:prstGeom prst="rect">
+            <a:avLst/>
+          </a:prstGeom>
+          <a:noFill/>
+          <a:ln w="19050" cap="flat" cmpd="sng">
+            <a:solidFill>
+              <a:srgbClr val="FF0000"/>
+            </a:solidFill>
+            <a:prstDash val="solid"/>
+            <a:round/>
+            <a:headEnd type="none" w="med" len="med"/>
+            <a:tailEnd type="none" w="med" len="med"/>
+          </a:ln>
+        </p:spPr>
+        <p:txBody>
+          <a:bodyPr lIns="91425" tIns="91425" rIns="91425" bIns="91425" anchor="ctr" anchorCtr="0">
+            <a:noAutofit/>
+          </a:bodyPr>
+          <a:lstStyle/>
+          <a:p>
+            <a:pPr lvl="0" rtl="0">
+              <a:spcBef>
+                <a:spcPts val="0"/>
+              </a:spcBef>
+              <a:buNone/>
+            </a:pPr>
+            <a:endParaRPr/>
+          </a:p>
+        </p:txBody>
+      </p:sp>
+      <p:sp>
+        <p:nvSpPr>
+          <p:cNvPr id="194" name="Shape 194"/>
+          <p:cNvSpPr/>
+          <p:nvPr/>
+        </p:nvSpPr>
+        <p:spPr>
+          <a:xfrm>
+            <a:off x="9436900" y="5710250"/>
+            <a:ext cx="237000" cy="79800"/>
+          </a:xfrm>
+          <a:prstGeom prst="rect">
+            <a:avLst/>
+          </a:prstGeom>
+          <a:noFill/>
+          <a:ln w="19050" cap="flat" cmpd="sng">
+            <a:solidFill>
+              <a:srgbClr val="FF0000"/>
+            </a:solidFill>
+            <a:prstDash val="solid"/>
+            <a:round/>
+            <a:headEnd type="none" w="med" len="med"/>
+            <a:tailEnd type="none" w="med" len="med"/>
+          </a:ln>
+        </p:spPr>
+        <p:txBody>
+          <a:bodyPr lIns="91425" tIns="91425" rIns="91425" bIns="91425" anchor="ctr" anchorCtr="0">
+            <a:noAutofit/>
+          </a:bodyPr>
+          <a:lstStyle/>
+          <a:p>
+            <a:pPr lvl="0" rtl="0">
+              <a:spcBef>
+                <a:spcPts val="0"/>
+              </a:spcBef>
+              <a:buNone/>
+            </a:pPr>
+            <a:endParaRPr/>
+          </a:p>
+        </p:txBody>
+      </p:sp>
+      <p:sp>
+        <p:nvSpPr>
+          <p:cNvPr id="195" name="Shape 195"/>
+          <p:cNvSpPr/>
+          <p:nvPr/>
+        </p:nvSpPr>
+        <p:spPr>
+          <a:xfrm>
+            <a:off x="7871225" y="5057825"/>
+            <a:ext cx="163200" cy="359400"/>
+          </a:xfrm>
+          <a:prstGeom prst="rect">
+            <a:avLst/>
+          </a:prstGeom>
+          <a:noFill/>
+          <a:ln w="19050" cap="flat" cmpd="sng">
+            <a:solidFill>
+              <a:srgbClr val="FF0000"/>
+            </a:solidFill>
+            <a:prstDash val="solid"/>
+            <a:round/>
+            <a:headEnd type="none" w="med" len="med"/>
+            <a:tailEnd type="none" w="med" len="med"/>
+          </a:ln>
+        </p:spPr>
+        <p:txBody>
+          <a:bodyPr lIns="91425" tIns="91425" rIns="91425" bIns="91425" anchor="ctr" anchorCtr="0">
+            <a:noAutofit/>
+          </a:bodyPr>
+          <a:lstStyle/>
+          <a:p>
+            <a:pPr lvl="0" rtl="0">
+              <a:spcBef>
+                <a:spcPts val="0"/>
+              </a:spcBef>
+              <a:buNone/>
+            </a:pPr>
+            <a:endParaRPr/>
+          </a:p>
+        </p:txBody>
+      </p:sp>
+      <p:sp>
+        <p:nvSpPr>
+          <p:cNvPr id="196" name="Shape 196"/>
+          <p:cNvSpPr/>
+          <p:nvPr/>
+        </p:nvSpPr>
+        <p:spPr>
+          <a:xfrm>
+            <a:off x="7871225" y="5057825"/>
+            <a:ext cx="183300" cy="359400"/>
+          </a:xfrm>
+          <a:prstGeom prst="rect">
+            <a:avLst/>
+          </a:prstGeom>
+          <a:noFill/>
+          <a:ln w="19050" cap="flat" cmpd="sng">
+            <a:solidFill>
+              <a:srgbClr val="FF0000"/>
+            </a:solidFill>
+            <a:prstDash val="solid"/>
+            <a:round/>
+            <a:headEnd type="none" w="med" len="med"/>
+            <a:tailEnd type="none" w="med" len="med"/>
+          </a:ln>
+        </p:spPr>
+        <p:txBody>
+          <a:bodyPr lIns="91425" tIns="91425" rIns="91425" bIns="91425" anchor="ctr" anchorCtr="0">
+            <a:noAutofit/>
+          </a:bodyPr>
+          <a:lstStyle/>
+          <a:p>
+            <a:pPr lvl="0" rtl="0">
+              <a:spcBef>
+                <a:spcPts val="0"/>
+              </a:spcBef>
+              <a:buNone/>
+            </a:pPr>
+            <a:endParaRPr/>
+          </a:p>
+        </p:txBody>
+      </p:sp>
+      <p:sp>
+        <p:nvSpPr>
+          <p:cNvPr id="197" name="Shape 197"/>
+          <p:cNvSpPr/>
+          <p:nvPr/>
+        </p:nvSpPr>
+        <p:spPr>
+          <a:xfrm>
+            <a:off x="8846200" y="3052775"/>
+            <a:ext cx="131100" cy="128700"/>
+          </a:xfrm>
+          <a:prstGeom prst="rect">
+            <a:avLst/>
+          </a:prstGeom>
+          <a:noFill/>
+          <a:ln w="19050" cap="flat" cmpd="sng">
+            <a:solidFill>
+              <a:srgbClr val="FF0000"/>
+            </a:solidFill>
+            <a:prstDash val="solid"/>
+            <a:round/>
+            <a:headEnd type="none" w="med" len="med"/>
+            <a:tailEnd type="none" w="med" len="med"/>
+          </a:ln>
+        </p:spPr>
+        <p:txBody>
+          <a:bodyPr lIns="91425" tIns="91425" rIns="91425" bIns="91425" anchor="ctr" anchorCtr="0">
+            <a:noAutofit/>
+          </a:bodyPr>
+          <a:lstStyle/>
+          <a:p>
+            <a:pPr lvl="0" rtl="0">
+              <a:spcBef>
+                <a:spcPts val="0"/>
+              </a:spcBef>
+              <a:buNone/>
+            </a:pPr>
+            <a:endParaRPr/>
+          </a:p>
+        </p:txBody>
+      </p:sp>
+      <p:sp>
+        <p:nvSpPr>
+          <p:cNvPr id="198" name="Shape 198"/>
+          <p:cNvSpPr/>
+          <p:nvPr/>
+        </p:nvSpPr>
+        <p:spPr>
+          <a:xfrm>
+            <a:off x="9479600" y="3114675"/>
+            <a:ext cx="145200" cy="178500"/>
+          </a:xfrm>
+          <a:prstGeom prst="rect">
+            <a:avLst/>
+          </a:prstGeom>
+          <a:noFill/>
+          <a:ln w="19050" cap="flat" cmpd="sng">
+            <a:solidFill>
+              <a:srgbClr val="FF0000"/>
+            </a:solidFill>
+            <a:prstDash val="solid"/>
+            <a:round/>
+            <a:headEnd type="none" w="med" len="med"/>
+            <a:tailEnd type="none" w="med" len="med"/>
+          </a:ln>
+        </p:spPr>
+        <p:txBody>
+          <a:bodyPr lIns="91425" tIns="91425" rIns="91425" bIns="91425" anchor="ctr" anchorCtr="0">
+            <a:noAutofit/>
+          </a:bodyPr>
+          <a:lstStyle/>
+          <a:p>
+            <a:pPr lvl="0" rtl="0">
+              <a:spcBef>
+                <a:spcPts val="0"/>
+              </a:spcBef>
+              <a:buNone/>
+            </a:pPr>
+            <a:endParaRPr/>
+          </a:p>
+        </p:txBody>
+      </p:sp>
+      <p:sp>
+        <p:nvSpPr>
+          <p:cNvPr id="199" name="Shape 199"/>
+          <p:cNvSpPr/>
+          <p:nvPr/>
+        </p:nvSpPr>
+        <p:spPr>
+          <a:xfrm>
+            <a:off x="9985750" y="2800350"/>
+            <a:ext cx="584400" cy="252300"/>
+          </a:xfrm>
+          <a:prstGeom prst="rect">
+            <a:avLst/>
+          </a:prstGeom>
+          <a:noFill/>
+          <a:ln w="19050" cap="flat" cmpd="sng">
+            <a:solidFill>
+              <a:srgbClr val="FF0000"/>
+            </a:solidFill>
+            <a:prstDash val="solid"/>
+            <a:round/>
+            <a:headEnd type="none" w="med" len="med"/>
+            <a:tailEnd type="none" w="med" len="med"/>
+          </a:ln>
+        </p:spPr>
+        <p:txBody>
+          <a:bodyPr lIns="91425" tIns="91425" rIns="91425" bIns="91425" anchor="ctr" anchorCtr="0">
+            <a:noAutofit/>
+          </a:bodyPr>
+          <a:lstStyle/>
+          <a:p>
+            <a:pPr lvl="0" rtl="0">
+              <a:spcBef>
+                <a:spcPts val="0"/>
+              </a:spcBef>
+              <a:buNone/>
+            </a:pPr>
+            <a:endParaRPr/>
+          </a:p>
+        </p:txBody>
+      </p:sp>
+      <p:sp>
+        <p:nvSpPr>
+          <p:cNvPr id="200" name="Shape 200"/>
+          <p:cNvSpPr/>
+          <p:nvPr/>
+        </p:nvSpPr>
+        <p:spPr>
+          <a:xfrm>
+            <a:off x="8834300" y="2531300"/>
+            <a:ext cx="183300" cy="66600"/>
+          </a:xfrm>
+          <a:prstGeom prst="rect">
+            <a:avLst/>
+          </a:prstGeom>
+          <a:noFill/>
+          <a:ln w="19050" cap="flat" cmpd="sng">
+            <a:solidFill>
+              <a:srgbClr val="FF0000"/>
+            </a:solidFill>
+            <a:prstDash val="solid"/>
+            <a:round/>
+            <a:headEnd type="none" w="med" len="med"/>
+            <a:tailEnd type="none" w="med" len="med"/>
+          </a:ln>
+        </p:spPr>
+        <p:txBody>
+          <a:bodyPr lIns="91425" tIns="91425" rIns="91425" bIns="91425" anchor="ctr" anchorCtr="0">
+            <a:noAutofit/>
+          </a:bodyPr>
+          <a:lstStyle/>
+          <a:p>
+            <a:pPr lvl="0" rtl="0">
+              <a:spcBef>
+                <a:spcPts val="0"/>
+              </a:spcBef>
+              <a:buNone/>
+            </a:pPr>
+            <a:endParaRPr/>
+          </a:p>
+        </p:txBody>
+      </p:sp>
+      <p:sp>
+        <p:nvSpPr>
+          <p:cNvPr id="201" name="Shape 201"/>
+          <p:cNvSpPr/>
+          <p:nvPr/>
+        </p:nvSpPr>
+        <p:spPr>
+          <a:xfrm>
+            <a:off x="9223500" y="2405100"/>
+            <a:ext cx="237000" cy="109500"/>
+          </a:xfrm>
+          <a:prstGeom prst="rect">
+            <a:avLst/>
+          </a:prstGeom>
+          <a:noFill/>
+          <a:ln w="19050" cap="flat" cmpd="sng">
+            <a:solidFill>
+              <a:srgbClr val="FF0000"/>
+            </a:solidFill>
+            <a:prstDash val="solid"/>
+            <a:round/>
+            <a:headEnd type="none" w="med" len="med"/>
+            <a:tailEnd type="none" w="med" len="med"/>
+          </a:ln>
+        </p:spPr>
+        <p:txBody>
+          <a:bodyPr lIns="91425" tIns="91425" rIns="91425" bIns="91425" anchor="ctr" anchorCtr="0">
+            <a:noAutofit/>
+          </a:bodyPr>
+          <a:lstStyle/>
+          <a:p>
+            <a:pPr lvl="0" rtl="0">
+              <a:spcBef>
+                <a:spcPts val="0"/>
+              </a:spcBef>
+              <a:buNone/>
+            </a:pPr>
+            <a:endParaRPr/>
+          </a:p>
+        </p:txBody>
+      </p:sp>
+      <p:sp>
+        <p:nvSpPr>
+          <p:cNvPr id="202" name="Shape 202"/>
+          <p:cNvSpPr/>
+          <p:nvPr/>
+        </p:nvSpPr>
+        <p:spPr>
+          <a:xfrm>
+            <a:off x="8034425" y="3082775"/>
+            <a:ext cx="395100" cy="252300"/>
+          </a:xfrm>
+          <a:prstGeom prst="rect">
+            <a:avLst/>
+          </a:prstGeom>
+          <a:noFill/>
+          <a:ln w="19050" cap="flat" cmpd="sng">
+            <a:solidFill>
+              <a:srgbClr val="FF0000"/>
+            </a:solidFill>
+            <a:prstDash val="solid"/>
+            <a:round/>
+            <a:headEnd type="none" w="med" len="med"/>
+            <a:tailEnd type="none" w="med" len="med"/>
+          </a:ln>
+        </p:spPr>
+        <p:txBody>
+          <a:bodyPr lIns="91425" tIns="91425" rIns="91425" bIns="91425" anchor="ctr" anchorCtr="0">
+            <a:noAutofit/>
+          </a:bodyPr>
+          <a:lstStyle/>
+          <a:p>
+            <a:pPr lvl="0" rtl="0">
+              <a:spcBef>
+                <a:spcPts val="0"/>
+              </a:spcBef>
+              <a:buNone/>
+            </a:pPr>
+            <a:endParaRPr/>
+          </a:p>
+        </p:txBody>
+      </p:sp>
+      <p:cxnSp>
+        <p:nvCxnSpPr>
+          <p:cNvPr id="203" name="Shape 203"/>
+          <p:cNvCxnSpPr/>
+          <p:nvPr/>
+        </p:nvCxnSpPr>
+        <p:spPr>
+          <a:xfrm flipH="1">
+            <a:off x="10149400" y="3826675"/>
+            <a:ext cx="201900" cy="304500"/>
+          </a:xfrm>
+          <a:prstGeom prst="straightConnector1">
+            <a:avLst/>
+          </a:prstGeom>
+          <a:noFill/>
+          <a:ln w="9525" cap="flat" cmpd="sng">
+            <a:solidFill>
+              <a:srgbClr val="38761D"/>
+            </a:solidFill>
+            <a:prstDash val="solid"/>
+            <a:round/>
+            <a:headEnd type="none" w="lg" len="lg"/>
+            <a:tailEnd type="triangle" w="lg" len="lg"/>
+          </a:ln>
+        </p:spPr>
+      </p:cxnSp>
+      <p:sp>
+        <p:nvSpPr>
+          <p:cNvPr id="204" name="Shape 204"/>
+          <p:cNvSpPr txBox="1"/>
+          <p:nvPr/>
+        </p:nvSpPr>
+        <p:spPr>
+          <a:xfrm>
+            <a:off x="9838125" y="3374950"/>
+            <a:ext cx="1200300" cy="549900"/>
+          </a:xfrm>
+          <a:prstGeom prst="rect">
+            <a:avLst/>
+          </a:prstGeom>
+          <a:noFill/>
+          <a:ln>
+            <a:noFill/>
+          </a:ln>
+        </p:spPr>
+        <p:txBody>
+          <a:bodyPr lIns="91425" tIns="91425" rIns="91425" bIns="91425" anchor="t" anchorCtr="0">
+            <a:noAutofit/>
+          </a:bodyPr>
+          <a:lstStyle/>
+          <a:p>
+            <a:pPr lvl="0">
+              <a:spcBef>
+                <a:spcPts val="0"/>
+              </a:spcBef>
+              <a:buNone/>
+            </a:pPr>
+            <a:r>
+              <a:rPr lang="nl-NL"/>
+              <a:t>overlap, geen botsing</a:t>
+            </a:r>
+          </a:p>
+        </p:txBody>
+      </p:sp>
+      <p:cxnSp>
+        <p:nvCxnSpPr>
+          <p:cNvPr id="205" name="Shape 205"/>
+          <p:cNvCxnSpPr/>
+          <p:nvPr/>
+        </p:nvCxnSpPr>
+        <p:spPr>
+          <a:xfrm flipH="1">
+            <a:off x="8034425" y="4693450"/>
+            <a:ext cx="201900" cy="304500"/>
+          </a:xfrm>
+          <a:prstGeom prst="straightConnector1">
+            <a:avLst/>
+          </a:prstGeom>
+          <a:noFill/>
+          <a:ln w="9525" cap="flat" cmpd="sng">
+            <a:solidFill>
+              <a:srgbClr val="FF0000"/>
+            </a:solidFill>
+            <a:prstDash val="solid"/>
+            <a:round/>
+            <a:headEnd type="none" w="lg" len="lg"/>
+            <a:tailEnd type="triangle" w="lg" len="lg"/>
+          </a:ln>
+        </p:spPr>
+      </p:cxnSp>
+      <p:sp>
+        <p:nvSpPr>
+          <p:cNvPr id="206" name="Shape 206"/>
+          <p:cNvSpPr txBox="1"/>
+          <p:nvPr/>
+        </p:nvSpPr>
+        <p:spPr>
+          <a:xfrm>
+            <a:off x="7715250" y="4360450"/>
+            <a:ext cx="924000" cy="495300"/>
+          </a:xfrm>
+          <a:prstGeom prst="rect">
+            <a:avLst/>
+          </a:prstGeom>
+          <a:noFill/>
+          <a:ln>
+            <a:noFill/>
+          </a:ln>
+        </p:spPr>
+        <p:txBody>
+          <a:bodyPr lIns="91425" tIns="91425" rIns="91425" bIns="91425" anchor="t" anchorCtr="0">
+            <a:noAutofit/>
+          </a:bodyPr>
+          <a:lstStyle/>
+          <a:p>
+            <a:pPr lvl="0">
+              <a:spcBef>
+                <a:spcPts val="0"/>
+              </a:spcBef>
+              <a:buNone/>
+            </a:pPr>
+            <a:r>
+              <a:rPr lang="nl-NL"/>
+              <a:t>overlap, botsing</a:t>
+            </a:r>
+          </a:p>
+        </p:txBody>
+      </p:sp>
+      <p:sp>
+        <p:nvSpPr>
+          <p:cNvPr id="207" name="Shape 207"/>
+          <p:cNvSpPr/>
+          <p:nvPr/>
+        </p:nvSpPr>
+        <p:spPr>
+          <a:xfrm>
+            <a:off x="8034425" y="2405100"/>
+            <a:ext cx="1590300" cy="930000"/>
+          </a:xfrm>
+          <a:prstGeom prst="rect">
+            <a:avLst/>
+          </a:prstGeom>
+          <a:noFill/>
+          <a:ln w="19050" cap="flat" cmpd="sng">
+            <a:solidFill>
+              <a:srgbClr val="FFFF00"/>
+            </a:solidFill>
+            <a:prstDash val="solid"/>
+            <a:round/>
+            <a:headEnd type="none" w="med" len="med"/>
+            <a:tailEnd type="none" w="med" len="med"/>
+          </a:ln>
+        </p:spPr>
+        <p:txBody>
+          <a:bodyPr lIns="91425" tIns="91425" rIns="91425" bIns="91425" anchor="ctr" anchorCtr="0">
+            <a:noAutofit/>
+          </a:bodyPr>
+          <a:lstStyle/>
+          <a:p>
+            <a:pPr lvl="0" rtl="0">
+              <a:spcBef>
+                <a:spcPts val="0"/>
+              </a:spcBef>
+              <a:buNone/>
+            </a:pPr>
+            <a:endParaRPr/>
+          </a:p>
+        </p:txBody>
+      </p:sp>
+      <p:sp>
+        <p:nvSpPr>
+          <p:cNvPr id="208" name="Shape 208"/>
+          <p:cNvSpPr txBox="1"/>
+          <p:nvPr/>
+        </p:nvSpPr>
+        <p:spPr>
+          <a:xfrm>
+            <a:off x="5956625" y="1932450"/>
+            <a:ext cx="1914600" cy="1054800"/>
+          </a:xfrm>
+          <a:prstGeom prst="rect">
+            <a:avLst/>
+          </a:prstGeom>
+          <a:noFill/>
+          <a:ln>
+            <a:noFill/>
+          </a:ln>
+        </p:spPr>
+        <p:txBody>
+          <a:bodyPr lIns="91425" tIns="91425" rIns="91425" bIns="91425" anchor="t" anchorCtr="0">
+            <a:noAutofit/>
+          </a:bodyPr>
+          <a:lstStyle/>
+          <a:p>
+            <a:pPr lvl="0">
+              <a:spcBef>
+                <a:spcPts val="0"/>
+              </a:spcBef>
+              <a:buNone/>
+            </a:pPr>
+            <a:r>
+              <a:rPr lang="nl-NL"/>
+              <a:t>geel: grens van noordwest kwadrant</a:t>
+            </a:r>
+          </a:p>
+        </p:txBody>
+      </p:sp>
+    </p:spTree>
+  </p:cSld>
+  <p:clrMapOvr>
+    <a:masterClrMapping/>
+  </p:clrMapOvr>
+  <p:timing>
+    <p:tnLst>
+      <p:par>
+        <p:cTn id="1" dur="indefinite" restart="never" nodeType="tmRoot"/>
+      </p:par>
+    </p:tnLst>
+  </p:timing>
+</p:sld>
+</file>
+
+<file path=ppt/slides/slide8.xml><?xml version="1.0" encoding="utf-8"?>
 <p:sld xmlns:a="http://schemas.openxmlformats.org/drawingml/2006/main" xmlns:r="http://schemas.openxmlformats.org/officeDocument/2006/relationships" xmlns:p="http://schemas.openxmlformats.org/presentationml/2006/main">
   <p:cSld>
     <p:spTree>
@@ -8753,10 +11093,17 @@
   <p:clrMapOvr>
     <a:masterClrMapping/>
   </p:clrMapOvr>
+  <p:timing>
+    <p:tnLst>
+      <p:par>
+        <p:cTn id="1" dur="indefinite" restart="never" nodeType="tmRoot"/>
+      </p:par>
+    </p:tnLst>
+  </p:timing>
 </p:sld>
 </file>
 
-<file path=ppt/slides/slide8.xml><?xml version="1.0" encoding="utf-8"?>
+<file path=ppt/slides/slide9.xml><?xml version="1.0" encoding="utf-8"?>
 <p:sld xmlns:a="http://schemas.openxmlformats.org/drawingml/2006/main" xmlns:r="http://schemas.openxmlformats.org/officeDocument/2006/relationships" xmlns:p="http://schemas.openxmlformats.org/presentationml/2006/main">
   <p:cSld>
     <p:spTree>
@@ -8844,96 +11191,13 @@
   <p:clrMapOvr>
     <a:masterClrMapping/>
   </p:clrMapOvr>
-</p:sld>
-</file>
-
-<file path=ppt/slides/slide9.xml><?xml version="1.0" encoding="utf-8"?>
-<p:sld xmlns:a="http://schemas.openxmlformats.org/drawingml/2006/main" xmlns:r="http://schemas.openxmlformats.org/officeDocument/2006/relationships" xmlns:p="http://schemas.openxmlformats.org/presentationml/2006/main">
-  <p:cSld>
-    <p:spTree>
-      <p:nvGrpSpPr>
-        <p:cNvPr id="1" name=""/>
-        <p:cNvGrpSpPr/>
-        <p:nvPr/>
-      </p:nvGrpSpPr>
-      <p:grpSpPr>
-        <a:xfrm>
-          <a:off x="0" y="0"/>
-          <a:ext cx="0" cy="0"/>
-          <a:chOff x="0" y="0"/>
-          <a:chExt cx="0" cy="0"/>
-        </a:xfrm>
-      </p:grpSpPr>
-      <p:sp>
-        <p:nvSpPr>
-          <p:cNvPr id="2" name="Titel 1"/>
-          <p:cNvSpPr>
-            <a:spLocks noGrp="1"/>
-          </p:cNvSpPr>
-          <p:nvPr>
-            <p:ph type="title"/>
-          </p:nvPr>
-        </p:nvSpPr>
-        <p:spPr/>
-        <p:txBody>
-          <a:bodyPr/>
-          <a:lstStyle/>
-          <a:p>
-            <a:r>
-              <a:rPr lang="nl-NL"/>
-              <a:t>Nauwkeurigheid model</a:t>
-            </a:r>
-          </a:p>
-        </p:txBody>
-      </p:sp>
-      <p:sp>
-        <p:nvSpPr>
-          <p:cNvPr id="3" name="Tijdelijke aanduiding voor inhoud 2"/>
-          <p:cNvSpPr>
-            <a:spLocks noGrp="1"/>
-          </p:cNvSpPr>
-          <p:nvPr>
-            <p:ph idx="1"/>
-          </p:nvPr>
-        </p:nvSpPr>
-        <p:spPr/>
-        <p:txBody>
-          <a:bodyPr/>
-          <a:lstStyle/>
-          <a:p>
-            <a:r>
-              <a:rPr lang="nl-NL" dirty="0"/>
-              <a:t>Analyse voor N = 2 deeltjes</a:t>
-            </a:r>
-          </a:p>
-          <a:p>
-            <a:r>
-              <a:rPr lang="nl-NL" dirty="0"/>
-              <a:t>Behoud van energie</a:t>
-            </a:r>
-          </a:p>
-          <a:p>
-            <a:r>
-              <a:rPr lang="nl-NL" dirty="0" err="1"/>
-              <a:t>Richardson</a:t>
-            </a:r>
-            <a:r>
-              <a:rPr lang="nl-NL" dirty="0"/>
-              <a:t> Extrapolatie</a:t>
-            </a:r>
-          </a:p>
-        </p:txBody>
-      </p:sp>
-    </p:spTree>
-    <p:extLst>
-      <p:ext uri="{BB962C8B-B14F-4D97-AF65-F5344CB8AC3E}">
-        <p14:creationId xmlns:p14="http://schemas.microsoft.com/office/powerpoint/2010/main" val="120385941"/>
-      </p:ext>
-    </p:extLst>
-  </p:cSld>
-  <p:clrMapOvr>
-    <a:masterClrMapping/>
-  </p:clrMapOvr>
+  <p:timing>
+    <p:tnLst>
+      <p:par>
+        <p:cTn id="1" dur="indefinite" restart="never" nodeType="tmRoot"/>
+      </p:par>
+    </p:tnLst>
+  </p:timing>
 </p:sld>
 </file>
 
@@ -9201,8 +11465,293 @@
   <a:extraClrSchemeLst/>
   <a:extLst>
     <a:ext uri="{05A4C25C-085E-4340-85A3-A5531E510DB2}">
-      <thm15:themeFamily xmlns:thm15="http://schemas.microsoft.com/office/thememl/2012/main" xmlns="" name="Vapor Trail" id="{4FDF2955-7D9C-493C-B9F9-C205151B46CD}" vid="{FE1EB5C7-81A8-4CBA-AE6E-B3BF73DC3895}"/>
+      <thm15:themeFamily xmlns="" xmlns:thm15="http://schemas.microsoft.com/office/thememl/2012/main" name="Vapor Trail" id="{4FDF2955-7D9C-493C-B9F9-C205151B46CD}" vid="{FE1EB5C7-81A8-4CBA-AE6E-B3BF73DC3895}"/>
     </a:ext>
   </a:extLst>
 </a:theme>
+</file>
+
+<file path=ppt/theme/theme2.xml><?xml version="1.0" encoding="utf-8"?>
+<a:theme xmlns:a="http://schemas.openxmlformats.org/drawingml/2006/main" name="Kantoorthema">
+  <a:themeElements>
+    <a:clrScheme name="Kantoor">
+      <a:dk1>
+        <a:sysClr val="windowText" lastClr="000000"/>
+      </a:dk1>
+      <a:lt1>
+        <a:sysClr val="window" lastClr="FFFFFF"/>
+      </a:lt1>
+      <a:dk2>
+        <a:srgbClr val="1F497D"/>
+      </a:dk2>
+      <a:lt2>
+        <a:srgbClr val="EEECE1"/>
+      </a:lt2>
+      <a:accent1>
+        <a:srgbClr val="4F81BD"/>
+      </a:accent1>
+      <a:accent2>
+        <a:srgbClr val="C0504D"/>
+      </a:accent2>
+      <a:accent3>
+        <a:srgbClr val="9BBB59"/>
+      </a:accent3>
+      <a:accent4>
+        <a:srgbClr val="8064A2"/>
+      </a:accent4>
+      <a:accent5>
+        <a:srgbClr val="4BACC6"/>
+      </a:accent5>
+      <a:accent6>
+        <a:srgbClr val="F79646"/>
+      </a:accent6>
+      <a:hlink>
+        <a:srgbClr val="0000FF"/>
+      </a:hlink>
+      <a:folHlink>
+        <a:srgbClr val="800080"/>
+      </a:folHlink>
+    </a:clrScheme>
+    <a:fontScheme name="Kantoor">
+      <a:majorFont>
+        <a:latin typeface="Calibri"/>
+        <a:ea typeface=""/>
+        <a:cs typeface=""/>
+        <a:font script="Jpan" typeface="ＭＳ Ｐゴシック"/>
+        <a:font script="Hang" typeface="맑은 고딕"/>
+        <a:font script="Hans" typeface="宋体"/>
+        <a:font script="Hant" typeface="新細明體"/>
+        <a:font script="Arab" typeface="Times New Roman"/>
+        <a:font script="Hebr" typeface="Times New Roman"/>
+        <a:font script="Thai" typeface="Angsana New"/>
+        <a:font script="Ethi" typeface="Nyala"/>
+        <a:font script="Beng" typeface="Vrinda"/>
+        <a:font script="Gujr" typeface="Shruti"/>
+        <a:font script="Khmr" typeface="MoolBoran"/>
+        <a:font script="Knda" typeface="Tunga"/>
+        <a:font script="Guru" typeface="Raavi"/>
+        <a:font script="Cans" typeface="Euphemia"/>
+        <a:font script="Cher" typeface="Plantagenet Cherokee"/>
+        <a:font script="Yiii" typeface="Microsoft Yi Baiti"/>
+        <a:font script="Tibt" typeface="Microsoft Himalaya"/>
+        <a:font script="Thaa" typeface="MV Boli"/>
+        <a:font script="Deva" typeface="Mangal"/>
+        <a:font script="Telu" typeface="Gautami"/>
+        <a:font script="Taml" typeface="Latha"/>
+        <a:font script="Syrc" typeface="Estrangelo Edessa"/>
+        <a:font script="Orya" typeface="Kalinga"/>
+        <a:font script="Mlym" typeface="Kartika"/>
+        <a:font script="Laoo" typeface="DokChampa"/>
+        <a:font script="Sinh" typeface="Iskoola Pota"/>
+        <a:font script="Mong" typeface="Mongolian Baiti"/>
+        <a:font script="Viet" typeface="Times New Roman"/>
+        <a:font script="Uigh" typeface="Microsoft Uighur"/>
+        <a:font script="Geor" typeface="Sylfaen"/>
+      </a:majorFont>
+      <a:minorFont>
+        <a:latin typeface="Calibri"/>
+        <a:ea typeface=""/>
+        <a:cs typeface=""/>
+        <a:font script="Jpan" typeface="ＭＳ Ｐゴシック"/>
+        <a:font script="Hang" typeface="맑은 고딕"/>
+        <a:font script="Hans" typeface="宋体"/>
+        <a:font script="Hant" typeface="新細明體"/>
+        <a:font script="Arab" typeface="Arial"/>
+        <a:font script="Hebr" typeface="Arial"/>
+        <a:font script="Thai" typeface="Cordia New"/>
+        <a:font script="Ethi" typeface="Nyala"/>
+        <a:font script="Beng" typeface="Vrinda"/>
+        <a:font script="Gujr" typeface="Shruti"/>
+        <a:font script="Khmr" typeface="DaunPenh"/>
+        <a:font script="Knda" typeface="Tunga"/>
+        <a:font script="Guru" typeface="Raavi"/>
+        <a:font script="Cans" typeface="Euphemia"/>
+        <a:font script="Cher" typeface="Plantagenet Cherokee"/>
+        <a:font script="Yiii" typeface="Microsoft Yi Baiti"/>
+        <a:font script="Tibt" typeface="Microsoft Himalaya"/>
+        <a:font script="Thaa" typeface="MV Boli"/>
+        <a:font script="Deva" typeface="Mangal"/>
+        <a:font script="Telu" typeface="Gautami"/>
+        <a:font script="Taml" typeface="Latha"/>
+        <a:font script="Syrc" typeface="Estrangelo Edessa"/>
+        <a:font script="Orya" typeface="Kalinga"/>
+        <a:font script="Mlym" typeface="Kartika"/>
+        <a:font script="Laoo" typeface="DokChampa"/>
+        <a:font script="Sinh" typeface="Iskoola Pota"/>
+        <a:font script="Mong" typeface="Mongolian Baiti"/>
+        <a:font script="Viet" typeface="Arial"/>
+        <a:font script="Uigh" typeface="Microsoft Uighur"/>
+        <a:font script="Geor" typeface="Sylfaen"/>
+      </a:minorFont>
+    </a:fontScheme>
+    <a:fmtScheme name="Kantoor">
+      <a:fillStyleLst>
+        <a:solidFill>
+          <a:schemeClr val="phClr"/>
+        </a:solidFill>
+        <a:gradFill rotWithShape="1">
+          <a:gsLst>
+            <a:gs pos="0">
+              <a:schemeClr val="phClr">
+                <a:tint val="50000"/>
+                <a:satMod val="300000"/>
+              </a:schemeClr>
+            </a:gs>
+            <a:gs pos="35000">
+              <a:schemeClr val="phClr">
+                <a:tint val="37000"/>
+                <a:satMod val="300000"/>
+              </a:schemeClr>
+            </a:gs>
+            <a:gs pos="100000">
+              <a:schemeClr val="phClr">
+                <a:tint val="15000"/>
+                <a:satMod val="350000"/>
+              </a:schemeClr>
+            </a:gs>
+          </a:gsLst>
+          <a:lin ang="16200000" scaled="1"/>
+        </a:gradFill>
+        <a:gradFill rotWithShape="1">
+          <a:gsLst>
+            <a:gs pos="0">
+              <a:schemeClr val="phClr">
+                <a:shade val="51000"/>
+                <a:satMod val="130000"/>
+              </a:schemeClr>
+            </a:gs>
+            <a:gs pos="80000">
+              <a:schemeClr val="phClr">
+                <a:shade val="93000"/>
+                <a:satMod val="130000"/>
+              </a:schemeClr>
+            </a:gs>
+            <a:gs pos="100000">
+              <a:schemeClr val="phClr">
+                <a:shade val="94000"/>
+                <a:satMod val="135000"/>
+              </a:schemeClr>
+            </a:gs>
+          </a:gsLst>
+          <a:lin ang="16200000" scaled="0"/>
+        </a:gradFill>
+      </a:fillStyleLst>
+      <a:lnStyleLst>
+        <a:ln w="9525" cap="flat" cmpd="sng" algn="ctr">
+          <a:solidFill>
+            <a:schemeClr val="phClr">
+              <a:shade val="95000"/>
+              <a:satMod val="105000"/>
+            </a:schemeClr>
+          </a:solidFill>
+          <a:prstDash val="solid"/>
+        </a:ln>
+        <a:ln w="25400" cap="flat" cmpd="sng" algn="ctr">
+          <a:solidFill>
+            <a:schemeClr val="phClr"/>
+          </a:solidFill>
+          <a:prstDash val="solid"/>
+        </a:ln>
+        <a:ln w="38100" cap="flat" cmpd="sng" algn="ctr">
+          <a:solidFill>
+            <a:schemeClr val="phClr"/>
+          </a:solidFill>
+          <a:prstDash val="solid"/>
+        </a:ln>
+      </a:lnStyleLst>
+      <a:effectStyleLst>
+        <a:effectStyle>
+          <a:effectLst>
+            <a:outerShdw blurRad="40000" dist="20000" dir="5400000" rotWithShape="0">
+              <a:srgbClr val="000000">
+                <a:alpha val="38000"/>
+              </a:srgbClr>
+            </a:outerShdw>
+          </a:effectLst>
+        </a:effectStyle>
+        <a:effectStyle>
+          <a:effectLst>
+            <a:outerShdw blurRad="40000" dist="23000" dir="5400000" rotWithShape="0">
+              <a:srgbClr val="000000">
+                <a:alpha val="35000"/>
+              </a:srgbClr>
+            </a:outerShdw>
+          </a:effectLst>
+        </a:effectStyle>
+        <a:effectStyle>
+          <a:effectLst>
+            <a:outerShdw blurRad="40000" dist="23000" dir="5400000" rotWithShape="0">
+              <a:srgbClr val="000000">
+                <a:alpha val="35000"/>
+              </a:srgbClr>
+            </a:outerShdw>
+          </a:effectLst>
+          <a:scene3d>
+            <a:camera prst="orthographicFront">
+              <a:rot lat="0" lon="0" rev="0"/>
+            </a:camera>
+            <a:lightRig rig="threePt" dir="t">
+              <a:rot lat="0" lon="0" rev="1200000"/>
+            </a:lightRig>
+          </a:scene3d>
+          <a:sp3d>
+            <a:bevelT w="63500" h="25400"/>
+          </a:sp3d>
+        </a:effectStyle>
+      </a:effectStyleLst>
+      <a:bgFillStyleLst>
+        <a:solidFill>
+          <a:schemeClr val="phClr"/>
+        </a:solidFill>
+        <a:gradFill rotWithShape="1">
+          <a:gsLst>
+            <a:gs pos="0">
+              <a:schemeClr val="phClr">
+                <a:tint val="40000"/>
+                <a:satMod val="350000"/>
+              </a:schemeClr>
+            </a:gs>
+            <a:gs pos="40000">
+              <a:schemeClr val="phClr">
+                <a:tint val="45000"/>
+                <a:shade val="99000"/>
+                <a:satMod val="350000"/>
+              </a:schemeClr>
+            </a:gs>
+            <a:gs pos="100000">
+              <a:schemeClr val="phClr">
+                <a:shade val="20000"/>
+                <a:satMod val="255000"/>
+              </a:schemeClr>
+            </a:gs>
+          </a:gsLst>
+          <a:path path="circle">
+            <a:fillToRect l="50000" t="-80000" r="50000" b="180000"/>
+          </a:path>
+        </a:gradFill>
+        <a:gradFill rotWithShape="1">
+          <a:gsLst>
+            <a:gs pos="0">
+              <a:schemeClr val="phClr">
+                <a:tint val="80000"/>
+                <a:satMod val="300000"/>
+              </a:schemeClr>
+            </a:gs>
+            <a:gs pos="100000">
+              <a:schemeClr val="phClr">
+                <a:shade val="30000"/>
+                <a:satMod val="200000"/>
+              </a:schemeClr>
+            </a:gs>
+          </a:gsLst>
+          <a:path path="circle">
+            <a:fillToRect l="50000" t="50000" r="50000" b="50000"/>
+          </a:path>
+        </a:gradFill>
+      </a:bgFillStyleLst>
+    </a:fmtScheme>
+  </a:themeElements>
+  <a:objectDefaults/>
+  <a:extraClrSchemeLst/>
+</a:theme>
 </file>
</xml_diff>

<commit_message>
PPT: text oranje meegenomen
</commit_message>
<xml_diff>
--- a/Presentatie/Presentatie.pptx
+++ b/Presentatie/Presentatie.pptx
@@ -10416,85 +10416,100 @@
           </p:txBody>
         </p:sp>
       </p:grpSp>
-      <p:sp>
-        <p:nvSpPr>
-          <p:cNvPr id="207" name="Shape 207"/>
-          <p:cNvSpPr/>
+      <p:grpSp>
+        <p:nvGrpSpPr>
+          <p:cNvPr id="5" name="Groep 4"/>
+          <p:cNvGrpSpPr/>
           <p:nvPr/>
-        </p:nvSpPr>
-        <p:spPr>
-          <a:xfrm>
-            <a:off x="8034425" y="2405100"/>
-            <a:ext cx="1590300" cy="930000"/>
-          </a:xfrm>
-          <a:prstGeom prst="rect">
-            <a:avLst/>
-          </a:prstGeom>
-          <a:noFill/>
-          <a:ln w="19050" cap="flat" cmpd="sng">
-            <a:solidFill>
-              <a:srgbClr val="FFC000"/>
-            </a:solidFill>
-            <a:prstDash val="solid"/>
-            <a:round/>
-            <a:headEnd type="none" w="med" len="med"/>
-            <a:tailEnd type="none" w="med" len="med"/>
-          </a:ln>
-        </p:spPr>
-        <p:txBody>
-          <a:bodyPr lIns="91425" tIns="91425" rIns="91425" bIns="91425" anchor="ctr" anchorCtr="0">
-            <a:noAutofit/>
-          </a:bodyPr>
-          <a:lstStyle/>
-          <a:p>
-            <a:pPr lvl="0" rtl="0">
-              <a:spcBef>
-                <a:spcPts val="0"/>
-              </a:spcBef>
-              <a:buNone/>
-            </a:pPr>
-            <a:endParaRPr dirty="0"/>
-          </a:p>
-        </p:txBody>
-      </p:sp>
-      <p:sp>
-        <p:nvSpPr>
-          <p:cNvPr id="208" name="Shape 208"/>
-          <p:cNvSpPr txBox="1"/>
-          <p:nvPr/>
-        </p:nvSpPr>
-        <p:spPr>
+        </p:nvGrpSpPr>
+        <p:grpSpPr>
           <a:xfrm>
             <a:off x="5956625" y="1932450"/>
-            <a:ext cx="1914600" cy="1054800"/>
+            <a:ext cx="3668100" cy="1402650"/>
+            <a:chOff x="5956625" y="1932450"/>
+            <a:chExt cx="3668100" cy="1402650"/>
           </a:xfrm>
-          <a:prstGeom prst="rect">
-            <a:avLst/>
-          </a:prstGeom>
-          <a:noFill/>
-          <a:ln>
+        </p:grpSpPr>
+        <p:sp>
+          <p:nvSpPr>
+            <p:cNvPr id="207" name="Shape 207"/>
+            <p:cNvSpPr/>
+            <p:nvPr/>
+          </p:nvSpPr>
+          <p:spPr>
+            <a:xfrm>
+              <a:off x="8034425" y="2405100"/>
+              <a:ext cx="1590300" cy="930000"/>
+            </a:xfrm>
+            <a:prstGeom prst="rect">
+              <a:avLst/>
+            </a:prstGeom>
             <a:noFill/>
-          </a:ln>
-        </p:spPr>
-        <p:txBody>
-          <a:bodyPr lIns="91425" tIns="91425" rIns="91425" bIns="91425" anchor="t" anchorCtr="0">
-            <a:noAutofit/>
-          </a:bodyPr>
-          <a:lstStyle/>
-          <a:p>
-            <a:pPr lvl="0">
-              <a:spcBef>
-                <a:spcPts val="0"/>
-              </a:spcBef>
-              <a:buNone/>
-            </a:pPr>
-            <a:r>
-              <a:rPr lang="nl-NL" dirty="0"/>
-              <a:t>oranje: grens van noordwest kwadrant</a:t>
-            </a:r>
-          </a:p>
-        </p:txBody>
-      </p:sp>
+            <a:ln w="19050" cap="flat" cmpd="sng">
+              <a:solidFill>
+                <a:srgbClr val="FFC000"/>
+              </a:solidFill>
+              <a:prstDash val="solid"/>
+              <a:round/>
+              <a:headEnd type="none" w="med" len="med"/>
+              <a:tailEnd type="none" w="med" len="med"/>
+            </a:ln>
+          </p:spPr>
+          <p:txBody>
+            <a:bodyPr lIns="91425" tIns="91425" rIns="91425" bIns="91425" anchor="ctr" anchorCtr="0">
+              <a:noAutofit/>
+            </a:bodyPr>
+            <a:lstStyle/>
+            <a:p>
+              <a:pPr lvl="0" rtl="0">
+                <a:spcBef>
+                  <a:spcPts val="0"/>
+                </a:spcBef>
+                <a:buNone/>
+              </a:pPr>
+              <a:endParaRPr dirty="0"/>
+            </a:p>
+          </p:txBody>
+        </p:sp>
+        <p:sp>
+          <p:nvSpPr>
+            <p:cNvPr id="208" name="Shape 208"/>
+            <p:cNvSpPr txBox="1"/>
+            <p:nvPr/>
+          </p:nvSpPr>
+          <p:spPr>
+            <a:xfrm>
+              <a:off x="5956625" y="1932450"/>
+              <a:ext cx="1914600" cy="1054800"/>
+            </a:xfrm>
+            <a:prstGeom prst="rect">
+              <a:avLst/>
+            </a:prstGeom>
+            <a:noFill/>
+            <a:ln>
+              <a:noFill/>
+            </a:ln>
+          </p:spPr>
+          <p:txBody>
+            <a:bodyPr lIns="91425" tIns="91425" rIns="91425" bIns="91425" anchor="t" anchorCtr="0">
+              <a:noAutofit/>
+            </a:bodyPr>
+            <a:lstStyle/>
+            <a:p>
+              <a:pPr lvl="0">
+                <a:spcBef>
+                  <a:spcPts val="0"/>
+                </a:spcBef>
+                <a:buNone/>
+              </a:pPr>
+              <a:r>
+                <a:rPr lang="nl-NL" dirty="0"/>
+                <a:t>oranje: grens van noordwest kwadrant</a:t>
+              </a:r>
+            </a:p>
+          </p:txBody>
+        </p:sp>
+      </p:grpSp>
       <p:sp>
         <p:nvSpPr>
           <p:cNvPr id="27" name="Tijdelijke aanduiding voor inhoud 2"/>
@@ -10963,7 +10978,7 @@
                             </p:stCondLst>
                             <p:childTnLst>
                               <p:par>
-                                <p:cTn id="15" presetID="10" presetClass="entr" presetSubtype="0" fill="hold" grpId="0" nodeType="clickEffect">
+                                <p:cTn id="15" presetID="10" presetClass="entr" presetSubtype="0" fill="hold" nodeType="clickEffect">
                                   <p:stCondLst>
                                     <p:cond delay="0"/>
                                   </p:stCondLst>
@@ -10976,7 +10991,7 @@
                                           </p:stCondLst>
                                         </p:cTn>
                                         <p:tgtEl>
-                                          <p:spTgt spid="207"/>
+                                          <p:spTgt spid="5"/>
                                         </p:tgtEl>
                                         <p:attrNameLst>
                                           <p:attrName>style.visibility</p:attrName>
@@ -10990,7 +11005,7 @@
                                       <p:cBhvr>
                                         <p:cTn id="17" dur="500"/>
                                         <p:tgtEl>
-                                          <p:spTgt spid="207"/>
+                                          <p:spTgt spid="5"/>
                                         </p:tgtEl>
                                       </p:cBhvr>
                                     </p:animEffect>
@@ -11024,9 +11039,6 @@
         </p:cTn>
       </p:par>
     </p:tnLst>
-    <p:bldLst>
-      <p:bldP spid="207" grpId="0" animBg="1"/>
-    </p:bldLst>
   </p:timing>
 </p:sld>
 </file>

</xml_diff>

<commit_message>
PPT: aanpassingen barnes hut en nauwkeurigheid model; Nand simulaties
</commit_message>
<xml_diff>
--- a/Presentatie/Presentatie.pptx
+++ b/Presentatie/Presentatie.pptx
@@ -5,23 +5,22 @@
     <p:sldMasterId id="2147483678" r:id="rId1"/>
   </p:sldMasterIdLst>
   <p:notesMasterIdLst>
-    <p:notesMasterId r:id="rId16"/>
+    <p:notesMasterId r:id="rId15"/>
   </p:notesMasterIdLst>
   <p:sldIdLst>
     <p:sldId id="256" r:id="rId2"/>
     <p:sldId id="257" r:id="rId3"/>
     <p:sldId id="258" r:id="rId4"/>
     <p:sldId id="259" r:id="rId5"/>
-    <p:sldId id="267" r:id="rId6"/>
-    <p:sldId id="273" r:id="rId7"/>
-    <p:sldId id="262" r:id="rId8"/>
-    <p:sldId id="260" r:id="rId9"/>
+    <p:sldId id="274" r:id="rId6"/>
+    <p:sldId id="267" r:id="rId7"/>
+    <p:sldId id="273" r:id="rId8"/>
+    <p:sldId id="262" r:id="rId9"/>
     <p:sldId id="263" r:id="rId10"/>
     <p:sldId id="266" r:id="rId11"/>
     <p:sldId id="271" r:id="rId12"/>
-    <p:sldId id="270" r:id="rId13"/>
-    <p:sldId id="264" r:id="rId14"/>
-    <p:sldId id="265" r:id="rId15"/>
+    <p:sldId id="264" r:id="rId13"/>
+    <p:sldId id="265" r:id="rId14"/>
   </p:sldIdLst>
   <p:sldSz cx="12192000" cy="6858000"/>
   <p:notesSz cx="6858000" cy="9144000"/>
@@ -122,7 +121,7 @@
   </p:defaultTextStyle>
   <p:extLst>
     <p:ext uri="{EFAFB233-063F-42B5-8137-9DF3F51BA10A}">
-      <p15:sldGuideLst xmlns:p15="http://schemas.microsoft.com/office/powerpoint/2012/main" xmlns="">
+      <p15:sldGuideLst xmlns="" xmlns:p15="http://schemas.microsoft.com/office/powerpoint/2012/main">
         <p15:guide id="1" orient="horz" pos="2160">
           <p15:clr>
             <a:srgbClr val="A4A3A4"/>
@@ -831,13 +830,13 @@
   <p:clrMapOvr>
     <a:masterClrMapping/>
   </p:clrMapOvr>
-  <mc:AlternateContent xmlns:mc="http://schemas.openxmlformats.org/markup-compatibility/2006">
-    <mc:Choice xmlns:p14="http://schemas.microsoft.com/office/powerpoint/2010/main" Requires="p14">
+  <mc:AlternateContent xmlns:mc="http://schemas.openxmlformats.org/markup-compatibility/2006" xmlns:p14="http://schemas.microsoft.com/office/powerpoint/2010/main">
+    <mc:Choice Requires="p14">
       <p:transition spd="med" p14:dur="700">
         <p:fade/>
       </p:transition>
     </mc:Choice>
-    <mc:Fallback>
+    <mc:Fallback xmlns="">
       <p:transition spd="med">
         <p:fade/>
       </p:transition>
@@ -1100,13 +1099,13 @@
   <p:clrMapOvr>
     <a:masterClrMapping/>
   </p:clrMapOvr>
-  <mc:AlternateContent xmlns:mc="http://schemas.openxmlformats.org/markup-compatibility/2006">
-    <mc:Choice xmlns:p14="http://schemas.microsoft.com/office/powerpoint/2010/main" Requires="p14">
+  <mc:AlternateContent xmlns:mc="http://schemas.openxmlformats.org/markup-compatibility/2006" xmlns:p14="http://schemas.microsoft.com/office/powerpoint/2010/main">
+    <mc:Choice Requires="p14">
       <p:transition spd="med" p14:dur="700">
         <p:fade/>
       </p:transition>
     </mc:Choice>
-    <mc:Fallback>
+    <mc:Fallback xmlns="">
       <p:transition spd="med">
         <p:fade/>
       </p:transition>
@@ -1353,13 +1352,13 @@
   <p:clrMapOvr>
     <a:masterClrMapping/>
   </p:clrMapOvr>
-  <mc:AlternateContent xmlns:mc="http://schemas.openxmlformats.org/markup-compatibility/2006">
-    <mc:Choice xmlns:p14="http://schemas.microsoft.com/office/powerpoint/2010/main" Requires="p14">
+  <mc:AlternateContent xmlns:mc="http://schemas.openxmlformats.org/markup-compatibility/2006" xmlns:p14="http://schemas.microsoft.com/office/powerpoint/2010/main">
+    <mc:Choice Requires="p14">
       <p:transition spd="med" p14:dur="700">
         <p:fade/>
       </p:transition>
     </mc:Choice>
-    <mc:Fallback>
+    <mc:Fallback xmlns="">
       <p:transition spd="med">
         <p:fade/>
       </p:transition>
@@ -1907,13 +1906,13 @@
   <p:clrMapOvr>
     <a:masterClrMapping/>
   </p:clrMapOvr>
-  <mc:AlternateContent xmlns:mc="http://schemas.openxmlformats.org/markup-compatibility/2006">
-    <mc:Choice xmlns:p14="http://schemas.microsoft.com/office/powerpoint/2010/main" Requires="p14">
+  <mc:AlternateContent xmlns:mc="http://schemas.openxmlformats.org/markup-compatibility/2006" xmlns:p14="http://schemas.microsoft.com/office/powerpoint/2010/main">
+    <mc:Choice Requires="p14">
       <p:transition spd="med" p14:dur="700">
         <p:fade/>
       </p:transition>
     </mc:Choice>
-    <mc:Fallback>
+    <mc:Fallback xmlns="">
       <p:transition spd="med">
         <p:fade/>
       </p:transition>
@@ -2160,13 +2159,13 @@
   <p:clrMapOvr>
     <a:masterClrMapping/>
   </p:clrMapOvr>
-  <mc:AlternateContent xmlns:mc="http://schemas.openxmlformats.org/markup-compatibility/2006">
-    <mc:Choice xmlns:p14="http://schemas.microsoft.com/office/powerpoint/2010/main" Requires="p14">
+  <mc:AlternateContent xmlns:mc="http://schemas.openxmlformats.org/markup-compatibility/2006" xmlns:p14="http://schemas.microsoft.com/office/powerpoint/2010/main">
+    <mc:Choice Requires="p14">
       <p:transition spd="med" p14:dur="700">
         <p:fade/>
       </p:transition>
     </mc:Choice>
-    <mc:Fallback>
+    <mc:Fallback xmlns="">
       <p:transition spd="med">
         <p:fade/>
       </p:transition>
@@ -2709,13 +2708,13 @@
   <p:clrMapOvr>
     <a:masterClrMapping/>
   </p:clrMapOvr>
-  <mc:AlternateContent xmlns:mc="http://schemas.openxmlformats.org/markup-compatibility/2006">
-    <mc:Choice xmlns:p14="http://schemas.microsoft.com/office/powerpoint/2010/main" Requires="p14">
+  <mc:AlternateContent xmlns:mc="http://schemas.openxmlformats.org/markup-compatibility/2006" xmlns:p14="http://schemas.microsoft.com/office/powerpoint/2010/main">
+    <mc:Choice Requires="p14">
       <p:transition spd="med" p14:dur="700">
         <p:fade/>
       </p:transition>
     </mc:Choice>
-    <mc:Fallback>
+    <mc:Fallback xmlns="">
       <p:transition spd="med">
         <p:fade/>
       </p:transition>
@@ -3495,13 +3494,13 @@
   <p:clrMapOvr>
     <a:masterClrMapping/>
   </p:clrMapOvr>
-  <mc:AlternateContent xmlns:mc="http://schemas.openxmlformats.org/markup-compatibility/2006">
-    <mc:Choice xmlns:p14="http://schemas.microsoft.com/office/powerpoint/2010/main" Requires="p14">
+  <mc:AlternateContent xmlns:mc="http://schemas.openxmlformats.org/markup-compatibility/2006" xmlns:p14="http://schemas.microsoft.com/office/powerpoint/2010/main">
+    <mc:Choice Requires="p14">
       <p:transition spd="med" p14:dur="700">
         <p:fade/>
       </p:transition>
     </mc:Choice>
-    <mc:Fallback>
+    <mc:Fallback xmlns="">
       <p:transition spd="med">
         <p:fade/>
       </p:transition>
@@ -3682,13 +3681,13 @@
   <p:clrMapOvr>
     <a:masterClrMapping/>
   </p:clrMapOvr>
-  <mc:AlternateContent xmlns:mc="http://schemas.openxmlformats.org/markup-compatibility/2006">
-    <mc:Choice xmlns:p14="http://schemas.microsoft.com/office/powerpoint/2010/main" Requires="p14">
+  <mc:AlternateContent xmlns:mc="http://schemas.openxmlformats.org/markup-compatibility/2006" xmlns:p14="http://schemas.microsoft.com/office/powerpoint/2010/main">
+    <mc:Choice Requires="p14">
       <p:transition spd="med" p14:dur="700">
         <p:fade/>
       </p:transition>
     </mc:Choice>
-    <mc:Fallback>
+    <mc:Fallback xmlns="">
       <p:transition spd="med">
         <p:fade/>
       </p:transition>
@@ -3927,13 +3926,13 @@
   <p:clrMapOvr>
     <a:masterClrMapping/>
   </p:clrMapOvr>
-  <mc:AlternateContent xmlns:mc="http://schemas.openxmlformats.org/markup-compatibility/2006">
-    <mc:Choice xmlns:p14="http://schemas.microsoft.com/office/powerpoint/2010/main" Requires="p14">
+  <mc:AlternateContent xmlns:mc="http://schemas.openxmlformats.org/markup-compatibility/2006" xmlns:p14="http://schemas.microsoft.com/office/powerpoint/2010/main">
+    <mc:Choice Requires="p14">
       <p:transition spd="med" p14:dur="700">
         <p:fade/>
       </p:transition>
     </mc:Choice>
-    <mc:Fallback>
+    <mc:Fallback xmlns="">
       <p:transition spd="med">
         <p:fade/>
       </p:transition>
@@ -4109,13 +4108,13 @@
   <p:clrMapOvr>
     <a:masterClrMapping/>
   </p:clrMapOvr>
-  <mc:AlternateContent xmlns:mc="http://schemas.openxmlformats.org/markup-compatibility/2006">
-    <mc:Choice xmlns:p14="http://schemas.microsoft.com/office/powerpoint/2010/main" Requires="p14">
+  <mc:AlternateContent xmlns:mc="http://schemas.openxmlformats.org/markup-compatibility/2006" xmlns:p14="http://schemas.microsoft.com/office/powerpoint/2010/main">
+    <mc:Choice Requires="p14">
       <p:transition spd="med" p14:dur="700">
         <p:fade/>
       </p:transition>
     </mc:Choice>
-    <mc:Fallback>
+    <mc:Fallback xmlns="">
       <p:transition spd="med">
         <p:fade/>
       </p:transition>
@@ -4420,13 +4419,13 @@
   <p:clrMapOvr>
     <a:masterClrMapping/>
   </p:clrMapOvr>
-  <mc:AlternateContent xmlns:mc="http://schemas.openxmlformats.org/markup-compatibility/2006">
-    <mc:Choice xmlns:p14="http://schemas.microsoft.com/office/powerpoint/2010/main" Requires="p14">
+  <mc:AlternateContent xmlns:mc="http://schemas.openxmlformats.org/markup-compatibility/2006" xmlns:p14="http://schemas.microsoft.com/office/powerpoint/2010/main">
+    <mc:Choice Requires="p14">
       <p:transition spd="med" p14:dur="700">
         <p:fade/>
       </p:transition>
     </mc:Choice>
-    <mc:Fallback>
+    <mc:Fallback xmlns="">
       <p:transition spd="med">
         <p:fade/>
       </p:transition>
@@ -4664,13 +4663,13 @@
   <p:clrMapOvr>
     <a:masterClrMapping/>
   </p:clrMapOvr>
-  <mc:AlternateContent xmlns:mc="http://schemas.openxmlformats.org/markup-compatibility/2006">
-    <mc:Choice xmlns:p14="http://schemas.microsoft.com/office/powerpoint/2010/main" Requires="p14">
+  <mc:AlternateContent xmlns:mc="http://schemas.openxmlformats.org/markup-compatibility/2006" xmlns:p14="http://schemas.microsoft.com/office/powerpoint/2010/main">
+    <mc:Choice Requires="p14">
       <p:transition spd="med" p14:dur="700">
         <p:fade/>
       </p:transition>
     </mc:Choice>
-    <mc:Fallback>
+    <mc:Fallback xmlns="">
       <p:transition spd="med">
         <p:fade/>
       </p:transition>
@@ -5055,13 +5054,13 @@
   <p:clrMapOvr>
     <a:masterClrMapping/>
   </p:clrMapOvr>
-  <mc:AlternateContent xmlns:mc="http://schemas.openxmlformats.org/markup-compatibility/2006">
-    <mc:Choice xmlns:p14="http://schemas.microsoft.com/office/powerpoint/2010/main" Requires="p14">
+  <mc:AlternateContent xmlns:mc="http://schemas.openxmlformats.org/markup-compatibility/2006" xmlns:p14="http://schemas.microsoft.com/office/powerpoint/2010/main">
+    <mc:Choice Requires="p14">
       <p:transition spd="med" p14:dur="700">
         <p:fade/>
       </p:transition>
     </mc:Choice>
-    <mc:Fallback>
+    <mc:Fallback xmlns="">
       <p:transition spd="med">
         <p:fade/>
       </p:transition>
@@ -5185,13 +5184,13 @@
   <p:clrMapOvr>
     <a:masterClrMapping/>
   </p:clrMapOvr>
-  <mc:AlternateContent xmlns:mc="http://schemas.openxmlformats.org/markup-compatibility/2006">
-    <mc:Choice xmlns:p14="http://schemas.microsoft.com/office/powerpoint/2010/main" Requires="p14">
+  <mc:AlternateContent xmlns:mc="http://schemas.openxmlformats.org/markup-compatibility/2006" xmlns:p14="http://schemas.microsoft.com/office/powerpoint/2010/main">
+    <mc:Choice Requires="p14">
       <p:transition spd="med" p14:dur="700">
         <p:fade/>
       </p:transition>
     </mc:Choice>
-    <mc:Fallback>
+    <mc:Fallback xmlns="">
       <p:transition spd="med">
         <p:fade/>
       </p:transition>
@@ -5292,13 +5291,13 @@
   <p:clrMapOvr>
     <a:masterClrMapping/>
   </p:clrMapOvr>
-  <mc:AlternateContent xmlns:mc="http://schemas.openxmlformats.org/markup-compatibility/2006">
-    <mc:Choice xmlns:p14="http://schemas.microsoft.com/office/powerpoint/2010/main" Requires="p14">
+  <mc:AlternateContent xmlns:mc="http://schemas.openxmlformats.org/markup-compatibility/2006" xmlns:p14="http://schemas.microsoft.com/office/powerpoint/2010/main">
+    <mc:Choice Requires="p14">
       <p:transition spd="med" p14:dur="700">
         <p:fade/>
       </p:transition>
     </mc:Choice>
-    <mc:Fallback>
+    <mc:Fallback xmlns="">
       <p:transition spd="med">
         <p:fade/>
       </p:transition>
@@ -5553,13 +5552,13 @@
   <p:clrMapOvr>
     <a:masterClrMapping/>
   </p:clrMapOvr>
-  <mc:AlternateContent xmlns:mc="http://schemas.openxmlformats.org/markup-compatibility/2006">
-    <mc:Choice xmlns:p14="http://schemas.microsoft.com/office/powerpoint/2010/main" Requires="p14">
+  <mc:AlternateContent xmlns:mc="http://schemas.openxmlformats.org/markup-compatibility/2006" xmlns:p14="http://schemas.microsoft.com/office/powerpoint/2010/main">
+    <mc:Choice Requires="p14">
       <p:transition spd="med" p14:dur="700">
         <p:fade/>
       </p:transition>
     </mc:Choice>
-    <mc:Fallback>
+    <mc:Fallback xmlns="">
       <p:transition spd="med">
         <p:fade/>
       </p:transition>
@@ -5822,13 +5821,13 @@
   <p:clrMapOvr>
     <a:masterClrMapping/>
   </p:clrMapOvr>
-  <mc:AlternateContent xmlns:mc="http://schemas.openxmlformats.org/markup-compatibility/2006">
-    <mc:Choice xmlns:p14="http://schemas.microsoft.com/office/powerpoint/2010/main" Requires="p14">
+  <mc:AlternateContent xmlns:mc="http://schemas.openxmlformats.org/markup-compatibility/2006" xmlns:p14="http://schemas.microsoft.com/office/powerpoint/2010/main">
+    <mc:Choice Requires="p14">
       <p:transition spd="med" p14:dur="700">
         <p:fade/>
       </p:transition>
     </mc:Choice>
-    <mc:Fallback>
+    <mc:Fallback xmlns="">
       <p:transition spd="med">
         <p:fade/>
       </p:transition>
@@ -6130,13 +6129,13 @@
     <p:sldLayoutId id="2147483694" r:id="rId16"/>
     <p:sldLayoutId id="2147483695" r:id="rId17"/>
   </p:sldLayoutIdLst>
-  <mc:AlternateContent xmlns:mc="http://schemas.openxmlformats.org/markup-compatibility/2006">
-    <mc:Choice xmlns:p14="http://schemas.microsoft.com/office/powerpoint/2010/main" Requires="p14">
+  <mc:AlternateContent xmlns:mc="http://schemas.openxmlformats.org/markup-compatibility/2006" xmlns:p14="http://schemas.microsoft.com/office/powerpoint/2010/main">
+    <mc:Choice Requires="p14">
       <p:transition spd="med" p14:dur="700">
         <p:fade/>
       </p:transition>
     </mc:Choice>
-    <mc:Fallback>
+    <mc:Fallback xmlns="">
       <p:transition spd="med">
         <p:fade/>
       </p:transition>
@@ -6611,13 +6610,13 @@
   <p:clrMapOvr>
     <a:masterClrMapping/>
   </p:clrMapOvr>
-  <mc:AlternateContent xmlns:mc="http://schemas.openxmlformats.org/markup-compatibility/2006">
-    <mc:Choice xmlns:p14="http://schemas.microsoft.com/office/powerpoint/2010/main" Requires="p14">
+  <mc:AlternateContent xmlns:mc="http://schemas.openxmlformats.org/markup-compatibility/2006" xmlns:p14="http://schemas.microsoft.com/office/powerpoint/2010/main">
+    <mc:Choice Requires="p14">
       <p:transition spd="med" p14:dur="700">
         <p:fade/>
       </p:transition>
     </mc:Choice>
-    <mc:Fallback>
+    <mc:Fallback xmlns="">
       <p:transition spd="med">
         <p:fade/>
       </p:transition>
@@ -7088,14 +7087,14 @@
           <p:nvPr>
             <p:extLst>
               <p:ext uri="{D42A27DB-BD31-4B8C-83A1-F6EECF244321}">
-                <p14:modId xmlns:p14="http://schemas.microsoft.com/office/powerpoint/2010/main" val="782030648"/>
+                <p14:modId xmlns:p14="http://schemas.microsoft.com/office/powerpoint/2010/main" val="2399196591"/>
               </p:ext>
             </p:extLst>
           </p:nvPr>
         </p:nvGraphicFramePr>
         <p:xfrm>
-          <a:off x="158840" y="4925121"/>
-          <a:ext cx="11874320" cy="1044476"/>
+          <a:off x="158840" y="5810946"/>
+          <a:ext cx="11874320" cy="775236"/>
         </p:xfrm>
         <a:graphic>
           <a:graphicData uri="http://schemas.openxmlformats.org/drawingml/2006/table">
@@ -7107,56 +7106,56 @@
                 <a:gridCol w="1484290">
                   <a:extLst>
                     <a:ext uri="{9D8B030D-6E8A-4147-A177-3AD203B41FA5}">
-                      <a16:colId xmlns:a16="http://schemas.microsoft.com/office/drawing/2014/main" xmlns="" val="20000"/>
+                      <a16:colId xmlns="" xmlns:a16="http://schemas.microsoft.com/office/drawing/2014/main" val="20000"/>
                     </a:ext>
                   </a:extLst>
                 </a:gridCol>
                 <a:gridCol w="1484290">
                   <a:extLst>
                     <a:ext uri="{9D8B030D-6E8A-4147-A177-3AD203B41FA5}">
-                      <a16:colId xmlns:a16="http://schemas.microsoft.com/office/drawing/2014/main" xmlns="" val="20001"/>
+                      <a16:colId xmlns="" xmlns:a16="http://schemas.microsoft.com/office/drawing/2014/main" val="20001"/>
                     </a:ext>
                   </a:extLst>
                 </a:gridCol>
                 <a:gridCol w="1484290">
                   <a:extLst>
                     <a:ext uri="{9D8B030D-6E8A-4147-A177-3AD203B41FA5}">
-                      <a16:colId xmlns:a16="http://schemas.microsoft.com/office/drawing/2014/main" xmlns="" val="20002"/>
+                      <a16:colId xmlns="" xmlns:a16="http://schemas.microsoft.com/office/drawing/2014/main" val="20002"/>
                     </a:ext>
                   </a:extLst>
                 </a:gridCol>
                 <a:gridCol w="1484290">
                   <a:extLst>
                     <a:ext uri="{9D8B030D-6E8A-4147-A177-3AD203B41FA5}">
-                      <a16:colId xmlns:a16="http://schemas.microsoft.com/office/drawing/2014/main" xmlns="" val="20003"/>
+                      <a16:colId xmlns="" xmlns:a16="http://schemas.microsoft.com/office/drawing/2014/main" val="20003"/>
                     </a:ext>
                   </a:extLst>
                 </a:gridCol>
                 <a:gridCol w="1484290">
                   <a:extLst>
                     <a:ext uri="{9D8B030D-6E8A-4147-A177-3AD203B41FA5}">
-                      <a16:colId xmlns:a16="http://schemas.microsoft.com/office/drawing/2014/main" xmlns="" val="20004"/>
+                      <a16:colId xmlns="" xmlns:a16="http://schemas.microsoft.com/office/drawing/2014/main" val="20004"/>
                     </a:ext>
                   </a:extLst>
                 </a:gridCol>
                 <a:gridCol w="1484290">
                   <a:extLst>
                     <a:ext uri="{9D8B030D-6E8A-4147-A177-3AD203B41FA5}">
-                      <a16:colId xmlns:a16="http://schemas.microsoft.com/office/drawing/2014/main" xmlns="" val="20005"/>
+                      <a16:colId xmlns="" xmlns:a16="http://schemas.microsoft.com/office/drawing/2014/main" val="20005"/>
                     </a:ext>
                   </a:extLst>
                 </a:gridCol>
                 <a:gridCol w="1484290">
                   <a:extLst>
                     <a:ext uri="{9D8B030D-6E8A-4147-A177-3AD203B41FA5}">
-                      <a16:colId xmlns:a16="http://schemas.microsoft.com/office/drawing/2014/main" xmlns="" val="20006"/>
+                      <a16:colId xmlns="" xmlns:a16="http://schemas.microsoft.com/office/drawing/2014/main" val="20006"/>
                     </a:ext>
                   </a:extLst>
                 </a:gridCol>
                 <a:gridCol w="1484290">
                   <a:extLst>
                     <a:ext uri="{9D8B030D-6E8A-4147-A177-3AD203B41FA5}">
-                      <a16:colId xmlns:a16="http://schemas.microsoft.com/office/drawing/2014/main" xmlns="" val="20007"/>
+                      <a16:colId xmlns="" xmlns:a16="http://schemas.microsoft.com/office/drawing/2014/main" val="20007"/>
                     </a:ext>
                   </a:extLst>
                 </a:gridCol>
@@ -7169,14 +7168,14 @@
                     <a:p>
                       <a:pPr algn="ctr"/>
                       <a:r>
-                        <a:rPr lang="nl-NL"/>
+                        <a:rPr lang="nl-NL" dirty="0"/>
                         <a:t>k-de</a:t>
                       </a:r>
                       <a:r>
-                        <a:rPr lang="nl-NL" baseline="0"/>
+                        <a:rPr lang="nl-NL" baseline="0" dirty="0"/>
                         <a:t> tijdstip</a:t>
                       </a:r>
-                      <a:endParaRPr lang="nl-NL"/>
+                      <a:endParaRPr lang="nl-NL" dirty="0"/>
                     </a:p>
                   </a:txBody>
                   <a:tcPr/>
@@ -7281,7 +7280,7 @@
                 </a:tc>
                 <a:extLst>
                   <a:ext uri="{0D108BD9-81ED-4DB2-BD59-A6C34878D82A}">
-                    <a16:rowId xmlns:a16="http://schemas.microsoft.com/office/drawing/2014/main" xmlns="" val="10000"/>
+                    <a16:rowId xmlns="" xmlns:a16="http://schemas.microsoft.com/office/drawing/2014/main" val="10000"/>
                   </a:ext>
                 </a:extLst>
               </a:tr>
@@ -7293,9 +7292,10 @@
                     <a:p>
                       <a:pPr algn="ctr"/>
                       <a:r>
-                        <a:rPr lang="nl-NL" dirty="0"/>
-                        <a:t>Energie/AM</a:t>
+                        <a:rPr lang="nl-NL" dirty="0" smtClean="0"/>
+                        <a:t>Energie</a:t>
                       </a:r>
+                      <a:endParaRPr lang="nl-NL" dirty="0"/>
                     </a:p>
                   </a:txBody>
                   <a:tcPr/>
@@ -7351,7 +7351,7 @@
                     <a:p>
                       <a:pPr algn="ctr"/>
                       <a:r>
-                        <a:rPr lang="nl-NL" sz="1800" b="0" i="0" u="none" strike="noStrike" kern="1200" baseline="0">
+                        <a:rPr lang="nl-NL" sz="1800" b="0" i="0" u="none" strike="noStrike" kern="1200" baseline="0" dirty="0">
                           <a:solidFill>
                             <a:schemeClr val="dk1"/>
                           </a:solidFill>
@@ -7361,7 +7361,7 @@
                         </a:rPr>
                         <a:t>-0.0981</a:t>
                       </a:r>
-                      <a:endParaRPr lang="nl-NL"/>
+                      <a:endParaRPr lang="nl-NL" dirty="0"/>
                     </a:p>
                   </a:txBody>
                   <a:tcPr/>
@@ -7456,7 +7456,7 @@
                 </a:tc>
                 <a:extLst>
                   <a:ext uri="{0D108BD9-81ED-4DB2-BD59-A6C34878D82A}">
-                    <a16:rowId xmlns:a16="http://schemas.microsoft.com/office/drawing/2014/main" xmlns="" val="10001"/>
+                    <a16:rowId xmlns="" xmlns:a16="http://schemas.microsoft.com/office/drawing/2014/main" val="10001"/>
                   </a:ext>
                 </a:extLst>
               </a:tr>
@@ -7464,6 +7464,70 @@
           </a:graphicData>
         </a:graphic>
       </p:graphicFrame>
+      <p:pic>
+        <p:nvPicPr>
+          <p:cNvPr id="1026" name="Picture 2"/>
+          <p:cNvPicPr>
+            <a:picLocks noChangeAspect="1" noChangeArrowheads="1"/>
+          </p:cNvPicPr>
+          <p:nvPr/>
+        </p:nvPicPr>
+        <p:blipFill>
+          <a:blip r:embed="rId2">
+            <a:extLst>
+              <a:ext uri="{28A0092B-C50C-407E-A947-70E740481C1C}">
+                <a14:useLocalDpi xmlns:a14="http://schemas.microsoft.com/office/drawing/2010/main" val="0"/>
+              </a:ext>
+            </a:extLst>
+          </a:blip>
+          <a:srcRect/>
+          <a:stretch>
+            <a:fillRect/>
+          </a:stretch>
+        </p:blipFill>
+        <p:spPr bwMode="auto">
+          <a:xfrm>
+            <a:off x="6725727" y="1666875"/>
+            <a:ext cx="4871332" cy="4105275"/>
+          </a:xfrm>
+          <a:prstGeom prst="rect">
+            <a:avLst/>
+          </a:prstGeom>
+          <a:noFill/>
+          <a:ln>
+            <a:noFill/>
+          </a:ln>
+          <a:effectLst/>
+          <a:extLst>
+            <a:ext uri="{909E8E84-426E-40DD-AFC4-6F175D3DCCD1}">
+              <a14:hiddenFill xmlns:a14="http://schemas.microsoft.com/office/drawing/2010/main">
+                <a:solidFill>
+                  <a:schemeClr val="accent1"/>
+                </a:solidFill>
+              </a14:hiddenFill>
+            </a:ext>
+            <a:ext uri="{91240B29-F687-4F45-9708-019B960494DF}">
+              <a14:hiddenLine xmlns:a14="http://schemas.microsoft.com/office/drawing/2010/main" w="9525">
+                <a:solidFill>
+                  <a:schemeClr val="tx1"/>
+                </a:solidFill>
+                <a:miter lim="800000"/>
+                <a:headEnd/>
+                <a:tailEnd/>
+              </a14:hiddenLine>
+            </a:ext>
+            <a:ext uri="{AF507438-7753-43E0-B8FC-AC1667EBCBE1}">
+              <a14:hiddenEffects xmlns:a14="http://schemas.microsoft.com/office/drawing/2010/main">
+                <a:effectLst>
+                  <a:outerShdw dist="35921" dir="2700000" algn="ctr" rotWithShape="0">
+                    <a:schemeClr val="bg2"/>
+                  </a:outerShdw>
+                </a:effectLst>
+              </a14:hiddenEffects>
+            </a:ext>
+          </a:extLst>
+        </p:spPr>
+      </p:pic>
     </p:spTree>
     <p:extLst>
       <p:ext uri="{BB962C8B-B14F-4D97-AF65-F5344CB8AC3E}">
@@ -7474,13 +7538,13 @@
   <p:clrMapOvr>
     <a:masterClrMapping/>
   </p:clrMapOvr>
-  <mc:AlternateContent xmlns:mc="http://schemas.openxmlformats.org/markup-compatibility/2006">
-    <mc:Choice xmlns:p14="http://schemas.microsoft.com/office/powerpoint/2010/main" Requires="p14">
+  <mc:AlternateContent xmlns:mc="http://schemas.openxmlformats.org/markup-compatibility/2006" xmlns:p14="http://schemas.microsoft.com/office/powerpoint/2010/main">
+    <mc:Choice Requires="p14">
       <p:transition spd="med" p14:dur="700">
         <p:fade/>
       </p:transition>
     </mc:Choice>
-    <mc:Fallback>
+    <mc:Fallback xmlns="">
       <p:transition spd="med">
         <p:fade/>
       </p:transition>
@@ -7515,13 +7579,11 @@
       </p:grpSpPr>
       <p:pic>
         <p:nvPicPr>
-          <p:cNvPr id="4" name="Tijdelijke aanduiding voor inhoud 3"/>
+          <p:cNvPr id="5" name="Afbeelding 4"/>
           <p:cNvPicPr>
-            <a:picLocks noGrp="1" noChangeAspect="1"/>
+            <a:picLocks noChangeAspect="1"/>
           </p:cNvPicPr>
-          <p:nvPr>
-            <p:ph idx="1"/>
-          </p:nvPr>
+          <p:nvPr/>
         </p:nvPicPr>
         <p:blipFill>
           <a:blip r:embed="rId2">
@@ -7537,41 +7599,33 @@
         </p:blipFill>
         <p:spPr>
           <a:xfrm>
-            <a:off x="287618" y="1529411"/>
-            <a:ext cx="5512312" cy="4644377"/>
-          </a:xfrm>
-        </p:spPr>
-      </p:pic>
-      <p:pic>
-        <p:nvPicPr>
-          <p:cNvPr id="5" name="Afbeelding 4"/>
-          <p:cNvPicPr>
-            <a:picLocks noChangeAspect="1"/>
-          </p:cNvPicPr>
-          <p:nvPr/>
-        </p:nvPicPr>
-        <p:blipFill>
-          <a:blip r:embed="rId3">
-            <a:extLst>
-              <a:ext uri="{28A0092B-C50C-407E-A947-70E740481C1C}">
-                <a14:useLocalDpi xmlns:a14="http://schemas.microsoft.com/office/drawing/2010/main" val="0"/>
-              </a:ext>
-            </a:extLst>
-          </a:blip>
-          <a:stretch>
-            <a:fillRect/>
-          </a:stretch>
-        </p:blipFill>
-        <p:spPr>
-          <a:xfrm>
-            <a:off x="5798712" y="1682324"/>
-            <a:ext cx="5753638" cy="4252689"/>
+            <a:off x="2090284" y="1162765"/>
+            <a:ext cx="7647495" cy="5652496"/>
           </a:xfrm>
           <a:prstGeom prst="rect">
             <a:avLst/>
           </a:prstGeom>
         </p:spPr>
       </p:pic>
+      <p:sp>
+        <p:nvSpPr>
+          <p:cNvPr id="2" name="Tijdelijke aanduiding voor inhoud 1"/>
+          <p:cNvSpPr>
+            <a:spLocks noGrp="1"/>
+          </p:cNvSpPr>
+          <p:nvPr>
+            <p:ph idx="1"/>
+          </p:nvPr>
+        </p:nvSpPr>
+        <p:spPr/>
+        <p:txBody>
+          <a:bodyPr/>
+          <a:lstStyle/>
+          <a:p>
+            <a:endParaRPr lang="nl-NL" dirty="0"/>
+          </a:p>
+        </p:txBody>
+      </p:sp>
     </p:spTree>
     <p:extLst>
       <p:ext uri="{BB962C8B-B14F-4D97-AF65-F5344CB8AC3E}">
@@ -7582,13 +7636,13 @@
   <p:clrMapOvr>
     <a:masterClrMapping/>
   </p:clrMapOvr>
-  <mc:AlternateContent xmlns:mc="http://schemas.openxmlformats.org/markup-compatibility/2006">
-    <mc:Choice xmlns:p14="http://schemas.microsoft.com/office/powerpoint/2010/main" Requires="p14">
+  <mc:AlternateContent xmlns:mc="http://schemas.openxmlformats.org/markup-compatibility/2006" xmlns:p14="http://schemas.microsoft.com/office/powerpoint/2010/main">
+    <mc:Choice Requires="p14">
       <p:transition spd="med" p14:dur="700">
         <p:fade/>
       </p:transition>
     </mc:Choice>
-    <mc:Fallback>
+    <mc:Fallback xmlns="">
       <p:transition spd="med">
         <p:fade/>
       </p:transition>
@@ -7621,82 +7675,107 @@
           <a:chExt cx="0" cy="0"/>
         </a:xfrm>
       </p:grpSpPr>
-      <p:pic>
-        <p:nvPicPr>
-          <p:cNvPr id="4" name="Tijdelijke aanduiding voor inhoud 3"/>
-          <p:cNvPicPr>
-            <a:picLocks noGrp="1" noChangeAspect="1"/>
-          </p:cNvPicPr>
+      <p:sp>
+        <p:nvSpPr>
+          <p:cNvPr id="2" name="Titel 1"/>
+          <p:cNvSpPr>
+            <a:spLocks noGrp="1"/>
+          </p:cNvSpPr>
+          <p:nvPr>
+            <p:ph type="title"/>
+          </p:nvPr>
+        </p:nvSpPr>
+        <p:spPr/>
+        <p:txBody>
+          <a:bodyPr/>
+          <a:lstStyle/>
+          <a:p>
+            <a:r>
+              <a:rPr lang="nl-NL" dirty="0"/>
+              <a:t>Conclusie</a:t>
+            </a:r>
+          </a:p>
+        </p:txBody>
+      </p:sp>
+      <p:sp>
+        <p:nvSpPr>
+          <p:cNvPr id="3" name="Tijdelijke aanduiding voor inhoud 2"/>
+          <p:cNvSpPr>
+            <a:spLocks noGrp="1"/>
+          </p:cNvSpPr>
           <p:nvPr>
             <p:ph idx="1"/>
           </p:nvPr>
-        </p:nvPicPr>
-        <p:blipFill>
-          <a:blip r:embed="rId2">
-            <a:extLst>
-              <a:ext uri="{28A0092B-C50C-407E-A947-70E740481C1C}">
-                <a14:useLocalDpi xmlns:a14="http://schemas.microsoft.com/office/drawing/2010/main" val="0"/>
-              </a:ext>
-            </a:extLst>
-          </a:blip>
-          <a:stretch>
-            <a:fillRect/>
-          </a:stretch>
-        </p:blipFill>
-        <p:spPr>
-          <a:xfrm>
-            <a:off x="525472" y="1571098"/>
-            <a:ext cx="5304668" cy="4351338"/>
-          </a:xfrm>
-        </p:spPr>
-      </p:pic>
-      <p:pic>
-        <p:nvPicPr>
-          <p:cNvPr id="5" name="Afbeelding 4"/>
-          <p:cNvPicPr>
-            <a:picLocks noChangeAspect="1"/>
-          </p:cNvPicPr>
-          <p:nvPr/>
-        </p:nvPicPr>
-        <p:blipFill>
-          <a:blip r:embed="rId3">
-            <a:extLst>
-              <a:ext uri="{28A0092B-C50C-407E-A947-70E740481C1C}">
-                <a14:useLocalDpi xmlns:a14="http://schemas.microsoft.com/office/drawing/2010/main" val="0"/>
-              </a:ext>
-            </a:extLst>
-          </a:blip>
-          <a:stretch>
-            <a:fillRect/>
-          </a:stretch>
-        </p:blipFill>
-        <p:spPr>
-          <a:xfrm>
-            <a:off x="6038513" y="1526074"/>
-            <a:ext cx="5403238" cy="4463132"/>
-          </a:xfrm>
-          <a:prstGeom prst="rect">
-            <a:avLst/>
-          </a:prstGeom>
-        </p:spPr>
-      </p:pic>
+        </p:nvSpPr>
+        <p:spPr/>
+        <p:txBody>
+          <a:bodyPr/>
+          <a:lstStyle/>
+          <a:p>
+            <a:r>
+              <a:rPr lang="nl-NL" dirty="0"/>
+              <a:t>Barnes-Hut voor sneller programma</a:t>
+            </a:r>
+          </a:p>
+          <a:p>
+            <a:r>
+              <a:rPr lang="nl-NL" dirty="0" err="1"/>
+              <a:t>Leapfrog</a:t>
+            </a:r>
+            <a:r>
+              <a:rPr lang="nl-NL" dirty="0"/>
+              <a:t> voor goede integratie</a:t>
+            </a:r>
+          </a:p>
+          <a:p>
+            <a:endParaRPr lang="nl-NL" dirty="0"/>
+          </a:p>
+          <a:p>
+            <a:r>
+              <a:rPr lang="nl-NL" dirty="0"/>
+              <a:t>Aantal planeten bereikt equilibrium</a:t>
+            </a:r>
+          </a:p>
+          <a:p>
+            <a:r>
+              <a:rPr lang="nl-NL" dirty="0"/>
+              <a:t>Voor groot aantal beginlichamen geen invloed</a:t>
+            </a:r>
+          </a:p>
+          <a:p>
+            <a:endParaRPr lang="nl-NL" dirty="0"/>
+          </a:p>
+          <a:p>
+            <a:r>
+              <a:rPr lang="nl-NL" dirty="0"/>
+              <a:t>Model nauwkeurig genoeg</a:t>
+            </a:r>
+          </a:p>
+          <a:p>
+            <a:endParaRPr lang="nl-NL" dirty="0"/>
+          </a:p>
+          <a:p>
+            <a:endParaRPr lang="nl-NL" dirty="0"/>
+          </a:p>
+        </p:txBody>
+      </p:sp>
     </p:spTree>
     <p:extLst>
       <p:ext uri="{BB962C8B-B14F-4D97-AF65-F5344CB8AC3E}">
-        <p14:creationId xmlns:p14="http://schemas.microsoft.com/office/powerpoint/2010/main" val="1028094166"/>
+        <p14:creationId xmlns:p14="http://schemas.microsoft.com/office/powerpoint/2010/main" val="2551201508"/>
       </p:ext>
     </p:extLst>
   </p:cSld>
   <p:clrMapOvr>
     <a:masterClrMapping/>
   </p:clrMapOvr>
-  <mc:AlternateContent xmlns:mc="http://schemas.openxmlformats.org/markup-compatibility/2006">
-    <mc:Choice xmlns:p14="http://schemas.microsoft.com/office/powerpoint/2010/main" Requires="p14">
+  <mc:AlternateContent xmlns:mc="http://schemas.openxmlformats.org/markup-compatibility/2006" xmlns:p14="http://schemas.microsoft.com/office/powerpoint/2010/main">
+    <mc:Choice Requires="p14">
       <p:transition spd="med" p14:dur="700">
         <p:fade/>
       </p:transition>
     </mc:Choice>
-    <mc:Fallback>
+    <mc:Fallback xmlns="">
       <p:transition spd="med">
         <p:fade/>
       </p:transition>
@@ -7713,139 +7792,6 @@
 </file>
 
 <file path=ppt/slides/slide13.xml><?xml version="1.0" encoding="utf-8"?>
-<p:sld xmlns:a="http://schemas.openxmlformats.org/drawingml/2006/main" xmlns:r="http://schemas.openxmlformats.org/officeDocument/2006/relationships" xmlns:p="http://schemas.openxmlformats.org/presentationml/2006/main">
-  <p:cSld>
-    <p:spTree>
-      <p:nvGrpSpPr>
-        <p:cNvPr id="1" name=""/>
-        <p:cNvGrpSpPr/>
-        <p:nvPr/>
-      </p:nvGrpSpPr>
-      <p:grpSpPr>
-        <a:xfrm>
-          <a:off x="0" y="0"/>
-          <a:ext cx="0" cy="0"/>
-          <a:chOff x="0" y="0"/>
-          <a:chExt cx="0" cy="0"/>
-        </a:xfrm>
-      </p:grpSpPr>
-      <p:sp>
-        <p:nvSpPr>
-          <p:cNvPr id="2" name="Titel 1"/>
-          <p:cNvSpPr>
-            <a:spLocks noGrp="1"/>
-          </p:cNvSpPr>
-          <p:nvPr>
-            <p:ph type="title"/>
-          </p:nvPr>
-        </p:nvSpPr>
-        <p:spPr/>
-        <p:txBody>
-          <a:bodyPr/>
-          <a:lstStyle/>
-          <a:p>
-            <a:r>
-              <a:rPr lang="nl-NL" dirty="0"/>
-              <a:t>Conclusie</a:t>
-            </a:r>
-          </a:p>
-        </p:txBody>
-      </p:sp>
-      <p:sp>
-        <p:nvSpPr>
-          <p:cNvPr id="3" name="Tijdelijke aanduiding voor inhoud 2"/>
-          <p:cNvSpPr>
-            <a:spLocks noGrp="1"/>
-          </p:cNvSpPr>
-          <p:nvPr>
-            <p:ph idx="1"/>
-          </p:nvPr>
-        </p:nvSpPr>
-        <p:spPr/>
-        <p:txBody>
-          <a:bodyPr/>
-          <a:lstStyle/>
-          <a:p>
-            <a:r>
-              <a:rPr lang="nl-NL" dirty="0"/>
-              <a:t>Barnes-Hut voor sneller programma</a:t>
-            </a:r>
-          </a:p>
-          <a:p>
-            <a:r>
-              <a:rPr lang="nl-NL" dirty="0" err="1"/>
-              <a:t>Leapfrog</a:t>
-            </a:r>
-            <a:r>
-              <a:rPr lang="nl-NL" dirty="0"/>
-              <a:t> voor goede integratie</a:t>
-            </a:r>
-          </a:p>
-          <a:p>
-            <a:endParaRPr lang="nl-NL" dirty="0"/>
-          </a:p>
-          <a:p>
-            <a:r>
-              <a:rPr lang="nl-NL" dirty="0"/>
-              <a:t>Aantal planeten bereikt equilibrium</a:t>
-            </a:r>
-          </a:p>
-          <a:p>
-            <a:r>
-              <a:rPr lang="nl-NL" dirty="0"/>
-              <a:t>Voor groot aantal beginlichamen geen invloed</a:t>
-            </a:r>
-          </a:p>
-          <a:p>
-            <a:endParaRPr lang="nl-NL" dirty="0"/>
-          </a:p>
-          <a:p>
-            <a:r>
-              <a:rPr lang="nl-NL" dirty="0"/>
-              <a:t>Model nauwkeurig genoeg</a:t>
-            </a:r>
-          </a:p>
-          <a:p>
-            <a:endParaRPr lang="nl-NL" dirty="0"/>
-          </a:p>
-          <a:p>
-            <a:endParaRPr lang="nl-NL" dirty="0"/>
-          </a:p>
-        </p:txBody>
-      </p:sp>
-    </p:spTree>
-    <p:extLst>
-      <p:ext uri="{BB962C8B-B14F-4D97-AF65-F5344CB8AC3E}">
-        <p14:creationId xmlns:p14="http://schemas.microsoft.com/office/powerpoint/2010/main" val="2551201508"/>
-      </p:ext>
-    </p:extLst>
-  </p:cSld>
-  <p:clrMapOvr>
-    <a:masterClrMapping/>
-  </p:clrMapOvr>
-  <mc:AlternateContent xmlns:mc="http://schemas.openxmlformats.org/markup-compatibility/2006">
-    <mc:Choice xmlns:p14="http://schemas.microsoft.com/office/powerpoint/2010/main" Requires="p14">
-      <p:transition spd="med" p14:dur="700">
-        <p:fade/>
-      </p:transition>
-    </mc:Choice>
-    <mc:Fallback>
-      <p:transition spd="med">
-        <p:fade/>
-      </p:transition>
-    </mc:Fallback>
-  </mc:AlternateContent>
-  <p:timing>
-    <p:tnLst>
-      <p:par>
-        <p:cTn id="1" dur="indefinite" restart="never" nodeType="tmRoot"/>
-      </p:par>
-    </p:tnLst>
-  </p:timing>
-</p:sld>
-</file>
-
-<file path=ppt/slides/slide14.xml><?xml version="1.0" encoding="utf-8"?>
 <p:sld xmlns:a="http://schemas.openxmlformats.org/drawingml/2006/main" xmlns:r="http://schemas.openxmlformats.org/officeDocument/2006/relationships" xmlns:p="http://schemas.openxmlformats.org/presentationml/2006/main">
   <p:cSld>
     <p:spTree>
@@ -7928,13 +7874,13 @@
   <p:clrMapOvr>
     <a:masterClrMapping/>
   </p:clrMapOvr>
-  <mc:AlternateContent xmlns:mc="http://schemas.openxmlformats.org/markup-compatibility/2006">
-    <mc:Choice xmlns:p14="http://schemas.microsoft.com/office/powerpoint/2010/main" Requires="p14">
+  <mc:AlternateContent xmlns:mc="http://schemas.openxmlformats.org/markup-compatibility/2006" xmlns:p14="http://schemas.microsoft.com/office/powerpoint/2010/main">
+    <mc:Choice Requires="p14">
       <p:transition spd="med" p14:dur="700">
         <p:fade/>
       </p:transition>
     </mc:Choice>
-    <mc:Fallback>
+    <mc:Fallback xmlns="">
       <p:transition spd="med">
         <p:fade/>
       </p:transition>
@@ -8083,13 +8029,13 @@
   <p:clrMapOvr>
     <a:masterClrMapping/>
   </p:clrMapOvr>
-  <mc:AlternateContent xmlns:mc="http://schemas.openxmlformats.org/markup-compatibility/2006">
-    <mc:Choice xmlns:p14="http://schemas.microsoft.com/office/powerpoint/2010/main" Requires="p14">
+  <mc:AlternateContent xmlns:mc="http://schemas.openxmlformats.org/markup-compatibility/2006" xmlns:p14="http://schemas.microsoft.com/office/powerpoint/2010/main">
+    <mc:Choice Requires="p14">
       <p:transition spd="med" p14:dur="700">
         <p:fade/>
       </p:transition>
     </mc:Choice>
-    <mc:Fallback>
+    <mc:Fallback xmlns="">
       <p:transition spd="med">
         <p:fade/>
       </p:transition>
@@ -8209,13 +8155,13 @@
   <p:clrMapOvr>
     <a:masterClrMapping/>
   </p:clrMapOvr>
-  <mc:AlternateContent xmlns:mc="http://schemas.openxmlformats.org/markup-compatibility/2006">
-    <mc:Choice xmlns:p14="http://schemas.microsoft.com/office/powerpoint/2010/main" Requires="p14">
+  <mc:AlternateContent xmlns:mc="http://schemas.openxmlformats.org/markup-compatibility/2006" xmlns:p14="http://schemas.microsoft.com/office/powerpoint/2010/main">
+    <mc:Choice Requires="p14">
       <p:transition spd="med" p14:dur="700">
         <p:fade/>
       </p:transition>
     </mc:Choice>
-    <mc:Fallback>
+    <mc:Fallback xmlns="">
       <p:transition spd="med">
         <p:fade/>
       </p:transition>
@@ -8972,13 +8918,13 @@
   <p:clrMapOvr>
     <a:masterClrMapping/>
   </p:clrMapOvr>
-  <mc:AlternateContent xmlns:mc="http://schemas.openxmlformats.org/markup-compatibility/2006">
-    <mc:Choice xmlns:p14="http://schemas.microsoft.com/office/powerpoint/2010/main" Requires="p14">
+  <mc:AlternateContent xmlns:mc="http://schemas.openxmlformats.org/markup-compatibility/2006" xmlns:p14="http://schemas.microsoft.com/office/powerpoint/2010/main">
+    <mc:Choice Requires="p14">
       <p:transition spd="med" p14:dur="700">
         <p:fade/>
       </p:transition>
     </mc:Choice>
-    <mc:Fallback>
+    <mc:Fallback xmlns="">
       <p:transition spd="med">
         <p:fade/>
       </p:transition>
@@ -8995,6 +8941,634 @@
 </file>
 
 <file path=ppt/slides/slide5.xml><?xml version="1.0" encoding="utf-8"?>
+<p:sld xmlns:a="http://schemas.openxmlformats.org/drawingml/2006/main" xmlns:r="http://schemas.openxmlformats.org/officeDocument/2006/relationships" xmlns:p="http://schemas.openxmlformats.org/presentationml/2006/main">
+  <p:cSld>
+    <p:spTree>
+      <p:nvGrpSpPr>
+        <p:cNvPr id="1" name=""/>
+        <p:cNvGrpSpPr/>
+        <p:nvPr/>
+      </p:nvGrpSpPr>
+      <p:grpSpPr>
+        <a:xfrm>
+          <a:off x="0" y="0"/>
+          <a:ext cx="0" cy="0"/>
+          <a:chOff x="0" y="0"/>
+          <a:chExt cx="0" cy="0"/>
+        </a:xfrm>
+      </p:grpSpPr>
+      <p:pic>
+        <p:nvPicPr>
+          <p:cNvPr id="4" name="Afbeelding 3"/>
+          <p:cNvPicPr>
+            <a:picLocks noChangeAspect="1"/>
+          </p:cNvPicPr>
+          <p:nvPr/>
+        </p:nvPicPr>
+        <p:blipFill>
+          <a:blip r:embed="rId2">
+            <a:extLst>
+              <a:ext uri="{28A0092B-C50C-407E-A947-70E740481C1C}">
+                <a14:useLocalDpi xmlns:a14="http://schemas.microsoft.com/office/drawing/2010/main" val="0"/>
+              </a:ext>
+            </a:extLst>
+          </a:blip>
+          <a:stretch>
+            <a:fillRect/>
+          </a:stretch>
+        </p:blipFill>
+        <p:spPr>
+          <a:xfrm>
+            <a:off x="4277546" y="4873541"/>
+            <a:ext cx="7856223" cy="1857739"/>
+          </a:xfrm>
+          <a:prstGeom prst="rect">
+            <a:avLst/>
+          </a:prstGeom>
+        </p:spPr>
+      </p:pic>
+      <p:sp>
+        <p:nvSpPr>
+          <p:cNvPr id="2" name="Titel 1"/>
+          <p:cNvSpPr>
+            <a:spLocks noGrp="1"/>
+          </p:cNvSpPr>
+          <p:nvPr>
+            <p:ph type="title"/>
+          </p:nvPr>
+        </p:nvSpPr>
+        <p:spPr/>
+        <p:txBody>
+          <a:bodyPr/>
+          <a:lstStyle/>
+          <a:p>
+            <a:r>
+              <a:rPr lang="nl-NL" dirty="0" err="1"/>
+              <a:t>Leapfrog</a:t>
+            </a:r>
+            <a:endParaRPr lang="nl-NL" dirty="0"/>
+          </a:p>
+        </p:txBody>
+      </p:sp>
+      <mc:AlternateContent xmlns:mc="http://schemas.openxmlformats.org/markup-compatibility/2006" xmlns:a14="http://schemas.microsoft.com/office/drawing/2010/main">
+        <mc:Choice Requires="a14">
+          <p:sp>
+            <p:nvSpPr>
+              <p:cNvPr id="3" name="Tijdelijke aanduiding voor inhoud 2"/>
+              <p:cNvSpPr>
+                <a:spLocks noGrp="1"/>
+              </p:cNvSpPr>
+              <p:nvPr>
+                <p:ph idx="1"/>
+              </p:nvPr>
+            </p:nvSpPr>
+            <p:spPr/>
+            <p:txBody>
+              <a:bodyPr>
+                <a:normAutofit/>
+              </a:bodyPr>
+              <a:lstStyle/>
+              <a:p>
+                <a:r>
+                  <a:rPr lang="nl-NL" dirty="0"/>
+                  <a:t>Formule:</a:t>
+                </a:r>
+              </a:p>
+              <a:p>
+                <a:pPr lvl="1"/>
+                <a14:m>
+                  <m:oMath xmlns:m="http://schemas.openxmlformats.org/officeDocument/2006/math">
+                    <m:sSub>
+                      <m:sSubPr>
+                        <m:ctrlPr>
+                          <a:rPr lang="nl-NL" i="1">
+                            <a:latin typeface="Cambria Math"/>
+                          </a:rPr>
+                        </m:ctrlPr>
+                      </m:sSubPr>
+                      <m:e>
+                        <m:r>
+                          <a:rPr lang="nl-NL" i="1">
+                            <a:latin typeface="Cambria Math"/>
+                          </a:rPr>
+                          <m:t>𝑥</m:t>
+                        </m:r>
+                      </m:e>
+                      <m:sub>
+                        <m:r>
+                          <a:rPr lang="nl-NL" i="1">
+                            <a:latin typeface="Cambria Math"/>
+                          </a:rPr>
+                          <m:t>𝑖</m:t>
+                        </m:r>
+                      </m:sub>
+                    </m:sSub>
+                    <m:r>
+                      <a:rPr lang="nl-NL" i="1">
+                        <a:latin typeface="Cambria Math"/>
+                      </a:rPr>
+                      <m:t>=</m:t>
+                    </m:r>
+                    <m:sSub>
+                      <m:sSubPr>
+                        <m:ctrlPr>
+                          <a:rPr lang="nl-NL" i="1">
+                            <a:latin typeface="Cambria Math"/>
+                          </a:rPr>
+                        </m:ctrlPr>
+                      </m:sSubPr>
+                      <m:e>
+                        <m:r>
+                          <a:rPr lang="nl-NL" i="1">
+                            <a:latin typeface="Cambria Math"/>
+                          </a:rPr>
+                          <m:t>𝑥</m:t>
+                        </m:r>
+                      </m:e>
+                      <m:sub>
+                        <m:r>
+                          <a:rPr lang="nl-NL" i="1">
+                            <a:latin typeface="Cambria Math"/>
+                          </a:rPr>
+                          <m:t>𝑖</m:t>
+                        </m:r>
+                        <m:r>
+                          <a:rPr lang="nl-NL" i="1">
+                            <a:latin typeface="Cambria Math"/>
+                          </a:rPr>
+                          <m:t>−1</m:t>
+                        </m:r>
+                      </m:sub>
+                    </m:sSub>
+                    <m:r>
+                      <a:rPr lang="nl-NL" i="1">
+                        <a:latin typeface="Cambria Math"/>
+                      </a:rPr>
+                      <m:t>+</m:t>
+                    </m:r>
+                    <m:sSub>
+                      <m:sSubPr>
+                        <m:ctrlPr>
+                          <a:rPr lang="nl-NL" i="1">
+                            <a:latin typeface="Cambria Math"/>
+                          </a:rPr>
+                        </m:ctrlPr>
+                      </m:sSubPr>
+                      <m:e>
+                        <m:r>
+                          <a:rPr lang="nl-NL" i="1">
+                            <a:latin typeface="Cambria Math"/>
+                            <a:ea typeface="Cambria Math"/>
+                          </a:rPr>
+                          <m:t>∆</m:t>
+                        </m:r>
+                        <m:r>
+                          <a:rPr lang="nl-NL" i="1">
+                            <a:latin typeface="Cambria Math"/>
+                            <a:ea typeface="Cambria Math"/>
+                          </a:rPr>
+                          <m:t>𝑡</m:t>
+                        </m:r>
+                        <m:r>
+                          <a:rPr lang="nl-NL" i="1">
+                            <a:latin typeface="Cambria Math"/>
+                            <a:ea typeface="Cambria Math"/>
+                          </a:rPr>
+                          <m:t> ∙</m:t>
+                        </m:r>
+                        <m:r>
+                          <a:rPr lang="nl-NL" i="1">
+                            <a:latin typeface="Cambria Math"/>
+                          </a:rPr>
+                          <m:t>𝑣</m:t>
+                        </m:r>
+                      </m:e>
+                      <m:sub>
+                        <m:r>
+                          <a:rPr lang="nl-NL" i="1">
+                            <a:latin typeface="Cambria Math"/>
+                          </a:rPr>
+                          <m:t>𝑖</m:t>
+                        </m:r>
+                        <m:r>
+                          <a:rPr lang="nl-NL" i="1">
+                            <a:latin typeface="Cambria Math"/>
+                          </a:rPr>
+                          <m:t>−1/2</m:t>
+                        </m:r>
+                      </m:sub>
+                    </m:sSub>
+                  </m:oMath>
+                </a14:m>
+                <a:endParaRPr lang="nl-NL" dirty="0"/>
+              </a:p>
+              <a:p>
+                <a:pPr lvl="1"/>
+                <a14:m>
+                  <m:oMath xmlns:m="http://schemas.openxmlformats.org/officeDocument/2006/math">
+                    <m:sSub>
+                      <m:sSubPr>
+                        <m:ctrlPr>
+                          <a:rPr lang="nl-NL" i="1">
+                            <a:latin typeface="Cambria Math"/>
+                          </a:rPr>
+                        </m:ctrlPr>
+                      </m:sSubPr>
+                      <m:e>
+                        <m:r>
+                          <a:rPr lang="nl-NL" i="1">
+                            <a:latin typeface="Cambria Math"/>
+                          </a:rPr>
+                          <m:t>𝑎</m:t>
+                        </m:r>
+                      </m:e>
+                      <m:sub>
+                        <m:r>
+                          <a:rPr lang="nl-NL" i="1">
+                            <a:latin typeface="Cambria Math"/>
+                          </a:rPr>
+                          <m:t>𝑖</m:t>
+                        </m:r>
+                      </m:sub>
+                    </m:sSub>
+                    <m:r>
+                      <a:rPr lang="nl-NL" i="1">
+                        <a:latin typeface="Cambria Math"/>
+                      </a:rPr>
+                      <m:t>=</m:t>
+                    </m:r>
+                    <m:sSub>
+                      <m:sSubPr>
+                        <m:ctrlPr>
+                          <a:rPr lang="nl-NL" i="1">
+                            <a:latin typeface="Cambria Math"/>
+                          </a:rPr>
+                        </m:ctrlPr>
+                      </m:sSubPr>
+                      <m:e>
+                        <m:r>
+                          <a:rPr lang="nl-NL" i="1">
+                            <a:latin typeface="Cambria Math"/>
+                          </a:rPr>
+                          <m:t>𝑓</m:t>
+                        </m:r>
+                        <m:r>
+                          <a:rPr lang="nl-NL" i="1">
+                            <a:latin typeface="Cambria Math"/>
+                          </a:rPr>
+                          <m:t>(</m:t>
+                        </m:r>
+                        <m:r>
+                          <a:rPr lang="nl-NL" i="1">
+                            <a:latin typeface="Cambria Math"/>
+                          </a:rPr>
+                          <m:t>𝑥</m:t>
+                        </m:r>
+                      </m:e>
+                      <m:sub>
+                        <m:r>
+                          <a:rPr lang="nl-NL" i="1">
+                            <a:latin typeface="Cambria Math"/>
+                          </a:rPr>
+                          <m:t>𝑖</m:t>
+                        </m:r>
+                      </m:sub>
+                    </m:sSub>
+                    <m:r>
+                      <a:rPr lang="nl-NL" i="1">
+                        <a:latin typeface="Cambria Math"/>
+                      </a:rPr>
+                      <m:t>)</m:t>
+                    </m:r>
+                  </m:oMath>
+                </a14:m>
+                <a:endParaRPr lang="nl-NL" i="1" dirty="0">
+                  <a:latin typeface="Cambria Math"/>
+                </a:endParaRPr>
+              </a:p>
+              <a:p>
+                <a:pPr lvl="1"/>
+                <a14:m>
+                  <m:oMath xmlns:m="http://schemas.openxmlformats.org/officeDocument/2006/math">
+                    <m:sSub>
+                      <m:sSubPr>
+                        <m:ctrlPr>
+                          <a:rPr lang="nl-NL" i="1">
+                            <a:latin typeface="Cambria Math"/>
+                          </a:rPr>
+                        </m:ctrlPr>
+                      </m:sSubPr>
+                      <m:e>
+                        <m:r>
+                          <a:rPr lang="nl-NL" i="1">
+                            <a:latin typeface="Cambria Math"/>
+                          </a:rPr>
+                          <m:t>𝑣</m:t>
+                        </m:r>
+                      </m:e>
+                      <m:sub>
+                        <m:r>
+                          <a:rPr lang="nl-NL" i="1">
+                            <a:latin typeface="Cambria Math"/>
+                          </a:rPr>
+                          <m:t>𝑖</m:t>
+                        </m:r>
+                        <m:r>
+                          <a:rPr lang="nl-NL" i="1">
+                            <a:latin typeface="Cambria Math"/>
+                          </a:rPr>
+                          <m:t>+1/2</m:t>
+                        </m:r>
+                      </m:sub>
+                    </m:sSub>
+                    <m:r>
+                      <a:rPr lang="nl-NL" i="1">
+                        <a:latin typeface="Cambria Math"/>
+                      </a:rPr>
+                      <m:t>=</m:t>
+                    </m:r>
+                    <m:sSub>
+                      <m:sSubPr>
+                        <m:ctrlPr>
+                          <a:rPr lang="nl-NL" i="1">
+                            <a:latin typeface="Cambria Math"/>
+                          </a:rPr>
+                        </m:ctrlPr>
+                      </m:sSubPr>
+                      <m:e>
+                        <m:r>
+                          <a:rPr lang="nl-NL" i="1">
+                            <a:latin typeface="Cambria Math"/>
+                          </a:rPr>
+                          <m:t>𝑣</m:t>
+                        </m:r>
+                      </m:e>
+                      <m:sub>
+                        <m:r>
+                          <a:rPr lang="nl-NL" i="1">
+                            <a:latin typeface="Cambria Math"/>
+                          </a:rPr>
+                          <m:t>𝑖</m:t>
+                        </m:r>
+                        <m:r>
+                          <a:rPr lang="nl-NL" i="1">
+                            <a:latin typeface="Cambria Math"/>
+                          </a:rPr>
+                          <m:t>−1/2</m:t>
+                        </m:r>
+                      </m:sub>
+                    </m:sSub>
+                    <m:r>
+                      <a:rPr lang="nl-NL" i="1">
+                        <a:latin typeface="Cambria Math"/>
+                      </a:rPr>
+                      <m:t>+</m:t>
+                    </m:r>
+                    <m:sSub>
+                      <m:sSubPr>
+                        <m:ctrlPr>
+                          <a:rPr lang="nl-NL" i="1">
+                            <a:latin typeface="Cambria Math"/>
+                          </a:rPr>
+                        </m:ctrlPr>
+                      </m:sSubPr>
+                      <m:e>
+                        <m:r>
+                          <a:rPr lang="nl-NL" i="1">
+                            <a:latin typeface="Cambria Math"/>
+                            <a:ea typeface="Cambria Math"/>
+                          </a:rPr>
+                          <m:t>∆</m:t>
+                        </m:r>
+                        <m:r>
+                          <a:rPr lang="nl-NL" i="1">
+                            <a:latin typeface="Cambria Math"/>
+                            <a:ea typeface="Cambria Math"/>
+                          </a:rPr>
+                          <m:t>𝑡</m:t>
+                        </m:r>
+                        <m:r>
+                          <a:rPr lang="nl-NL" i="1">
+                            <a:latin typeface="Cambria Math"/>
+                            <a:ea typeface="Cambria Math"/>
+                          </a:rPr>
+                          <m:t> ∙</m:t>
+                        </m:r>
+                        <m:r>
+                          <a:rPr lang="nl-NL" i="1">
+                            <a:latin typeface="Cambria Math"/>
+                            <a:ea typeface="Cambria Math"/>
+                          </a:rPr>
+                          <m:t>𝑎</m:t>
+                        </m:r>
+                      </m:e>
+                      <m:sub>
+                        <m:r>
+                          <a:rPr lang="nl-NL" i="1">
+                            <a:latin typeface="Cambria Math"/>
+                          </a:rPr>
+                          <m:t>𝑖</m:t>
+                        </m:r>
+                      </m:sub>
+                    </m:sSub>
+                  </m:oMath>
+                </a14:m>
+                <a:endParaRPr lang="nl-NL" dirty="0" smtClean="0"/>
+              </a:p>
+              <a:p>
+                <a:r>
+                  <a:rPr lang="nl-NL" dirty="0"/>
+                  <a:t>Orde </a:t>
+                </a:r>
+                <a:r>
+                  <a:rPr lang="nl-NL" dirty="0" smtClean="0"/>
+                  <a:t>2</a:t>
+                </a:r>
+                <a:endParaRPr lang="nl-NL" dirty="0"/>
+              </a:p>
+              <a:p>
+                <a:r>
+                  <a:rPr lang="nl-NL" dirty="0" smtClean="0"/>
+                  <a:t>Slechts 1 functie-evaluatie</a:t>
+                </a:r>
+              </a:p>
+              <a:p>
+                <a:r>
+                  <a:rPr lang="nl-NL" dirty="0" smtClean="0"/>
+                  <a:t>Stabiel </a:t>
+                </a:r>
+                <a:r>
+                  <a:rPr lang="nl-NL" dirty="0"/>
+                  <a:t>voor oscillaties</a:t>
+                </a:r>
+              </a:p>
+              <a:p>
+                <a:pPr lvl="1"/>
+                <a14:m>
+                  <m:oMath xmlns:m="http://schemas.openxmlformats.org/officeDocument/2006/math">
+                    <m:r>
+                      <a:rPr lang="nl-NL" sz="2400" i="1">
+                        <a:latin typeface="Cambria Math"/>
+                        <a:ea typeface="Cambria Math"/>
+                      </a:rPr>
+                      <m:t>∆</m:t>
+                    </m:r>
+                    <m:r>
+                      <a:rPr lang="nl-NL" sz="2400" i="1">
+                        <a:latin typeface="Cambria Math"/>
+                        <a:ea typeface="Cambria Math"/>
+                      </a:rPr>
+                      <m:t>𝑡</m:t>
+                    </m:r>
+                    <m:r>
+                      <a:rPr lang="nl-NL" sz="2400" i="1">
+                        <a:latin typeface="Cambria Math"/>
+                        <a:ea typeface="Cambria Math"/>
+                      </a:rPr>
+                      <m:t>≤</m:t>
+                    </m:r>
+                    <m:f>
+                      <m:fPr>
+                        <m:ctrlPr>
+                          <a:rPr lang="nl-NL" sz="2400" i="1">
+                            <a:latin typeface="Cambria Math"/>
+                            <a:ea typeface="Cambria Math"/>
+                          </a:rPr>
+                        </m:ctrlPr>
+                      </m:fPr>
+                      <m:num>
+                        <m:r>
+                          <a:rPr lang="nl-NL" sz="2400" i="1">
+                            <a:latin typeface="Cambria Math"/>
+                            <a:ea typeface="Cambria Math"/>
+                          </a:rPr>
+                          <m:t>2</m:t>
+                        </m:r>
+                      </m:num>
+                      <m:den>
+                        <m:r>
+                          <a:rPr lang="nl-NL" sz="2400" i="1">
+                            <a:latin typeface="Cambria Math"/>
+                            <a:ea typeface="Cambria Math"/>
+                          </a:rPr>
+                          <m:t>𝜔</m:t>
+                        </m:r>
+                      </m:den>
+                    </m:f>
+                    <m:r>
+                      <a:rPr lang="nl-NL" sz="2400" b="0" i="0" smtClean="0">
+                        <a:latin typeface="Cambria Math"/>
+                        <a:ea typeface="Cambria Math"/>
+                      </a:rPr>
+                      <m:t> ,</m:t>
+                    </m:r>
+                  </m:oMath>
+                </a14:m>
+                <a:r>
+                  <a:rPr lang="nl-NL" dirty="0"/>
+                  <a:t> </a:t>
+                </a:r>
+                <a14:m>
+                  <m:oMath xmlns:m="http://schemas.openxmlformats.org/officeDocument/2006/math">
+                    <m:r>
+                      <a:rPr lang="nl-NL" sz="2400" i="1">
+                        <a:latin typeface="Cambria Math"/>
+                        <a:ea typeface="Cambria Math"/>
+                      </a:rPr>
+                      <m:t>𝜔</m:t>
+                    </m:r>
+                  </m:oMath>
+                </a14:m>
+                <a:r>
+                  <a:rPr lang="nl-NL" dirty="0"/>
+                  <a:t>: </a:t>
+                </a:r>
+                <a:r>
+                  <a:rPr lang="nl-NL" dirty="0" smtClean="0"/>
+                  <a:t>hoekfrequentie</a:t>
+                </a:r>
+                <a:endParaRPr lang="nl-NL" dirty="0"/>
+              </a:p>
+              <a:p>
+                <a:pPr lvl="1"/>
+                <a:endParaRPr lang="nl-NL" dirty="0"/>
+              </a:p>
+              <a:p>
+                <a:pPr marL="457200" lvl="1" indent="0">
+                  <a:buNone/>
+                </a:pPr>
+                <a:endParaRPr lang="nl-NL" dirty="0"/>
+              </a:p>
+            </p:txBody>
+          </p:sp>
+        </mc:Choice>
+        <mc:Fallback xmlns="">
+          <p:sp>
+            <p:nvSpPr>
+              <p:cNvPr id="3" name="Tijdelijke aanduiding voor inhoud 2"/>
+              <p:cNvSpPr>
+                <a:spLocks noGrp="1" noRot="1" noChangeAspect="1" noMove="1" noResize="1" noEditPoints="1" noAdjustHandles="1" noChangeArrowheads="1" noChangeShapeType="1" noTextEdit="1"/>
+              </p:cNvSpPr>
+              <p:nvPr>
+                <p:ph idx="1"/>
+              </p:nvPr>
+            </p:nvSpPr>
+            <p:spPr>
+              <a:blipFill rotWithShape="1">
+                <a:blip r:embed="rId3"/>
+                <a:stretch>
+                  <a:fillRect l="-676" t="-1818"/>
+                </a:stretch>
+              </a:blipFill>
+            </p:spPr>
+            <p:txBody>
+              <a:bodyPr/>
+              <a:lstStyle/>
+              <a:p>
+                <a:r>
+                  <a:rPr lang="nl-NL">
+                    <a:noFill/>
+                  </a:rPr>
+                  <a:t> </a:t>
+                </a:r>
+              </a:p>
+            </p:txBody>
+          </p:sp>
+        </mc:Fallback>
+      </mc:AlternateContent>
+    </p:spTree>
+    <p:extLst>
+      <p:ext uri="{BB962C8B-B14F-4D97-AF65-F5344CB8AC3E}">
+        <p14:creationId xmlns:p14="http://schemas.microsoft.com/office/powerpoint/2010/main" val="483754110"/>
+      </p:ext>
+    </p:extLst>
+  </p:cSld>
+  <p:clrMapOvr>
+    <a:masterClrMapping/>
+  </p:clrMapOvr>
+  <mc:AlternateContent xmlns:mc="http://schemas.openxmlformats.org/markup-compatibility/2006" xmlns:p14="http://schemas.microsoft.com/office/powerpoint/2010/main">
+    <mc:Choice Requires="p14">
+      <p:transition spd="med" p14:dur="700">
+        <p:fade/>
+      </p:transition>
+    </mc:Choice>
+    <mc:Fallback xmlns="">
+      <p:transition spd="med">
+        <p:fade/>
+      </p:transition>
+    </mc:Fallback>
+  </mc:AlternateContent>
+  <p:timing>
+    <p:tnLst>
+      <p:par>
+        <p:cTn id="1" dur="indefinite" restart="never" nodeType="tmRoot"/>
+      </p:par>
+    </p:tnLst>
+  </p:timing>
+</p:sld>
+</file>
+
+<file path=ppt/slides/slide6.xml><?xml version="1.0" encoding="utf-8"?>
 <p:sld xmlns:a="http://schemas.openxmlformats.org/drawingml/2006/main" xmlns:r="http://schemas.openxmlformats.org/officeDocument/2006/relationships" xmlns:p="http://schemas.openxmlformats.org/presentationml/2006/main">
   <p:cSld>
     <p:spTree>
@@ -9114,7 +9688,7 @@
         </p:blipFill>
         <p:spPr>
           <a:xfrm>
-            <a:off x="3999282" y="4876800"/>
+            <a:off x="4637457" y="4924425"/>
             <a:ext cx="2575990" cy="1981200"/>
           </a:xfrm>
           <a:prstGeom prst="rect">
@@ -9322,8 +9896,19 @@
           <a:p>
             <a:r>
               <a:rPr lang="nl-NL" dirty="0"/>
-              <a:t>Implementatie: ruimte recursief opdelen in kwadranten tot elk deeltje eigen kwadrant heeft</a:t>
-            </a:r>
+              <a:t>Implementatie: ruimte recursief opdelen in kwadranten tot elk </a:t>
+            </a:r>
+            <a:r>
+              <a:rPr lang="nl-NL" dirty="0" smtClean="0"/>
+              <a:t>kwadrant een of nul deeltjes heeft</a:t>
+            </a:r>
+          </a:p>
+          <a:p>
+            <a:r>
+              <a:rPr lang="nl-NL" dirty="0" smtClean="0"/>
+              <a:t>Deeltjes in kwadrant groeperen</a:t>
+            </a:r>
+            <a:endParaRPr lang="nl-NL" dirty="0"/>
           </a:p>
           <a:p>
             <a:r>
@@ -9362,13 +9947,13 @@
   <p:clrMapOvr>
     <a:masterClrMapping/>
   </p:clrMapOvr>
-  <mc:AlternateContent xmlns:mc="http://schemas.openxmlformats.org/markup-compatibility/2006">
-    <mc:Choice xmlns:p14="http://schemas.microsoft.com/office/powerpoint/2010/main" Requires="p14">
+  <mc:AlternateContent xmlns:mc="http://schemas.openxmlformats.org/markup-compatibility/2006" xmlns:p14="http://schemas.microsoft.com/office/powerpoint/2010/main">
+    <mc:Choice Requires="p14">
       <p:transition spd="med" p14:dur="700">
         <p:fade/>
       </p:transition>
     </mc:Choice>
-    <mc:Fallback>
+    <mc:Fallback xmlns="">
       <p:transition spd="med">
         <p:fade/>
       </p:transition>
@@ -9513,7 +10098,7 @@
 </p:sld>
 </file>
 
-<file path=ppt/slides/slide6.xml><?xml version="1.0" encoding="utf-8"?>
+<file path=ppt/slides/slide7.xml><?xml version="1.0" encoding="utf-8"?>
 <p:sld xmlns:a="http://schemas.openxmlformats.org/drawingml/2006/main" xmlns:r="http://schemas.openxmlformats.org/officeDocument/2006/relationships" xmlns:p="http://schemas.openxmlformats.org/presentationml/2006/main">
   <p:cSld>
     <p:spTree>
@@ -10275,149 +10860,6 @@
       </p:grpSp>
       <p:grpSp>
         <p:nvGrpSpPr>
-          <p:cNvPr id="4" name="Groep 3"/>
-          <p:cNvGrpSpPr/>
-          <p:nvPr/>
-        </p:nvGrpSpPr>
-        <p:grpSpPr>
-          <a:xfrm>
-            <a:off x="7804064" y="2962912"/>
-            <a:ext cx="3596965" cy="2035038"/>
-            <a:chOff x="7804064" y="2962912"/>
-            <a:chExt cx="3596965" cy="2035038"/>
-          </a:xfrm>
-        </p:grpSpPr>
-        <p:cxnSp>
-          <p:nvCxnSpPr>
-            <p:cNvPr id="203" name="Shape 203"/>
-            <p:cNvCxnSpPr/>
-            <p:nvPr/>
-          </p:nvCxnSpPr>
-          <p:spPr>
-            <a:xfrm flipH="1">
-              <a:off x="10149400" y="3826675"/>
-              <a:ext cx="201900" cy="304500"/>
-            </a:xfrm>
-            <a:prstGeom prst="straightConnector1">
-              <a:avLst/>
-            </a:prstGeom>
-            <a:noFill/>
-            <a:ln w="9525" cap="flat" cmpd="sng">
-              <a:solidFill>
-                <a:srgbClr val="38761D"/>
-              </a:solidFill>
-              <a:prstDash val="solid"/>
-              <a:round/>
-              <a:headEnd type="none" w="lg" len="lg"/>
-              <a:tailEnd type="triangle" w="lg" len="lg"/>
-            </a:ln>
-          </p:spPr>
-        </p:cxnSp>
-        <p:sp>
-          <p:nvSpPr>
-            <p:cNvPr id="204" name="Shape 204"/>
-            <p:cNvSpPr txBox="1"/>
-            <p:nvPr/>
-          </p:nvSpPr>
-          <p:spPr>
-            <a:xfrm>
-              <a:off x="10058964" y="2962912"/>
-              <a:ext cx="1342065" cy="549900"/>
-            </a:xfrm>
-            <a:prstGeom prst="rect">
-              <a:avLst/>
-            </a:prstGeom>
-            <a:noFill/>
-            <a:ln>
-              <a:noFill/>
-            </a:ln>
-          </p:spPr>
-          <p:txBody>
-            <a:bodyPr lIns="91425" tIns="91425" rIns="91425" bIns="91425" anchor="t" anchorCtr="0">
-              <a:noAutofit/>
-            </a:bodyPr>
-            <a:lstStyle/>
-            <a:p>
-              <a:pPr lvl="0">
-                <a:spcBef>
-                  <a:spcPts val="0"/>
-                </a:spcBef>
-                <a:buNone/>
-              </a:pPr>
-              <a:r>
-                <a:rPr lang="nl-NL" dirty="0"/>
-                <a:t>overlap, geen botsing</a:t>
-              </a:r>
-            </a:p>
-          </p:txBody>
-        </p:sp>
-        <p:cxnSp>
-          <p:nvCxnSpPr>
-            <p:cNvPr id="205" name="Shape 205"/>
-            <p:cNvCxnSpPr/>
-            <p:nvPr/>
-          </p:nvCxnSpPr>
-          <p:spPr>
-            <a:xfrm flipH="1">
-              <a:off x="8034425" y="4693450"/>
-              <a:ext cx="201900" cy="304500"/>
-            </a:xfrm>
-            <a:prstGeom prst="straightConnector1">
-              <a:avLst/>
-            </a:prstGeom>
-            <a:noFill/>
-            <a:ln w="9525" cap="flat" cmpd="sng">
-              <a:solidFill>
-                <a:srgbClr val="FF0000"/>
-              </a:solidFill>
-              <a:prstDash val="solid"/>
-              <a:round/>
-              <a:headEnd type="none" w="lg" len="lg"/>
-              <a:tailEnd type="triangle" w="lg" len="lg"/>
-            </a:ln>
-          </p:spPr>
-        </p:cxnSp>
-        <p:sp>
-          <p:nvSpPr>
-            <p:cNvPr id="206" name="Shape 206"/>
-            <p:cNvSpPr txBox="1"/>
-            <p:nvPr/>
-          </p:nvSpPr>
-          <p:spPr>
-            <a:xfrm>
-              <a:off x="7804064" y="4097950"/>
-              <a:ext cx="1130950" cy="495300"/>
-            </a:xfrm>
-            <a:prstGeom prst="rect">
-              <a:avLst/>
-            </a:prstGeom>
-            <a:noFill/>
-            <a:ln>
-              <a:noFill/>
-            </a:ln>
-          </p:spPr>
-          <p:txBody>
-            <a:bodyPr lIns="91425" tIns="91425" rIns="91425" bIns="91425" anchor="t" anchorCtr="0">
-              <a:noAutofit/>
-            </a:bodyPr>
-            <a:lstStyle/>
-            <a:p>
-              <a:pPr lvl="0">
-                <a:spcBef>
-                  <a:spcPts val="0"/>
-                </a:spcBef>
-                <a:buNone/>
-              </a:pPr>
-              <a:r>
-                <a:rPr lang="nl-NL" dirty="0"/>
-                <a:t>overlap, botsing</a:t>
-              </a:r>
-            </a:p>
-          </p:txBody>
-        </p:sp>
-      </p:grpSp>
-      <p:grpSp>
-        <p:nvGrpSpPr>
           <p:cNvPr id="5" name="Groep 4"/>
           <p:cNvGrpSpPr/>
           <p:nvPr/>
@@ -10750,7 +11192,7 @@
               <a:buChar char="•"/>
             </a:pPr>
             <a:r>
-              <a:rPr lang="nl-NL" dirty="0">
+              <a:rPr lang="nl-NL" dirty="0" smtClean="0">
                 <a:solidFill>
                   <a:schemeClr val="dk1"/>
                 </a:solidFill>
@@ -10758,8 +11200,16 @@
                 <a:cs typeface="Century Gothic"/>
                 <a:sym typeface="Century Gothic"/>
               </a:rPr>
-              <a:t>Botsing mogelijk als en slechts als rechthoeken overlappen</a:t>
-            </a:r>
+              <a:t>Botsing onmogelijk als en slechts als rechthoeken niet overlappen</a:t>
+            </a:r>
+            <a:endParaRPr lang="nl-NL" dirty="0">
+              <a:solidFill>
+                <a:schemeClr val="dk1"/>
+              </a:solidFill>
+              <a:ea typeface="Century Gothic"/>
+              <a:cs typeface="Century Gothic"/>
+              <a:sym typeface="Century Gothic"/>
+            </a:endParaRPr>
           </a:p>
           <a:p>
             <a:pPr lvl="0">
@@ -10839,13 +11289,13 @@
   <p:clrMapOvr>
     <a:masterClrMapping/>
   </p:clrMapOvr>
-  <mc:AlternateContent xmlns:mc="http://schemas.openxmlformats.org/markup-compatibility/2006">
-    <mc:Choice xmlns:p14="http://schemas.microsoft.com/office/powerpoint/2010/main" Requires="p14">
+  <mc:AlternateContent xmlns:mc="http://schemas.openxmlformats.org/markup-compatibility/2006" xmlns:p14="http://schemas.microsoft.com/office/powerpoint/2010/main">
+    <mc:Choice Requires="p14">
       <p:transition spd="med" p14:dur="700">
         <p:fade/>
       </p:transition>
     </mc:Choice>
-    <mc:Fallback>
+    <mc:Fallback xmlns="">
       <p:transition spd="med">
         <p:fade/>
       </p:transition>
@@ -10925,7 +11375,7 @@
                             </p:stCondLst>
                             <p:childTnLst>
                               <p:par>
-                                <p:cTn id="10" presetID="16" presetClass="entr" presetSubtype="21" fill="hold" nodeType="clickEffect">
+                                <p:cTn id="10" presetID="10" presetClass="entr" presetSubtype="0" fill="hold" nodeType="clickEffect">
                                   <p:stCondLst>
                                     <p:cond delay="0"/>
                                   </p:stCondLst>
@@ -10933,59 +11383,6 @@
                                     <p:set>
                                       <p:cBhvr>
                                         <p:cTn id="11" dur="1" fill="hold">
-                                          <p:stCondLst>
-                                            <p:cond delay="0"/>
-                                          </p:stCondLst>
-                                        </p:cTn>
-                                        <p:tgtEl>
-                                          <p:spTgt spid="4"/>
-                                        </p:tgtEl>
-                                        <p:attrNameLst>
-                                          <p:attrName>style.visibility</p:attrName>
-                                        </p:attrNameLst>
-                                      </p:cBhvr>
-                                      <p:to>
-                                        <p:strVal val="visible"/>
-                                      </p:to>
-                                    </p:set>
-                                    <p:animEffect transition="in" filter="barn(inVertical)">
-                                      <p:cBhvr>
-                                        <p:cTn id="12" dur="500"/>
-                                        <p:tgtEl>
-                                          <p:spTgt spid="4"/>
-                                        </p:tgtEl>
-                                      </p:cBhvr>
-                                    </p:animEffect>
-                                  </p:childTnLst>
-                                </p:cTn>
-                              </p:par>
-                            </p:childTnLst>
-                          </p:cTn>
-                        </p:par>
-                      </p:childTnLst>
-                    </p:cTn>
-                  </p:par>
-                  <p:par>
-                    <p:cTn id="13" fill="hold">
-                      <p:stCondLst>
-                        <p:cond delay="indefinite"/>
-                      </p:stCondLst>
-                      <p:childTnLst>
-                        <p:par>
-                          <p:cTn id="14" fill="hold">
-                            <p:stCondLst>
-                              <p:cond delay="0"/>
-                            </p:stCondLst>
-                            <p:childTnLst>
-                              <p:par>
-                                <p:cTn id="15" presetID="10" presetClass="entr" presetSubtype="0" fill="hold" nodeType="clickEffect">
-                                  <p:stCondLst>
-                                    <p:cond delay="0"/>
-                                  </p:stCondLst>
-                                  <p:childTnLst>
-                                    <p:set>
-                                      <p:cBhvr>
-                                        <p:cTn id="16" dur="1" fill="hold">
                                           <p:stCondLst>
                                             <p:cond delay="0"/>
                                           </p:stCondLst>
@@ -11003,7 +11400,7 @@
                                     </p:set>
                                     <p:animEffect transition="in" filter="fade">
                                       <p:cBhvr>
-                                        <p:cTn id="17" dur="500"/>
+                                        <p:cTn id="12" dur="500"/>
                                         <p:tgtEl>
                                           <p:spTgt spid="5"/>
                                         </p:tgtEl>
@@ -11043,7 +11440,7 @@
 </p:sld>
 </file>
 
-<file path=ppt/slides/slide7.xml><?xml version="1.0" encoding="utf-8"?>
+<file path=ppt/slides/slide8.xml><?xml version="1.0" encoding="utf-8"?>
 <p:sld xmlns:a="http://schemas.openxmlformats.org/drawingml/2006/main" xmlns:r="http://schemas.openxmlformats.org/officeDocument/2006/relationships" xmlns:p="http://schemas.openxmlformats.org/presentationml/2006/main">
   <p:cSld>
     <p:spTree>
@@ -11131,647 +11528,13 @@
   <p:clrMapOvr>
     <a:masterClrMapping/>
   </p:clrMapOvr>
-  <mc:AlternateContent xmlns:mc="http://schemas.openxmlformats.org/markup-compatibility/2006">
-    <mc:Choice xmlns:p14="http://schemas.microsoft.com/office/powerpoint/2010/main" Requires="p14">
+  <mc:AlternateContent xmlns:mc="http://schemas.openxmlformats.org/markup-compatibility/2006" xmlns:p14="http://schemas.microsoft.com/office/powerpoint/2010/main">
+    <mc:Choice Requires="p14">
       <p:transition spd="med" p14:dur="700">
         <p:fade/>
       </p:transition>
     </mc:Choice>
-    <mc:Fallback>
-      <p:transition spd="med">
-        <p:fade/>
-      </p:transition>
-    </mc:Fallback>
-  </mc:AlternateContent>
-  <p:timing>
-    <p:tnLst>
-      <p:par>
-        <p:cTn id="1" dur="indefinite" restart="never" nodeType="tmRoot"/>
-      </p:par>
-    </p:tnLst>
-  </p:timing>
-</p:sld>
-</file>
-
-<file path=ppt/slides/slide8.xml><?xml version="1.0" encoding="utf-8"?>
-<p:sld xmlns:a="http://schemas.openxmlformats.org/drawingml/2006/main" xmlns:r="http://schemas.openxmlformats.org/officeDocument/2006/relationships" xmlns:p="http://schemas.openxmlformats.org/presentationml/2006/main">
-  <p:cSld>
-    <p:spTree>
-      <p:nvGrpSpPr>
-        <p:cNvPr id="1" name=""/>
-        <p:cNvGrpSpPr/>
-        <p:nvPr/>
-      </p:nvGrpSpPr>
-      <p:grpSpPr>
-        <a:xfrm>
-          <a:off x="0" y="0"/>
-          <a:ext cx="0" cy="0"/>
-          <a:chOff x="0" y="0"/>
-          <a:chExt cx="0" cy="0"/>
-        </a:xfrm>
-      </p:grpSpPr>
-      <p:pic>
-        <p:nvPicPr>
-          <p:cNvPr id="4" name="Afbeelding 3"/>
-          <p:cNvPicPr>
-            <a:picLocks noChangeAspect="1"/>
-          </p:cNvPicPr>
-          <p:nvPr/>
-        </p:nvPicPr>
-        <p:blipFill>
-          <a:blip r:embed="rId2">
-            <a:extLst>
-              <a:ext uri="{28A0092B-C50C-407E-A947-70E740481C1C}">
-                <a14:useLocalDpi xmlns:a14="http://schemas.microsoft.com/office/drawing/2010/main" val="0"/>
-              </a:ext>
-            </a:extLst>
-          </a:blip>
-          <a:stretch>
-            <a:fillRect/>
-          </a:stretch>
-        </p:blipFill>
-        <p:spPr>
-          <a:xfrm>
-            <a:off x="4277546" y="4873541"/>
-            <a:ext cx="7856223" cy="1857739"/>
-          </a:xfrm>
-          <a:prstGeom prst="rect">
-            <a:avLst/>
-          </a:prstGeom>
-        </p:spPr>
-      </p:pic>
-      <p:sp>
-        <p:nvSpPr>
-          <p:cNvPr id="2" name="Titel 1"/>
-          <p:cNvSpPr>
-            <a:spLocks noGrp="1"/>
-          </p:cNvSpPr>
-          <p:nvPr>
-            <p:ph type="title"/>
-          </p:nvPr>
-        </p:nvSpPr>
-        <p:spPr/>
-        <p:txBody>
-          <a:bodyPr/>
-          <a:lstStyle/>
-          <a:p>
-            <a:r>
-              <a:rPr lang="nl-NL" dirty="0" err="1"/>
-              <a:t>Leapfrog</a:t>
-            </a:r>
-            <a:endParaRPr lang="nl-NL" dirty="0"/>
-          </a:p>
-        </p:txBody>
-      </p:sp>
-      <mc:AlternateContent xmlns:mc="http://schemas.openxmlformats.org/markup-compatibility/2006">
-        <mc:Choice xmlns:a14="http://schemas.microsoft.com/office/drawing/2010/main" Requires="a14">
-          <p:sp>
-            <p:nvSpPr>
-              <p:cNvPr id="3" name="Tijdelijke aanduiding voor inhoud 2"/>
-              <p:cNvSpPr>
-                <a:spLocks noGrp="1"/>
-              </p:cNvSpPr>
-              <p:nvPr>
-                <p:ph idx="1"/>
-              </p:nvPr>
-            </p:nvSpPr>
-            <p:spPr/>
-            <p:txBody>
-              <a:bodyPr>
-                <a:normAutofit/>
-              </a:bodyPr>
-              <a:lstStyle/>
-              <a:p>
-                <a:r>
-                  <a:rPr lang="nl-NL" dirty="0"/>
-                  <a:t>Formule:</a:t>
-                </a:r>
-              </a:p>
-              <a:p>
-                <a:pPr lvl="1"/>
-                <a14:m>
-                  <m:oMath xmlns:m="http://schemas.openxmlformats.org/officeDocument/2006/math">
-                    <m:sSub>
-                      <m:sSubPr>
-                        <m:ctrlPr>
-                          <a:rPr lang="nl-NL" i="1">
-                            <a:latin typeface="Cambria Math"/>
-                          </a:rPr>
-                        </m:ctrlPr>
-                      </m:sSubPr>
-                      <m:e>
-                        <m:r>
-                          <a:rPr lang="nl-NL" i="1">
-                            <a:latin typeface="Cambria Math"/>
-                          </a:rPr>
-                          <m:t>𝑥</m:t>
-                        </m:r>
-                      </m:e>
-                      <m:sub>
-                        <m:r>
-                          <a:rPr lang="nl-NL" i="1">
-                            <a:latin typeface="Cambria Math"/>
-                          </a:rPr>
-                          <m:t>𝑖</m:t>
-                        </m:r>
-                      </m:sub>
-                    </m:sSub>
-                    <m:r>
-                      <a:rPr lang="nl-NL" i="1">
-                        <a:latin typeface="Cambria Math"/>
-                      </a:rPr>
-                      <m:t>=</m:t>
-                    </m:r>
-                    <m:sSub>
-                      <m:sSubPr>
-                        <m:ctrlPr>
-                          <a:rPr lang="nl-NL" i="1">
-                            <a:latin typeface="Cambria Math"/>
-                          </a:rPr>
-                        </m:ctrlPr>
-                      </m:sSubPr>
-                      <m:e>
-                        <m:r>
-                          <a:rPr lang="nl-NL" i="1">
-                            <a:latin typeface="Cambria Math"/>
-                          </a:rPr>
-                          <m:t>𝑥</m:t>
-                        </m:r>
-                      </m:e>
-                      <m:sub>
-                        <m:r>
-                          <a:rPr lang="nl-NL" i="1">
-                            <a:latin typeface="Cambria Math"/>
-                          </a:rPr>
-                          <m:t>𝑖</m:t>
-                        </m:r>
-                        <m:r>
-                          <a:rPr lang="nl-NL" i="1">
-                            <a:latin typeface="Cambria Math"/>
-                          </a:rPr>
-                          <m:t>−1</m:t>
-                        </m:r>
-                      </m:sub>
-                    </m:sSub>
-                    <m:r>
-                      <a:rPr lang="nl-NL" i="1">
-                        <a:latin typeface="Cambria Math"/>
-                      </a:rPr>
-                      <m:t>+</m:t>
-                    </m:r>
-                    <m:sSub>
-                      <m:sSubPr>
-                        <m:ctrlPr>
-                          <a:rPr lang="nl-NL" i="1">
-                            <a:latin typeface="Cambria Math"/>
-                          </a:rPr>
-                        </m:ctrlPr>
-                      </m:sSubPr>
-                      <m:e>
-                        <m:r>
-                          <a:rPr lang="nl-NL" i="1">
-                            <a:latin typeface="Cambria Math"/>
-                            <a:ea typeface="Cambria Math"/>
-                          </a:rPr>
-                          <m:t>∆</m:t>
-                        </m:r>
-                        <m:r>
-                          <a:rPr lang="nl-NL" i="1">
-                            <a:latin typeface="Cambria Math"/>
-                            <a:ea typeface="Cambria Math"/>
-                          </a:rPr>
-                          <m:t>𝑡</m:t>
-                        </m:r>
-                        <m:r>
-                          <a:rPr lang="nl-NL" i="1">
-                            <a:latin typeface="Cambria Math"/>
-                            <a:ea typeface="Cambria Math"/>
-                          </a:rPr>
-                          <m:t> ∙</m:t>
-                        </m:r>
-                        <m:r>
-                          <a:rPr lang="nl-NL" i="1">
-                            <a:latin typeface="Cambria Math"/>
-                          </a:rPr>
-                          <m:t>𝑣</m:t>
-                        </m:r>
-                      </m:e>
-                      <m:sub>
-                        <m:r>
-                          <a:rPr lang="nl-NL" i="1">
-                            <a:latin typeface="Cambria Math"/>
-                          </a:rPr>
-                          <m:t>𝑖</m:t>
-                        </m:r>
-                        <m:r>
-                          <a:rPr lang="nl-NL" i="1">
-                            <a:latin typeface="Cambria Math"/>
-                          </a:rPr>
-                          <m:t>−</m:t>
-                        </m:r>
-                        <m:r>
-                          <a:rPr lang="nl-NL" i="1">
-                            <a:latin typeface="Cambria Math"/>
-                          </a:rPr>
-                          <m:t>1/2</m:t>
-                        </m:r>
-                      </m:sub>
-                    </m:sSub>
-                  </m:oMath>
-                </a14:m>
-                <a:endParaRPr lang="nl-NL" dirty="0"/>
-              </a:p>
-              <a:p>
-                <a:pPr lvl="1"/>
-                <a14:m>
-                  <m:oMath xmlns:m="http://schemas.openxmlformats.org/officeDocument/2006/math">
-                    <m:sSub>
-                      <m:sSubPr>
-                        <m:ctrlPr>
-                          <a:rPr lang="nl-NL" i="1">
-                            <a:latin typeface="Cambria Math"/>
-                          </a:rPr>
-                        </m:ctrlPr>
-                      </m:sSubPr>
-                      <m:e>
-                        <m:r>
-                          <a:rPr lang="nl-NL" i="1">
-                            <a:latin typeface="Cambria Math"/>
-                          </a:rPr>
-                          <m:t>𝑎</m:t>
-                        </m:r>
-                      </m:e>
-                      <m:sub>
-                        <m:r>
-                          <a:rPr lang="nl-NL" i="1">
-                            <a:latin typeface="Cambria Math"/>
-                          </a:rPr>
-                          <m:t>𝑖</m:t>
-                        </m:r>
-                      </m:sub>
-                    </m:sSub>
-                    <m:r>
-                      <a:rPr lang="nl-NL" i="1">
-                        <a:latin typeface="Cambria Math"/>
-                      </a:rPr>
-                      <m:t>=</m:t>
-                    </m:r>
-                    <m:sSub>
-                      <m:sSubPr>
-                        <m:ctrlPr>
-                          <a:rPr lang="nl-NL" i="1">
-                            <a:latin typeface="Cambria Math"/>
-                          </a:rPr>
-                        </m:ctrlPr>
-                      </m:sSubPr>
-                      <m:e>
-                        <m:r>
-                          <a:rPr lang="nl-NL" i="1">
-                            <a:latin typeface="Cambria Math"/>
-                          </a:rPr>
-                          <m:t>𝑓</m:t>
-                        </m:r>
-                        <m:r>
-                          <a:rPr lang="nl-NL" i="1">
-                            <a:latin typeface="Cambria Math"/>
-                          </a:rPr>
-                          <m:t>(</m:t>
-                        </m:r>
-                        <m:r>
-                          <a:rPr lang="nl-NL" i="1">
-                            <a:latin typeface="Cambria Math"/>
-                          </a:rPr>
-                          <m:t>𝑥</m:t>
-                        </m:r>
-                      </m:e>
-                      <m:sub>
-                        <m:r>
-                          <a:rPr lang="nl-NL" i="1">
-                            <a:latin typeface="Cambria Math"/>
-                          </a:rPr>
-                          <m:t>𝑖</m:t>
-                        </m:r>
-                      </m:sub>
-                    </m:sSub>
-                    <m:r>
-                      <a:rPr lang="nl-NL" i="1">
-                        <a:latin typeface="Cambria Math"/>
-                      </a:rPr>
-                      <m:t>)</m:t>
-                    </m:r>
-                  </m:oMath>
-                </a14:m>
-                <a:endParaRPr lang="nl-NL" i="1" dirty="0">
-                  <a:latin typeface="Cambria Math"/>
-                </a:endParaRPr>
-              </a:p>
-              <a:p>
-                <a:pPr lvl="1"/>
-                <a14:m>
-                  <m:oMath xmlns:m="http://schemas.openxmlformats.org/officeDocument/2006/math">
-                    <m:sSub>
-                      <m:sSubPr>
-                        <m:ctrlPr>
-                          <a:rPr lang="nl-NL" i="1">
-                            <a:latin typeface="Cambria Math"/>
-                          </a:rPr>
-                        </m:ctrlPr>
-                      </m:sSubPr>
-                      <m:e>
-                        <m:r>
-                          <a:rPr lang="nl-NL" i="1">
-                            <a:latin typeface="Cambria Math"/>
-                          </a:rPr>
-                          <m:t>𝑣</m:t>
-                        </m:r>
-                      </m:e>
-                      <m:sub>
-                        <m:r>
-                          <a:rPr lang="nl-NL" i="1">
-                            <a:latin typeface="Cambria Math"/>
-                          </a:rPr>
-                          <m:t>𝑖</m:t>
-                        </m:r>
-                        <m:r>
-                          <a:rPr lang="nl-NL" i="1">
-                            <a:latin typeface="Cambria Math"/>
-                          </a:rPr>
-                          <m:t>+1/2</m:t>
-                        </m:r>
-                      </m:sub>
-                    </m:sSub>
-                    <m:r>
-                      <a:rPr lang="nl-NL" i="1">
-                        <a:latin typeface="Cambria Math"/>
-                      </a:rPr>
-                      <m:t>=</m:t>
-                    </m:r>
-                    <m:sSub>
-                      <m:sSubPr>
-                        <m:ctrlPr>
-                          <a:rPr lang="nl-NL" i="1">
-                            <a:latin typeface="Cambria Math"/>
-                          </a:rPr>
-                        </m:ctrlPr>
-                      </m:sSubPr>
-                      <m:e>
-                        <m:r>
-                          <a:rPr lang="nl-NL" i="1">
-                            <a:latin typeface="Cambria Math"/>
-                          </a:rPr>
-                          <m:t>𝑣</m:t>
-                        </m:r>
-                      </m:e>
-                      <m:sub>
-                        <m:r>
-                          <a:rPr lang="nl-NL" i="1">
-                            <a:latin typeface="Cambria Math"/>
-                          </a:rPr>
-                          <m:t>𝑖</m:t>
-                        </m:r>
-                        <m:r>
-                          <a:rPr lang="nl-NL" i="1">
-                            <a:latin typeface="Cambria Math"/>
-                          </a:rPr>
-                          <m:t>−1/2</m:t>
-                        </m:r>
-                      </m:sub>
-                    </m:sSub>
-                    <m:r>
-                      <a:rPr lang="nl-NL" i="1">
-                        <a:latin typeface="Cambria Math"/>
-                      </a:rPr>
-                      <m:t>+</m:t>
-                    </m:r>
-                    <m:sSub>
-                      <m:sSubPr>
-                        <m:ctrlPr>
-                          <a:rPr lang="nl-NL" i="1">
-                            <a:latin typeface="Cambria Math"/>
-                          </a:rPr>
-                        </m:ctrlPr>
-                      </m:sSubPr>
-                      <m:e>
-                        <m:r>
-                          <a:rPr lang="nl-NL" i="1">
-                            <a:latin typeface="Cambria Math"/>
-                            <a:ea typeface="Cambria Math"/>
-                          </a:rPr>
-                          <m:t>∆</m:t>
-                        </m:r>
-                        <m:r>
-                          <a:rPr lang="nl-NL" i="1">
-                            <a:latin typeface="Cambria Math"/>
-                            <a:ea typeface="Cambria Math"/>
-                          </a:rPr>
-                          <m:t>𝑡</m:t>
-                        </m:r>
-                        <m:r>
-                          <a:rPr lang="nl-NL" i="1">
-                            <a:latin typeface="Cambria Math"/>
-                            <a:ea typeface="Cambria Math"/>
-                          </a:rPr>
-                          <m:t> ∙</m:t>
-                        </m:r>
-                        <m:r>
-                          <a:rPr lang="nl-NL" i="1">
-                            <a:latin typeface="Cambria Math"/>
-                            <a:ea typeface="Cambria Math"/>
-                          </a:rPr>
-                          <m:t>𝑎</m:t>
-                        </m:r>
-                      </m:e>
-                      <m:sub>
-                        <m:r>
-                          <a:rPr lang="nl-NL" i="1">
-                            <a:latin typeface="Cambria Math"/>
-                          </a:rPr>
-                          <m:t>𝑖</m:t>
-                        </m:r>
-                      </m:sub>
-                    </m:sSub>
-                  </m:oMath>
-                </a14:m>
-                <a:endParaRPr lang="nl-NL" dirty="0" smtClean="0"/>
-              </a:p>
-              <a:p>
-                <a:r>
-                  <a:rPr lang="nl-NL" dirty="0"/>
-                  <a:t>Orde </a:t>
-                </a:r>
-                <a:r>
-                  <a:rPr lang="nl-NL" dirty="0" smtClean="0"/>
-                  <a:t>2</a:t>
-                </a:r>
-                <a:endParaRPr lang="nl-NL" dirty="0"/>
-              </a:p>
-              <a:p>
-                <a:r>
-                  <a:rPr lang="nl-NL" dirty="0" smtClean="0"/>
-                  <a:t>Slechts 1 functie-evaluatie</a:t>
-                </a:r>
-              </a:p>
-              <a:p>
-                <a:r>
-                  <a:rPr lang="nl-NL" dirty="0" smtClean="0"/>
-                  <a:t>Stabiel </a:t>
-                </a:r>
-                <a:r>
-                  <a:rPr lang="nl-NL" dirty="0"/>
-                  <a:t>voor oscillaties</a:t>
-                </a:r>
-              </a:p>
-              <a:p>
-                <a:pPr lvl="1"/>
-                <a14:m>
-                  <m:oMath xmlns:m="http://schemas.openxmlformats.org/officeDocument/2006/math">
-                    <m:r>
-                      <a:rPr lang="nl-NL" sz="2400" i="1">
-                        <a:latin typeface="Cambria Math"/>
-                        <a:ea typeface="Cambria Math"/>
-                      </a:rPr>
-                      <m:t>∆</m:t>
-                    </m:r>
-                    <m:r>
-                      <a:rPr lang="nl-NL" sz="2400" i="1">
-                        <a:latin typeface="Cambria Math"/>
-                        <a:ea typeface="Cambria Math"/>
-                      </a:rPr>
-                      <m:t>𝑡</m:t>
-                    </m:r>
-                    <m:r>
-                      <a:rPr lang="nl-NL" sz="2400" i="1">
-                        <a:latin typeface="Cambria Math"/>
-                        <a:ea typeface="Cambria Math"/>
-                      </a:rPr>
-                      <m:t>≤</m:t>
-                    </m:r>
-                    <m:f>
-                      <m:fPr>
-                        <m:ctrlPr>
-                          <a:rPr lang="nl-NL" sz="2400" i="1">
-                            <a:latin typeface="Cambria Math"/>
-                            <a:ea typeface="Cambria Math"/>
-                          </a:rPr>
-                        </m:ctrlPr>
-                      </m:fPr>
-                      <m:num>
-                        <m:r>
-                          <a:rPr lang="nl-NL" sz="2400" i="1">
-                            <a:latin typeface="Cambria Math"/>
-                            <a:ea typeface="Cambria Math"/>
-                          </a:rPr>
-                          <m:t>2</m:t>
-                        </m:r>
-                      </m:num>
-                      <m:den>
-                        <m:r>
-                          <a:rPr lang="nl-NL" sz="2400" i="1">
-                            <a:latin typeface="Cambria Math"/>
-                            <a:ea typeface="Cambria Math"/>
-                          </a:rPr>
-                          <m:t>𝜔</m:t>
-                        </m:r>
-                      </m:den>
-                    </m:f>
-                    <m:r>
-                      <a:rPr lang="nl-NL" sz="2400" b="0" i="0" smtClean="0">
-                        <a:latin typeface="Cambria Math"/>
-                        <a:ea typeface="Cambria Math"/>
-                      </a:rPr>
-                      <m:t> ,</m:t>
-                    </m:r>
-                  </m:oMath>
-                </a14:m>
-                <a:r>
-                  <a:rPr lang="nl-NL" dirty="0"/>
-                  <a:t> </a:t>
-                </a:r>
-                <a14:m>
-                  <m:oMath xmlns:m="http://schemas.openxmlformats.org/officeDocument/2006/math">
-                    <m:r>
-                      <a:rPr lang="nl-NL" sz="2400" i="1">
-                        <a:latin typeface="Cambria Math"/>
-                        <a:ea typeface="Cambria Math"/>
-                      </a:rPr>
-                      <m:t>𝜔</m:t>
-                    </m:r>
-                  </m:oMath>
-                </a14:m>
-                <a:r>
-                  <a:rPr lang="nl-NL" dirty="0"/>
-                  <a:t>: </a:t>
-                </a:r>
-                <a:r>
-                  <a:rPr lang="nl-NL" dirty="0" smtClean="0"/>
-                  <a:t>hoekfrequentie</a:t>
-                </a:r>
-                <a:endParaRPr lang="nl-NL" dirty="0"/>
-              </a:p>
-              <a:p>
-                <a:pPr lvl="1"/>
-                <a:endParaRPr lang="nl-NL" dirty="0"/>
-              </a:p>
-              <a:p>
-                <a:pPr marL="457200" lvl="1" indent="0">
-                  <a:buNone/>
-                </a:pPr>
-                <a:endParaRPr lang="nl-NL" dirty="0"/>
-              </a:p>
-            </p:txBody>
-          </p:sp>
-        </mc:Choice>
-        <mc:Fallback>
-          <p:sp>
-            <p:nvSpPr>
-              <p:cNvPr id="3" name="Tijdelijke aanduiding voor inhoud 2"/>
-              <p:cNvSpPr>
-                <a:spLocks noGrp="1" noRot="1" noChangeAspect="1" noMove="1" noResize="1" noEditPoints="1" noAdjustHandles="1" noChangeArrowheads="1" noChangeShapeType="1" noTextEdit="1"/>
-              </p:cNvSpPr>
-              <p:nvPr>
-                <p:ph idx="1"/>
-              </p:nvPr>
-            </p:nvSpPr>
-            <p:spPr>
-              <a:blipFill rotWithShape="1">
-                <a:blip r:embed="rId3"/>
-                <a:stretch>
-                  <a:fillRect l="-676" t="-1818"/>
-                </a:stretch>
-              </a:blipFill>
-            </p:spPr>
-            <p:txBody>
-              <a:bodyPr/>
-              <a:lstStyle/>
-              <a:p>
-                <a:r>
-                  <a:rPr lang="nl-NL">
-                    <a:noFill/>
-                  </a:rPr>
-                  <a:t> </a:t>
-                </a:r>
-              </a:p>
-            </p:txBody>
-          </p:sp>
-        </mc:Fallback>
-      </mc:AlternateContent>
-    </p:spTree>
-    <p:extLst>
-      <p:ext uri="{BB962C8B-B14F-4D97-AF65-F5344CB8AC3E}">
-        <p14:creationId xmlns:p14="http://schemas.microsoft.com/office/powerpoint/2010/main" val="4106520603"/>
-      </p:ext>
-    </p:extLst>
-  </p:cSld>
-  <p:clrMapOvr>
-    <a:masterClrMapping/>
-  </p:clrMapOvr>
-  <mc:AlternateContent xmlns:mc="http://schemas.openxmlformats.org/markup-compatibility/2006">
-    <mc:Choice xmlns:p14="http://schemas.microsoft.com/office/powerpoint/2010/main" Requires="p14">
-      <p:transition spd="med" p14:dur="700">
-        <p:fade/>
-      </p:transition>
-    </mc:Choice>
-    <mc:Fallback>
+    <mc:Fallback xmlns="">
       <p:transition spd="med">
         <p:fade/>
       </p:transition>
@@ -12251,13 +12014,13 @@
   <p:clrMapOvr>
     <a:masterClrMapping/>
   </p:clrMapOvr>
-  <mc:AlternateContent xmlns:mc="http://schemas.openxmlformats.org/markup-compatibility/2006">
-    <mc:Choice xmlns:p14="http://schemas.microsoft.com/office/powerpoint/2010/main" Requires="p14">
+  <mc:AlternateContent xmlns:mc="http://schemas.openxmlformats.org/markup-compatibility/2006" xmlns:p14="http://schemas.microsoft.com/office/powerpoint/2010/main">
+    <mc:Choice Requires="p14">
       <p:transition spd="med" p14:dur="700">
         <p:fade/>
       </p:transition>
     </mc:Choice>
-    <mc:Fallback>
+    <mc:Fallback xmlns="">
       <p:transition spd="med">
         <p:fade/>
       </p:transition>
@@ -12537,7 +12300,7 @@
   <a:extraClrSchemeLst/>
   <a:extLst>
     <a:ext uri="{05A4C25C-085E-4340-85A3-A5531E510DB2}">
-      <thm15:themeFamily xmlns:thm15="http://schemas.microsoft.com/office/thememl/2012/main" xmlns="" name="Vapor Trail" id="{4FDF2955-7D9C-493C-B9F9-C205151B46CD}" vid="{FE1EB5C7-81A8-4CBA-AE6E-B3BF73DC3895}"/>
+      <thm15:themeFamily xmlns="" xmlns:thm15="http://schemas.microsoft.com/office/thememl/2012/main" name="Vapor Trail" id="{4FDF2955-7D9C-493C-B9F9-C205151B46CD}" vid="{FE1EB5C7-81A8-4CBA-AE6E-B3BF73DC3895}"/>
     </a:ext>
   </a:extLst>
 </a:theme>

</xml_diff>

<commit_message>
PPT en meer Nand simulaties
</commit_message>
<xml_diff>
--- a/Presentatie/Presentatie.pptx
+++ b/Presentatie/Presentatie.pptx
@@ -121,7 +121,7 @@
   </p:defaultTextStyle>
   <p:extLst>
     <p:ext uri="{EFAFB233-063F-42B5-8137-9DF3F51BA10A}">
-      <p15:sldGuideLst xmlns="" xmlns:p15="http://schemas.microsoft.com/office/powerpoint/2012/main">
+      <p15:sldGuideLst xmlns:p15="http://schemas.microsoft.com/office/powerpoint/2012/main" xmlns="">
         <p15:guide id="1" orient="horz" pos="2160">
           <p15:clr>
             <a:srgbClr val="A4A3A4"/>
@@ -220,7 +220,7 @@
           <a:p>
             <a:fld id="{5F2BFC91-6838-42FB-B20E-402D536CBC41}" type="datetimeFigureOut">
               <a:rPr lang="nl-NL" smtClean="0"/>
-              <a:t>9-6-2017</a:t>
+              <a:t>14-6-2017</a:t>
             </a:fld>
             <a:endParaRPr lang="nl-NL"/>
           </a:p>
@@ -762,7 +762,7 @@
           <a:p>
             <a:fld id="{D0BEBCF1-C867-4FA3-929D-70E3E2EA05CD}" type="datetimeFigureOut">
               <a:rPr lang="nl-NL" smtClean="0"/>
-              <a:t>9-6-2017</a:t>
+              <a:t>14-6-2017</a:t>
             </a:fld>
             <a:endParaRPr lang="nl-NL"/>
           </a:p>
@@ -1041,7 +1041,7 @@
           <a:p>
             <a:fld id="{D0BEBCF1-C867-4FA3-929D-70E3E2EA05CD}" type="datetimeFigureOut">
               <a:rPr lang="nl-NL" smtClean="0"/>
-              <a:t>9-6-2017</a:t>
+              <a:t>14-6-2017</a:t>
             </a:fld>
             <a:endParaRPr lang="nl-NL"/>
           </a:p>
@@ -1284,7 +1284,7 @@
           <a:p>
             <a:fld id="{D0BEBCF1-C867-4FA3-929D-70E3E2EA05CD}" type="datetimeFigureOut">
               <a:rPr lang="nl-NL" smtClean="0"/>
-              <a:t>9-6-2017</a:t>
+              <a:t>14-6-2017</a:t>
             </a:fld>
             <a:endParaRPr lang="nl-NL"/>
           </a:p>
@@ -1606,7 +1606,7 @@
           <a:p>
             <a:fld id="{D0BEBCF1-C867-4FA3-929D-70E3E2EA05CD}" type="datetimeFigureOut">
               <a:rPr lang="nl-NL" smtClean="0"/>
-              <a:t>9-6-2017</a:t>
+              <a:t>14-6-2017</a:t>
             </a:fld>
             <a:endParaRPr lang="nl-NL"/>
           </a:p>
@@ -2091,7 +2091,7 @@
           <a:p>
             <a:fld id="{D0BEBCF1-C867-4FA3-929D-70E3E2EA05CD}" type="datetimeFigureOut">
               <a:rPr lang="nl-NL" smtClean="0"/>
-              <a:t>9-6-2017</a:t>
+              <a:t>14-6-2017</a:t>
             </a:fld>
             <a:endParaRPr lang="nl-NL"/>
           </a:p>
@@ -2650,7 +2650,7 @@
           <a:p>
             <a:fld id="{D0BEBCF1-C867-4FA3-929D-70E3E2EA05CD}" type="datetimeFigureOut">
               <a:rPr lang="nl-NL" smtClean="0"/>
-              <a:t>9-6-2017</a:t>
+              <a:t>14-6-2017</a:t>
             </a:fld>
             <a:endParaRPr lang="nl-NL"/>
           </a:p>
@@ -3436,7 +3436,7 @@
           <a:p>
             <a:fld id="{D0BEBCF1-C867-4FA3-929D-70E3E2EA05CD}" type="datetimeFigureOut">
               <a:rPr lang="nl-NL" smtClean="0"/>
-              <a:t>9-6-2017</a:t>
+              <a:t>14-6-2017</a:t>
             </a:fld>
             <a:endParaRPr lang="nl-NL"/>
           </a:p>
@@ -3623,7 +3623,7 @@
           <a:p>
             <a:fld id="{D0BEBCF1-C867-4FA3-929D-70E3E2EA05CD}" type="datetimeFigureOut">
               <a:rPr lang="nl-NL" smtClean="0"/>
-              <a:t>9-6-2017</a:t>
+              <a:t>14-6-2017</a:t>
             </a:fld>
             <a:endParaRPr lang="nl-NL"/>
           </a:p>
@@ -3858,7 +3858,7 @@
           <a:p>
             <a:fld id="{D0BEBCF1-C867-4FA3-929D-70E3E2EA05CD}" type="datetimeFigureOut">
               <a:rPr lang="nl-NL" smtClean="0"/>
-              <a:t>9-6-2017</a:t>
+              <a:t>14-6-2017</a:t>
             </a:fld>
             <a:endParaRPr lang="nl-NL"/>
           </a:p>
@@ -4050,7 +4050,7 @@
           <a:p>
             <a:fld id="{D0BEBCF1-C867-4FA3-929D-70E3E2EA05CD}" type="datetimeFigureOut">
               <a:rPr lang="nl-NL" smtClean="0"/>
-              <a:t>9-6-2017</a:t>
+              <a:t>14-6-2017</a:t>
             </a:fld>
             <a:endParaRPr lang="nl-NL"/>
           </a:p>
@@ -4351,7 +4351,7 @@
           <a:p>
             <a:fld id="{D0BEBCF1-C867-4FA3-929D-70E3E2EA05CD}" type="datetimeFigureOut">
               <a:rPr lang="nl-NL" smtClean="0"/>
-              <a:t>9-6-2017</a:t>
+              <a:t>14-6-2017</a:t>
             </a:fld>
             <a:endParaRPr lang="nl-NL"/>
           </a:p>
@@ -4605,7 +4605,7 @@
           <a:p>
             <a:fld id="{D0BEBCF1-C867-4FA3-929D-70E3E2EA05CD}" type="datetimeFigureOut">
               <a:rPr lang="nl-NL" smtClean="0"/>
-              <a:t>9-6-2017</a:t>
+              <a:t>14-6-2017</a:t>
             </a:fld>
             <a:endParaRPr lang="nl-NL"/>
           </a:p>
@@ -4996,7 +4996,7 @@
           <a:p>
             <a:fld id="{D0BEBCF1-C867-4FA3-929D-70E3E2EA05CD}" type="datetimeFigureOut">
               <a:rPr lang="nl-NL" smtClean="0"/>
-              <a:t>9-6-2017</a:t>
+              <a:t>14-6-2017</a:t>
             </a:fld>
             <a:endParaRPr lang="nl-NL"/>
           </a:p>
@@ -5126,7 +5126,7 @@
           <a:p>
             <a:fld id="{D0BEBCF1-C867-4FA3-929D-70E3E2EA05CD}" type="datetimeFigureOut">
               <a:rPr lang="nl-NL" smtClean="0"/>
-              <a:t>9-6-2017</a:t>
+              <a:t>14-6-2017</a:t>
             </a:fld>
             <a:endParaRPr lang="nl-NL"/>
           </a:p>
@@ -5233,7 +5233,7 @@
           <a:p>
             <a:fld id="{D0BEBCF1-C867-4FA3-929D-70E3E2EA05CD}" type="datetimeFigureOut">
               <a:rPr lang="nl-NL" smtClean="0"/>
-              <a:t>9-6-2017</a:t>
+              <a:t>14-6-2017</a:t>
             </a:fld>
             <a:endParaRPr lang="nl-NL"/>
           </a:p>
@@ -5494,7 +5494,7 @@
           <a:p>
             <a:fld id="{D0BEBCF1-C867-4FA3-929D-70E3E2EA05CD}" type="datetimeFigureOut">
               <a:rPr lang="nl-NL" smtClean="0"/>
-              <a:t>9-6-2017</a:t>
+              <a:t>14-6-2017</a:t>
             </a:fld>
             <a:endParaRPr lang="nl-NL"/>
           </a:p>
@@ -5763,7 +5763,7 @@
           <a:p>
             <a:fld id="{D0BEBCF1-C867-4FA3-929D-70E3E2EA05CD}" type="datetimeFigureOut">
               <a:rPr lang="nl-NL" smtClean="0"/>
-              <a:t>9-6-2017</a:t>
+              <a:t>14-6-2017</a:t>
             </a:fld>
             <a:endParaRPr lang="nl-NL"/>
           </a:p>
@@ -6018,7 +6018,7 @@
           <a:p>
             <a:fld id="{D0BEBCF1-C867-4FA3-929D-70E3E2EA05CD}" type="datetimeFigureOut">
               <a:rPr lang="nl-NL" smtClean="0"/>
-              <a:t>9-6-2017</a:t>
+              <a:t>14-6-2017</a:t>
             </a:fld>
             <a:endParaRPr lang="nl-NL"/>
           </a:p>
@@ -7106,56 +7106,56 @@
                 <a:gridCol w="1484290">
                   <a:extLst>
                     <a:ext uri="{9D8B030D-6E8A-4147-A177-3AD203B41FA5}">
-                      <a16:colId xmlns="" xmlns:a16="http://schemas.microsoft.com/office/drawing/2014/main" val="20000"/>
+                      <a16:colId xmlns:a16="http://schemas.microsoft.com/office/drawing/2014/main" xmlns="" val="20000"/>
                     </a:ext>
                   </a:extLst>
                 </a:gridCol>
                 <a:gridCol w="1484290">
                   <a:extLst>
                     <a:ext uri="{9D8B030D-6E8A-4147-A177-3AD203B41FA5}">
-                      <a16:colId xmlns="" xmlns:a16="http://schemas.microsoft.com/office/drawing/2014/main" val="20001"/>
+                      <a16:colId xmlns:a16="http://schemas.microsoft.com/office/drawing/2014/main" xmlns="" val="20001"/>
                     </a:ext>
                   </a:extLst>
                 </a:gridCol>
                 <a:gridCol w="1484290">
                   <a:extLst>
                     <a:ext uri="{9D8B030D-6E8A-4147-A177-3AD203B41FA5}">
-                      <a16:colId xmlns="" xmlns:a16="http://schemas.microsoft.com/office/drawing/2014/main" val="20002"/>
+                      <a16:colId xmlns:a16="http://schemas.microsoft.com/office/drawing/2014/main" xmlns="" val="20002"/>
                     </a:ext>
                   </a:extLst>
                 </a:gridCol>
                 <a:gridCol w="1484290">
                   <a:extLst>
                     <a:ext uri="{9D8B030D-6E8A-4147-A177-3AD203B41FA5}">
-                      <a16:colId xmlns="" xmlns:a16="http://schemas.microsoft.com/office/drawing/2014/main" val="20003"/>
+                      <a16:colId xmlns:a16="http://schemas.microsoft.com/office/drawing/2014/main" xmlns="" val="20003"/>
                     </a:ext>
                   </a:extLst>
                 </a:gridCol>
                 <a:gridCol w="1484290">
                   <a:extLst>
                     <a:ext uri="{9D8B030D-6E8A-4147-A177-3AD203B41FA5}">
-                      <a16:colId xmlns="" xmlns:a16="http://schemas.microsoft.com/office/drawing/2014/main" val="20004"/>
+                      <a16:colId xmlns:a16="http://schemas.microsoft.com/office/drawing/2014/main" xmlns="" val="20004"/>
                     </a:ext>
                   </a:extLst>
                 </a:gridCol>
                 <a:gridCol w="1484290">
                   <a:extLst>
                     <a:ext uri="{9D8B030D-6E8A-4147-A177-3AD203B41FA5}">
-                      <a16:colId xmlns="" xmlns:a16="http://schemas.microsoft.com/office/drawing/2014/main" val="20005"/>
+                      <a16:colId xmlns:a16="http://schemas.microsoft.com/office/drawing/2014/main" xmlns="" val="20005"/>
                     </a:ext>
                   </a:extLst>
                 </a:gridCol>
                 <a:gridCol w="1484290">
                   <a:extLst>
                     <a:ext uri="{9D8B030D-6E8A-4147-A177-3AD203B41FA5}">
-                      <a16:colId xmlns="" xmlns:a16="http://schemas.microsoft.com/office/drawing/2014/main" val="20006"/>
+                      <a16:colId xmlns:a16="http://schemas.microsoft.com/office/drawing/2014/main" xmlns="" val="20006"/>
                     </a:ext>
                   </a:extLst>
                 </a:gridCol>
                 <a:gridCol w="1484290">
                   <a:extLst>
                     <a:ext uri="{9D8B030D-6E8A-4147-A177-3AD203B41FA5}">
-                      <a16:colId xmlns="" xmlns:a16="http://schemas.microsoft.com/office/drawing/2014/main" val="20007"/>
+                      <a16:colId xmlns:a16="http://schemas.microsoft.com/office/drawing/2014/main" xmlns="" val="20007"/>
                     </a:ext>
                   </a:extLst>
                 </a:gridCol>
@@ -7280,7 +7280,7 @@
                 </a:tc>
                 <a:extLst>
                   <a:ext uri="{0D108BD9-81ED-4DB2-BD59-A6C34878D82A}">
-                    <a16:rowId xmlns="" xmlns:a16="http://schemas.microsoft.com/office/drawing/2014/main" val="10000"/>
+                    <a16:rowId xmlns:a16="http://schemas.microsoft.com/office/drawing/2014/main" xmlns="" val="10000"/>
                   </a:ext>
                 </a:extLst>
               </a:tr>
@@ -7456,7 +7456,7 @@
                 </a:tc>
                 <a:extLst>
                   <a:ext uri="{0D108BD9-81ED-4DB2-BD59-A6C34878D82A}">
-                    <a16:rowId xmlns="" xmlns:a16="http://schemas.microsoft.com/office/drawing/2014/main" val="10001"/>
+                    <a16:rowId xmlns:a16="http://schemas.microsoft.com/office/drawing/2014/main" xmlns="" val="10001"/>
                   </a:ext>
                 </a:extLst>
               </a:tr>
@@ -9659,7 +9659,7 @@
         </p:blipFill>
         <p:spPr>
           <a:xfrm>
-            <a:off x="7569339" y="2066926"/>
+            <a:off x="7569339" y="2075552"/>
             <a:ext cx="3933333" cy="3933333"/>
           </a:xfrm>
           <a:prstGeom prst="rect">
@@ -9937,6 +9937,36 @@
           </a:p>
         </p:txBody>
       </p:sp>
+      <p:pic>
+        <p:nvPicPr>
+          <p:cNvPr id="7" name="Afbeelding 6"/>
+          <p:cNvPicPr>
+            <a:picLocks noChangeAspect="1"/>
+          </p:cNvPicPr>
+          <p:nvPr/>
+        </p:nvPicPr>
+        <p:blipFill>
+          <a:blip r:embed="rId5">
+            <a:extLst>
+              <a:ext uri="{28A0092B-C50C-407E-A947-70E740481C1C}">
+                <a14:useLocalDpi xmlns:a14="http://schemas.microsoft.com/office/drawing/2010/main" val="0"/>
+              </a:ext>
+            </a:extLst>
+          </a:blip>
+          <a:stretch>
+            <a:fillRect/>
+          </a:stretch>
+        </p:blipFill>
+        <p:spPr>
+          <a:xfrm>
+            <a:off x="7564457" y="2073905"/>
+            <a:ext cx="3933333" cy="3933333"/>
+          </a:xfrm>
+          <a:prstGeom prst="rect">
+            <a:avLst/>
+          </a:prstGeom>
+        </p:spPr>
+      </p:pic>
     </p:spTree>
     <p:extLst>
       <p:ext uri="{BB962C8B-B14F-4D97-AF65-F5344CB8AC3E}">
@@ -10046,6 +10076,59 @@
                                           </p:stCondLst>
                                         </p:cTn>
                                         <p:tgtEl>
+                                          <p:spTgt spid="7"/>
+                                        </p:tgtEl>
+                                        <p:attrNameLst>
+                                          <p:attrName>style.visibility</p:attrName>
+                                        </p:attrNameLst>
+                                      </p:cBhvr>
+                                      <p:to>
+                                        <p:strVal val="visible"/>
+                                      </p:to>
+                                    </p:set>
+                                    <p:animEffect transition="in" filter="fade">
+                                      <p:cBhvr>
+                                        <p:cTn id="12" dur="500"/>
+                                        <p:tgtEl>
+                                          <p:spTgt spid="7"/>
+                                        </p:tgtEl>
+                                      </p:cBhvr>
+                                    </p:animEffect>
+                                  </p:childTnLst>
+                                </p:cTn>
+                              </p:par>
+                            </p:childTnLst>
+                          </p:cTn>
+                        </p:par>
+                      </p:childTnLst>
+                    </p:cTn>
+                  </p:par>
+                  <p:par>
+                    <p:cTn id="13" fill="hold">
+                      <p:stCondLst>
+                        <p:cond delay="indefinite"/>
+                      </p:stCondLst>
+                      <p:childTnLst>
+                        <p:par>
+                          <p:cTn id="14" fill="hold">
+                            <p:stCondLst>
+                              <p:cond delay="0"/>
+                            </p:stCondLst>
+                            <p:childTnLst>
+                              <p:par>
+                                <p:cTn id="15" presetID="10" presetClass="entr" presetSubtype="0" fill="hold" nodeType="clickEffect">
+                                  <p:stCondLst>
+                                    <p:cond delay="0"/>
+                                  </p:stCondLst>
+                                  <p:childTnLst>
+                                    <p:set>
+                                      <p:cBhvr>
+                                        <p:cTn id="16" dur="1" fill="hold">
+                                          <p:stCondLst>
+                                            <p:cond delay="0"/>
+                                          </p:stCondLst>
+                                        </p:cTn>
+                                        <p:tgtEl>
                                           <p:spTgt spid="5"/>
                                         </p:tgtEl>
                                         <p:attrNameLst>
@@ -10058,7 +10141,7 @@
                                     </p:set>
                                     <p:animEffect transition="in" filter="fade">
                                       <p:cBhvr>
-                                        <p:cTn id="12" dur="500"/>
+                                        <p:cTn id="17" dur="500"/>
                                         <p:tgtEl>
                                           <p:spTgt spid="5"/>
                                         </p:tgtEl>
@@ -12300,7 +12383,7 @@
   <a:extraClrSchemeLst/>
   <a:extLst>
     <a:ext uri="{05A4C25C-085E-4340-85A3-A5531E510DB2}">
-      <thm15:themeFamily xmlns="" xmlns:thm15="http://schemas.microsoft.com/office/thememl/2012/main" name="Vapor Trail" id="{4FDF2955-7D9C-493C-B9F9-C205151B46CD}" vid="{FE1EB5C7-81A8-4CBA-AE6E-B3BF73DC3895}"/>
+      <thm15:themeFamily xmlns:thm15="http://schemas.microsoft.com/office/thememl/2012/main" xmlns="" name="Vapor Trail" id="{4FDF2955-7D9C-493C-B9F9-C205151B46CD}" vid="{FE1EB5C7-81A8-4CBA-AE6E-B3BF73DC3895}"/>
     </a:ext>
   </a:extLst>
 </a:theme>

</xml_diff>